<commit_message>
Deploying to gh-pages from master @ c7815e57f28340d136f0d9138a1608c4c40af7d8 🚀
</commit_message>
<xml_diff>
--- a/ppt/Phishing.pptx
+++ b/ppt/Phishing.pptx
@@ -5,8 +5,7 @@
     <p:sldMasterId id="2147483672" r:id="rId1"/>
   </p:sldMasterIdLst>
   <p:sldIdLst>
-    <p:sldId id="256" r:id="rId2"/>
-    <p:sldId id="257" r:id="rId3"/>
+    <p:sldId id="257" r:id="rId2"/>
   </p:sldIdLst>
   <p:sldSz cx="12192000" cy="6858000"/>
   <p:notesSz cx="6858000" cy="9144000"/>
@@ -3333,2524 +3332,6 @@
 </file>
 
 <file path=ppt/slides/slide1.xml><?xml version="1.0" encoding="utf-8"?>
-<p:sld xmlns:a="http://schemas.openxmlformats.org/drawingml/2006/main" xmlns:r="http://schemas.openxmlformats.org/officeDocument/2006/relationships" xmlns:p="http://schemas.openxmlformats.org/presentationml/2006/main">
-  <p:cSld>
-    <p:bg>
-      <p:bgPr>
-        <a:solidFill>
-          <a:schemeClr val="bg1"/>
-        </a:solidFill>
-        <a:effectLst/>
-      </p:bgPr>
-    </p:bg>
-    <p:spTree>
-      <p:nvGrpSpPr>
-        <p:cNvPr id="1" name=""/>
-        <p:cNvGrpSpPr/>
-        <p:nvPr/>
-      </p:nvGrpSpPr>
-      <p:grpSpPr>
-        <a:xfrm>
-          <a:off x="0" y="0"/>
-          <a:ext cx="0" cy="0"/>
-          <a:chOff x="0" y="0"/>
-          <a:chExt cx="0" cy="0"/>
-        </a:xfrm>
-      </p:grpSpPr>
-      <p:sp useBgFill="1">
-        <p:nvSpPr>
-          <p:cNvPr id="10" name="Rectangle 9">
-            <a:extLst>
-              <a:ext uri="{FF2B5EF4-FFF2-40B4-BE49-F238E27FC236}">
-                <a16:creationId xmlns:a16="http://schemas.microsoft.com/office/drawing/2014/main" id="{A3363022-C969-41E9-8EB2-E4C94908C1FA}"/>
-              </a:ext>
-              <a:ext uri="{C183D7F6-B498-43B3-948B-1728B52AA6E4}">
-                <adec:decorative xmlns:adec="http://schemas.microsoft.com/office/drawing/2017/decorative" val="1"/>
-              </a:ext>
-            </a:extLst>
-          </p:cNvPr>
-          <p:cNvSpPr>
-            <a:spLocks noGrp="1" noRot="1" noChangeAspect="1" noMove="1" noResize="1" noEditPoints="1" noAdjustHandles="1" noChangeArrowheads="1" noChangeShapeType="1" noTextEdit="1"/>
-          </p:cNvSpPr>
-          <p:nvPr>
-            <p:extLst>
-              <p:ext uri="{386F3935-93C4-4BCD-93E2-E3B085C9AB24}">
-                <p16:designElem xmlns:p16="http://schemas.microsoft.com/office/powerpoint/2015/main" val="1"/>
-              </p:ext>
-            </p:extLst>
-          </p:nvPr>
-        </p:nvSpPr>
-        <p:spPr>
-          <a:xfrm>
-            <a:off x="0" y="-1"/>
-            <a:ext cx="12191695" cy="6852025"/>
-          </a:xfrm>
-          <a:prstGeom prst="rect">
-            <a:avLst/>
-          </a:prstGeom>
-          <a:ln>
-            <a:noFill/>
-          </a:ln>
-        </p:spPr>
-        <p:style>
-          <a:lnRef idx="2">
-            <a:schemeClr val="accent1">
-              <a:shade val="50000"/>
-            </a:schemeClr>
-          </a:lnRef>
-          <a:fillRef idx="1">
-            <a:schemeClr val="accent1"/>
-          </a:fillRef>
-          <a:effectRef idx="0">
-            <a:schemeClr val="accent1"/>
-          </a:effectRef>
-          <a:fontRef idx="minor">
-            <a:schemeClr val="lt1"/>
-          </a:fontRef>
-        </p:style>
-        <p:txBody>
-          <a:bodyPr rtlCol="0" anchor="ctr"/>
-          <a:lstStyle/>
-          <a:p>
-            <a:pPr algn="ctr"/>
-            <a:endParaRPr lang="en-US"/>
-          </a:p>
-        </p:txBody>
-      </p:sp>
-      <p:sp>
-        <p:nvSpPr>
-          <p:cNvPr id="12" name="Rectangle 11">
-            <a:extLst>
-              <a:ext uri="{FF2B5EF4-FFF2-40B4-BE49-F238E27FC236}">
-                <a16:creationId xmlns:a16="http://schemas.microsoft.com/office/drawing/2014/main" id="{8D1AD6B3-BE88-4CEB-BA17-790657CC4729}"/>
-              </a:ext>
-              <a:ext uri="{C183D7F6-B498-43B3-948B-1728B52AA6E4}">
-                <adec:decorative xmlns:adec="http://schemas.microsoft.com/office/drawing/2017/decorative" val="1"/>
-              </a:ext>
-            </a:extLst>
-          </p:cNvPr>
-          <p:cNvSpPr>
-            <a:spLocks noGrp="1" noRot="1" noChangeAspect="1" noMove="1" noResize="1" noEditPoints="1" noAdjustHandles="1" noChangeArrowheads="1" noChangeShapeType="1" noTextEdit="1"/>
-          </p:cNvSpPr>
-          <p:nvPr>
-            <p:extLst>
-              <p:ext uri="{386F3935-93C4-4BCD-93E2-E3B085C9AB24}">
-                <p16:designElem xmlns:p16="http://schemas.microsoft.com/office/powerpoint/2015/main" val="1"/>
-              </p:ext>
-            </p:extLst>
-          </p:nvPr>
-        </p:nvSpPr>
-        <p:spPr>
-          <a:xfrm>
-            <a:off x="305" y="0"/>
-            <a:ext cx="12191695" cy="6858000"/>
-          </a:xfrm>
-          <a:prstGeom prst="rect">
-            <a:avLst/>
-          </a:prstGeom>
-          <a:solidFill>
-            <a:schemeClr val="bg1"/>
-          </a:solidFill>
-          <a:ln>
-            <a:noFill/>
-          </a:ln>
-        </p:spPr>
-        <p:style>
-          <a:lnRef idx="2">
-            <a:schemeClr val="accent1">
-              <a:shade val="50000"/>
-            </a:schemeClr>
-          </a:lnRef>
-          <a:fillRef idx="1">
-            <a:schemeClr val="accent1"/>
-          </a:fillRef>
-          <a:effectRef idx="0">
-            <a:schemeClr val="accent1"/>
-          </a:effectRef>
-          <a:fontRef idx="minor">
-            <a:schemeClr val="lt1"/>
-          </a:fontRef>
-        </p:style>
-        <p:txBody>
-          <a:bodyPr rtlCol="0" anchor="ctr"/>
-          <a:lstStyle/>
-          <a:p>
-            <a:pPr algn="ctr"/>
-            <a:endParaRPr lang="en-US"/>
-          </a:p>
-        </p:txBody>
-      </p:sp>
-      <p:sp>
-        <p:nvSpPr>
-          <p:cNvPr id="2" name="Title 1">
-            <a:extLst>
-              <a:ext uri="{FF2B5EF4-FFF2-40B4-BE49-F238E27FC236}">
-                <a16:creationId xmlns:a16="http://schemas.microsoft.com/office/drawing/2014/main" id="{6A2C485E-0B69-F0B4-E91C-063CDCB6EAA4}"/>
-              </a:ext>
-            </a:extLst>
-          </p:cNvPr>
-          <p:cNvSpPr>
-            <a:spLocks noGrp="1"/>
-          </p:cNvSpPr>
-          <p:nvPr>
-            <p:ph type="ctrTitle"/>
-          </p:nvPr>
-        </p:nvSpPr>
-        <p:spPr>
-          <a:xfrm>
-            <a:off x="6590662" y="4267832"/>
-            <a:ext cx="4805996" cy="1297115"/>
-          </a:xfrm>
-        </p:spPr>
-        <p:txBody>
-          <a:bodyPr anchor="t">
-            <a:normAutofit/>
-          </a:bodyPr>
-          <a:lstStyle/>
-          <a:p>
-            <a:pPr algn="l"/>
-            <a:r>
-              <a:rPr lang="en-US" sz="3700" dirty="0">
-                <a:solidFill>
-                  <a:schemeClr val="tx2"/>
-                </a:solidFill>
-              </a:rPr>
-              <a:t>THIS IS A PRESENTATION SLIDE</a:t>
-            </a:r>
-            <a:endParaRPr lang="en-SG" sz="3700" dirty="0">
-              <a:solidFill>
-                <a:schemeClr val="tx2"/>
-              </a:solidFill>
-            </a:endParaRPr>
-          </a:p>
-        </p:txBody>
-      </p:sp>
-      <p:sp>
-        <p:nvSpPr>
-          <p:cNvPr id="3" name="Subtitle 2">
-            <a:extLst>
-              <a:ext uri="{FF2B5EF4-FFF2-40B4-BE49-F238E27FC236}">
-                <a16:creationId xmlns:a16="http://schemas.microsoft.com/office/drawing/2014/main" id="{2379AD35-93F6-C431-5C49-E2C92AC6DD8F}"/>
-              </a:ext>
-            </a:extLst>
-          </p:cNvPr>
-          <p:cNvSpPr>
-            <a:spLocks noGrp="1"/>
-          </p:cNvSpPr>
-          <p:nvPr>
-            <p:ph type="subTitle" idx="1"/>
-          </p:nvPr>
-        </p:nvSpPr>
-        <p:spPr>
-          <a:xfrm>
-            <a:off x="6590966" y="3428999"/>
-            <a:ext cx="4805691" cy="838831"/>
-          </a:xfrm>
-        </p:spPr>
-        <p:txBody>
-          <a:bodyPr anchor="b">
-            <a:normAutofit/>
-          </a:bodyPr>
-          <a:lstStyle/>
-          <a:p>
-            <a:pPr algn="l"/>
-            <a:r>
-              <a:rPr lang="en-US" sz="2000">
-                <a:solidFill>
-                  <a:schemeClr val="tx2"/>
-                </a:solidFill>
-              </a:rPr>
-              <a:t>EASTER EGG!</a:t>
-            </a:r>
-            <a:endParaRPr lang="en-SG" sz="2000">
-              <a:solidFill>
-                <a:schemeClr val="tx2"/>
-              </a:solidFill>
-            </a:endParaRPr>
-          </a:p>
-        </p:txBody>
-      </p:sp>
-      <p:pic>
-        <p:nvPicPr>
-          <p:cNvPr id="7" name="Graphic 6" descr="Teacher">
-            <a:extLst>
-              <a:ext uri="{FF2B5EF4-FFF2-40B4-BE49-F238E27FC236}">
-                <a16:creationId xmlns:a16="http://schemas.microsoft.com/office/drawing/2014/main" id="{64469D2F-51CC-FD3E-3AFE-18338FEF336B}"/>
-              </a:ext>
-            </a:extLst>
-          </p:cNvPr>
-          <p:cNvPicPr>
-            <a:picLocks noChangeAspect="1"/>
-          </p:cNvPicPr>
-          <p:nvPr/>
-        </p:nvPicPr>
-        <p:blipFill>
-          <a:blip r:embed="rId2">
-            <a:extLst>
-              <a:ext uri="{28A0092B-C50C-407E-A947-70E740481C1C}">
-                <a14:useLocalDpi xmlns:a14="http://schemas.microsoft.com/office/drawing/2010/main" val="0"/>
-              </a:ext>
-              <a:ext uri="{96DAC541-7B7A-43D3-8B79-37D633B846F1}">
-                <asvg:svgBlip xmlns:asvg="http://schemas.microsoft.com/office/drawing/2016/SVG/main" r:embed="rId3"/>
-              </a:ext>
-            </a:extLst>
-          </a:blip>
-          <a:stretch>
-            <a:fillRect/>
-          </a:stretch>
-        </p:blipFill>
-        <p:spPr>
-          <a:xfrm>
-            <a:off x="340470" y="1815320"/>
-            <a:ext cx="4141760" cy="4141760"/>
-          </a:xfrm>
-          <a:custGeom>
-            <a:avLst/>
-            <a:gdLst/>
-            <a:ahLst/>
-            <a:cxnLst/>
-            <a:rect l="l" t="t" r="r" b="b"/>
-            <a:pathLst>
-              <a:path w="4141760" h="4377846">
-                <a:moveTo>
-                  <a:pt x="0" y="0"/>
-                </a:moveTo>
-                <a:lnTo>
-                  <a:pt x="4141760" y="0"/>
-                </a:lnTo>
-                <a:lnTo>
-                  <a:pt x="4141760" y="4377846"/>
-                </a:lnTo>
-                <a:lnTo>
-                  <a:pt x="0" y="4377846"/>
-                </a:lnTo>
-                <a:close/>
-              </a:path>
-            </a:pathLst>
-          </a:custGeom>
-        </p:spPr>
-      </p:pic>
-      <p:grpSp>
-        <p:nvGrpSpPr>
-          <p:cNvPr id="14" name="Group 13">
-            <a:extLst>
-              <a:ext uri="{FF2B5EF4-FFF2-40B4-BE49-F238E27FC236}">
-                <a16:creationId xmlns:a16="http://schemas.microsoft.com/office/drawing/2014/main" id="{89D1390B-7E13-4B4F-9CB2-391063412E54}"/>
-              </a:ext>
-              <a:ext uri="{C183D7F6-B498-43B3-948B-1728B52AA6E4}">
-                <adec:decorative xmlns:adec="http://schemas.microsoft.com/office/drawing/2017/decorative" val="1"/>
-              </a:ext>
-            </a:extLst>
-          </p:cNvPr>
-          <p:cNvGrpSpPr>
-            <a:grpSpLocks noGrp="1" noUngrp="1" noRot="1" noChangeAspect="1" noMove="1" noResize="1"/>
-          </p:cNvGrpSpPr>
-          <p:nvPr>
-            <p:extLst>
-              <p:ext uri="{386F3935-93C4-4BCD-93E2-E3B085C9AB24}">
-                <p16:designElem xmlns:p16="http://schemas.microsoft.com/office/powerpoint/2015/main" val="1"/>
-              </p:ext>
-            </p:extLst>
-          </p:nvPr>
-        </p:nvGrpSpPr>
-        <p:grpSpPr>
-          <a:xfrm>
-            <a:off x="-4253" y="-5977"/>
-            <a:ext cx="6238675" cy="6863979"/>
-            <a:chOff x="305" y="-5977"/>
-            <a:chExt cx="6238675" cy="6863979"/>
-          </a:xfrm>
-        </p:grpSpPr>
-        <p:sp>
-          <p:nvSpPr>
-            <p:cNvPr id="15" name="Freeform: Shape 14">
-              <a:extLst>
-                <a:ext uri="{FF2B5EF4-FFF2-40B4-BE49-F238E27FC236}">
-                  <a16:creationId xmlns:a16="http://schemas.microsoft.com/office/drawing/2014/main" id="{9E720206-AA49-4786-A932-A2650DE09183}"/>
-                </a:ext>
-                <a:ext uri="{C183D7F6-B498-43B3-948B-1728B52AA6E4}">
-                  <adec:decorative xmlns:adec="http://schemas.microsoft.com/office/drawing/2017/decorative" val="1"/>
-                </a:ext>
-              </a:extLst>
-            </p:cNvPr>
-            <p:cNvSpPr/>
-            <p:nvPr>
-              <p:extLst>
-                <p:ext uri="{386F3935-93C4-4BCD-93E2-E3B085C9AB24}">
-                  <p16:designElem xmlns:p16="http://schemas.microsoft.com/office/powerpoint/2015/main" val="1"/>
-                </p:ext>
-              </p:extLst>
-            </p:nvPr>
-          </p:nvSpPr>
-          <p:spPr>
-            <a:xfrm flipH="1">
-              <a:off x="305" y="34854"/>
-              <a:ext cx="6028697" cy="6817170"/>
-            </a:xfrm>
-            <a:custGeom>
-              <a:avLst/>
-              <a:gdLst>
-                <a:gd name="connsiteX0" fmla="*/ 6028697 w 6028697"/>
-                <a:gd name="connsiteY0" fmla="*/ 6155323 h 6817170"/>
-                <a:gd name="connsiteX1" fmla="*/ 6028697 w 6028697"/>
-                <a:gd name="connsiteY1" fmla="*/ 6817170 h 6817170"/>
-                <a:gd name="connsiteX2" fmla="*/ 5157862 w 6028697"/>
-                <a:gd name="connsiteY2" fmla="*/ 6817170 h 6817170"/>
-                <a:gd name="connsiteX3" fmla="*/ 5347156 w 6028697"/>
-                <a:gd name="connsiteY3" fmla="*/ 6687553 h 6817170"/>
-                <a:gd name="connsiteX4" fmla="*/ 5487470 w 6028697"/>
-                <a:gd name="connsiteY4" fmla="*/ 6581714 h 6817170"/>
-                <a:gd name="connsiteX5" fmla="*/ 5627642 w 6028697"/>
-                <a:gd name="connsiteY5" fmla="*/ 6472328 h 6817170"/>
-                <a:gd name="connsiteX6" fmla="*/ 5911392 w 6028697"/>
-                <a:gd name="connsiteY6" fmla="*/ 6245328 h 6817170"/>
-                <a:gd name="connsiteX7" fmla="*/ 4481066 w 6028697"/>
-                <a:gd name="connsiteY7" fmla="*/ 478 h 6817170"/>
-                <a:gd name="connsiteX8" fmla="*/ 4672258 w 6028697"/>
-                <a:gd name="connsiteY8" fmla="*/ 7519 h 6817170"/>
-                <a:gd name="connsiteX9" fmla="*/ 5429869 w 6028697"/>
-                <a:gd name="connsiteY9" fmla="*/ 125134 h 6817170"/>
-                <a:gd name="connsiteX10" fmla="*/ 5976319 w 6028697"/>
-                <a:gd name="connsiteY10" fmla="*/ 314893 h 6817170"/>
-                <a:gd name="connsiteX11" fmla="*/ 6028697 w 6028697"/>
-                <a:gd name="connsiteY11" fmla="*/ 339901 h 6817170"/>
-                <a:gd name="connsiteX12" fmla="*/ 6028697 w 6028697"/>
-                <a:gd name="connsiteY12" fmla="*/ 732458 h 6817170"/>
-                <a:gd name="connsiteX13" fmla="*/ 5990985 w 6028697"/>
-                <a:gd name="connsiteY13" fmla="*/ 712211 h 6817170"/>
-                <a:gd name="connsiteX14" fmla="*/ 5341339 w 6028697"/>
-                <a:gd name="connsiteY14" fmla="*/ 475281 h 6817170"/>
-                <a:gd name="connsiteX15" fmla="*/ 4651969 w 6028697"/>
-                <a:gd name="connsiteY15" fmla="*/ 377104 h 6817170"/>
-                <a:gd name="connsiteX16" fmla="*/ 3953093 w 6028697"/>
-                <a:gd name="connsiteY16" fmla="*/ 402498 h 6817170"/>
-                <a:gd name="connsiteX17" fmla="*/ 3267413 w 6028697"/>
-                <a:gd name="connsiteY17" fmla="*/ 546643 h 6817170"/>
-                <a:gd name="connsiteX18" fmla="*/ 1439498 w 6028697"/>
-                <a:gd name="connsiteY18" fmla="*/ 1568141 h 6817170"/>
-                <a:gd name="connsiteX19" fmla="*/ 960671 w 6028697"/>
-                <a:gd name="connsiteY19" fmla="*/ 2082013 h 6817170"/>
-                <a:gd name="connsiteX20" fmla="*/ 581866 w 6028697"/>
-                <a:gd name="connsiteY20" fmla="*/ 2672638 h 6817170"/>
-                <a:gd name="connsiteX21" fmla="*/ 324789 w 6028697"/>
-                <a:gd name="connsiteY21" fmla="*/ 3325262 h 6817170"/>
-                <a:gd name="connsiteX22" fmla="*/ 231151 w 6028697"/>
-                <a:gd name="connsiteY22" fmla="*/ 4022292 h 6817170"/>
-                <a:gd name="connsiteX23" fmla="*/ 270592 w 6028697"/>
-                <a:gd name="connsiteY23" fmla="*/ 4362792 h 6817170"/>
-                <a:gd name="connsiteX24" fmla="*/ 387213 w 6028697"/>
-                <a:gd name="connsiteY24" fmla="*/ 4681585 h 6817170"/>
-                <a:gd name="connsiteX25" fmla="*/ 468507 w 6028697"/>
-                <a:gd name="connsiteY25" fmla="*/ 4831546 h 6817170"/>
-                <a:gd name="connsiteX26" fmla="*/ 561862 w 6028697"/>
-                <a:gd name="connsiteY26" fmla="*/ 4976826 h 6817170"/>
-                <a:gd name="connsiteX27" fmla="*/ 777511 w 6028697"/>
-                <a:gd name="connsiteY27" fmla="*/ 5257597 h 6817170"/>
-                <a:gd name="connsiteX28" fmla="*/ 1010895 w 6028697"/>
-                <a:gd name="connsiteY28" fmla="*/ 5540494 h 6817170"/>
-                <a:gd name="connsiteX29" fmla="*/ 1126948 w 6028697"/>
-                <a:gd name="connsiteY29" fmla="*/ 5688186 h 6817170"/>
-                <a:gd name="connsiteX30" fmla="*/ 1182706 w 6028697"/>
-                <a:gd name="connsiteY30" fmla="*/ 5760543 h 6817170"/>
-                <a:gd name="connsiteX31" fmla="*/ 1237327 w 6028697"/>
-                <a:gd name="connsiteY31" fmla="*/ 5830060 h 6817170"/>
-                <a:gd name="connsiteX32" fmla="*/ 1706649 w 6028697"/>
-                <a:gd name="connsiteY32" fmla="*/ 6342797 h 6817170"/>
-                <a:gd name="connsiteX33" fmla="*/ 1956207 w 6028697"/>
-                <a:gd name="connsiteY33" fmla="*/ 6573484 h 6817170"/>
-                <a:gd name="connsiteX34" fmla="*/ 2217681 w 6028697"/>
-                <a:gd name="connsiteY34" fmla="*/ 6786297 h 6817170"/>
-                <a:gd name="connsiteX35" fmla="*/ 2260820 w 6028697"/>
-                <a:gd name="connsiteY35" fmla="*/ 6817170 h 6817170"/>
-                <a:gd name="connsiteX36" fmla="*/ 1429497 w 6028697"/>
-                <a:gd name="connsiteY36" fmla="*/ 6817170 h 6817170"/>
-                <a:gd name="connsiteX37" fmla="*/ 1327275 w 6028697"/>
-                <a:gd name="connsiteY37" fmla="*/ 6713800 h 6817170"/>
-                <a:gd name="connsiteX38" fmla="*/ 1080556 w 6028697"/>
-                <a:gd name="connsiteY38" fmla="*/ 6414443 h 6817170"/>
-                <a:gd name="connsiteX39" fmla="*/ 865189 w 6028697"/>
-                <a:gd name="connsiteY39" fmla="*/ 6097496 h 6817170"/>
-                <a:gd name="connsiteX40" fmla="*/ 814823 w 6028697"/>
-                <a:gd name="connsiteY40" fmla="*/ 6016911 h 6817170"/>
-                <a:gd name="connsiteX41" fmla="*/ 766729 w 6028697"/>
-                <a:gd name="connsiteY41" fmla="*/ 5938453 h 6817170"/>
-                <a:gd name="connsiteX42" fmla="*/ 671672 w 6028697"/>
-                <a:gd name="connsiteY42" fmla="*/ 5786648 h 6817170"/>
-                <a:gd name="connsiteX43" fmla="*/ 474608 w 6028697"/>
-                <a:gd name="connsiteY43" fmla="*/ 5474664 h 6817170"/>
-                <a:gd name="connsiteX44" fmla="*/ 282652 w 6028697"/>
-                <a:gd name="connsiteY44" fmla="*/ 5146508 h 6817170"/>
-                <a:gd name="connsiteX45" fmla="*/ 196108 w 6028697"/>
-                <a:gd name="connsiteY45" fmla="*/ 4972712 h 6817170"/>
-                <a:gd name="connsiteX46" fmla="*/ 122474 w 6028697"/>
-                <a:gd name="connsiteY46" fmla="*/ 4791821 h 6817170"/>
-                <a:gd name="connsiteX47" fmla="*/ 65724 w 6028697"/>
-                <a:gd name="connsiteY47" fmla="*/ 4603129 h 6817170"/>
-                <a:gd name="connsiteX48" fmla="*/ 44727 w 6028697"/>
-                <a:gd name="connsiteY48" fmla="*/ 4506937 h 6817170"/>
-                <a:gd name="connsiteX49" fmla="*/ 35505 w 6028697"/>
-                <a:gd name="connsiteY49" fmla="*/ 4458699 h 6817170"/>
-                <a:gd name="connsiteX50" fmla="*/ 27845 w 6028697"/>
-                <a:gd name="connsiteY50" fmla="*/ 4410320 h 6817170"/>
-                <a:gd name="connsiteX51" fmla="*/ 37 w 6028697"/>
-                <a:gd name="connsiteY51" fmla="*/ 4022292 h 6817170"/>
-                <a:gd name="connsiteX52" fmla="*/ 78777 w 6028697"/>
-                <a:gd name="connsiteY52" fmla="*/ 3267236 h 6817170"/>
-                <a:gd name="connsiteX53" fmla="*/ 315424 w 6028697"/>
-                <a:gd name="connsiteY53" fmla="*/ 2543673 h 6817170"/>
-                <a:gd name="connsiteX54" fmla="*/ 1202710 w 6028697"/>
-                <a:gd name="connsiteY54" fmla="*/ 1314895 h 6817170"/>
-                <a:gd name="connsiteX55" fmla="*/ 1791065 w 6028697"/>
-                <a:gd name="connsiteY55" fmla="*/ 833514 h 6817170"/>
-                <a:gd name="connsiteX56" fmla="*/ 3908404 w 6028697"/>
-                <a:gd name="connsiteY56" fmla="*/ 29794 h 6817170"/>
-                <a:gd name="connsiteX57" fmla="*/ 4481066 w 6028697"/>
-                <a:gd name="connsiteY57" fmla="*/ 478 h 6817170"/>
-              </a:gdLst>
-              <a:ahLst/>
-              <a:cxnLst>
-                <a:cxn ang="0">
-                  <a:pos x="connsiteX0" y="connsiteY0"/>
-                </a:cxn>
-                <a:cxn ang="0">
-                  <a:pos x="connsiteX1" y="connsiteY1"/>
-                </a:cxn>
-                <a:cxn ang="0">
-                  <a:pos x="connsiteX2" y="connsiteY2"/>
-                </a:cxn>
-                <a:cxn ang="0">
-                  <a:pos x="connsiteX3" y="connsiteY3"/>
-                </a:cxn>
-                <a:cxn ang="0">
-                  <a:pos x="connsiteX4" y="connsiteY4"/>
-                </a:cxn>
-                <a:cxn ang="0">
-                  <a:pos x="connsiteX5" y="connsiteY5"/>
-                </a:cxn>
-                <a:cxn ang="0">
-                  <a:pos x="connsiteX6" y="connsiteY6"/>
-                </a:cxn>
-                <a:cxn ang="0">
-                  <a:pos x="connsiteX7" y="connsiteY7"/>
-                </a:cxn>
-                <a:cxn ang="0">
-                  <a:pos x="connsiteX8" y="connsiteY8"/>
-                </a:cxn>
-                <a:cxn ang="0">
-                  <a:pos x="connsiteX9" y="connsiteY9"/>
-                </a:cxn>
-                <a:cxn ang="0">
-                  <a:pos x="connsiteX10" y="connsiteY10"/>
-                </a:cxn>
-                <a:cxn ang="0">
-                  <a:pos x="connsiteX11" y="connsiteY11"/>
-                </a:cxn>
-                <a:cxn ang="0">
-                  <a:pos x="connsiteX12" y="connsiteY12"/>
-                </a:cxn>
-                <a:cxn ang="0">
-                  <a:pos x="connsiteX13" y="connsiteY13"/>
-                </a:cxn>
-                <a:cxn ang="0">
-                  <a:pos x="connsiteX14" y="connsiteY14"/>
-                </a:cxn>
-                <a:cxn ang="0">
-                  <a:pos x="connsiteX15" y="connsiteY15"/>
-                </a:cxn>
-                <a:cxn ang="0">
-                  <a:pos x="connsiteX16" y="connsiteY16"/>
-                </a:cxn>
-                <a:cxn ang="0">
-                  <a:pos x="connsiteX17" y="connsiteY17"/>
-                </a:cxn>
-                <a:cxn ang="0">
-                  <a:pos x="connsiteX18" y="connsiteY18"/>
-                </a:cxn>
-                <a:cxn ang="0">
-                  <a:pos x="connsiteX19" y="connsiteY19"/>
-                </a:cxn>
-                <a:cxn ang="0">
-                  <a:pos x="connsiteX20" y="connsiteY20"/>
-                </a:cxn>
-                <a:cxn ang="0">
-                  <a:pos x="connsiteX21" y="connsiteY21"/>
-                </a:cxn>
-                <a:cxn ang="0">
-                  <a:pos x="connsiteX22" y="connsiteY22"/>
-                </a:cxn>
-                <a:cxn ang="0">
-                  <a:pos x="connsiteX23" y="connsiteY23"/>
-                </a:cxn>
-                <a:cxn ang="0">
-                  <a:pos x="connsiteX24" y="connsiteY24"/>
-                </a:cxn>
-                <a:cxn ang="0">
-                  <a:pos x="connsiteX25" y="connsiteY25"/>
-                </a:cxn>
-                <a:cxn ang="0">
-                  <a:pos x="connsiteX26" y="connsiteY26"/>
-                </a:cxn>
-                <a:cxn ang="0">
-                  <a:pos x="connsiteX27" y="connsiteY27"/>
-                </a:cxn>
-                <a:cxn ang="0">
-                  <a:pos x="connsiteX28" y="connsiteY28"/>
-                </a:cxn>
-                <a:cxn ang="0">
-                  <a:pos x="connsiteX29" y="connsiteY29"/>
-                </a:cxn>
-                <a:cxn ang="0">
-                  <a:pos x="connsiteX30" y="connsiteY30"/>
-                </a:cxn>
-                <a:cxn ang="0">
-                  <a:pos x="connsiteX31" y="connsiteY31"/>
-                </a:cxn>
-                <a:cxn ang="0">
-                  <a:pos x="connsiteX32" y="connsiteY32"/>
-                </a:cxn>
-                <a:cxn ang="0">
-                  <a:pos x="connsiteX33" y="connsiteY33"/>
-                </a:cxn>
-                <a:cxn ang="0">
-                  <a:pos x="connsiteX34" y="connsiteY34"/>
-                </a:cxn>
-                <a:cxn ang="0">
-                  <a:pos x="connsiteX35" y="connsiteY35"/>
-                </a:cxn>
-                <a:cxn ang="0">
-                  <a:pos x="connsiteX36" y="connsiteY36"/>
-                </a:cxn>
-                <a:cxn ang="0">
-                  <a:pos x="connsiteX37" y="connsiteY37"/>
-                </a:cxn>
-                <a:cxn ang="0">
-                  <a:pos x="connsiteX38" y="connsiteY38"/>
-                </a:cxn>
-                <a:cxn ang="0">
-                  <a:pos x="connsiteX39" y="connsiteY39"/>
-                </a:cxn>
-                <a:cxn ang="0">
-                  <a:pos x="connsiteX40" y="connsiteY40"/>
-                </a:cxn>
-                <a:cxn ang="0">
-                  <a:pos x="connsiteX41" y="connsiteY41"/>
-                </a:cxn>
-                <a:cxn ang="0">
-                  <a:pos x="connsiteX42" y="connsiteY42"/>
-                </a:cxn>
-                <a:cxn ang="0">
-                  <a:pos x="connsiteX43" y="connsiteY43"/>
-                </a:cxn>
-                <a:cxn ang="0">
-                  <a:pos x="connsiteX44" y="connsiteY44"/>
-                </a:cxn>
-                <a:cxn ang="0">
-                  <a:pos x="connsiteX45" y="connsiteY45"/>
-                </a:cxn>
-                <a:cxn ang="0">
-                  <a:pos x="connsiteX46" y="connsiteY46"/>
-                </a:cxn>
-                <a:cxn ang="0">
-                  <a:pos x="connsiteX47" y="connsiteY47"/>
-                </a:cxn>
-                <a:cxn ang="0">
-                  <a:pos x="connsiteX48" y="connsiteY48"/>
-                </a:cxn>
-                <a:cxn ang="0">
-                  <a:pos x="connsiteX49" y="connsiteY49"/>
-                </a:cxn>
-                <a:cxn ang="0">
-                  <a:pos x="connsiteX50" y="connsiteY50"/>
-                </a:cxn>
-                <a:cxn ang="0">
-                  <a:pos x="connsiteX51" y="connsiteY51"/>
-                </a:cxn>
-                <a:cxn ang="0">
-                  <a:pos x="connsiteX52" y="connsiteY52"/>
-                </a:cxn>
-                <a:cxn ang="0">
-                  <a:pos x="connsiteX53" y="connsiteY53"/>
-                </a:cxn>
-                <a:cxn ang="0">
-                  <a:pos x="connsiteX54" y="connsiteY54"/>
-                </a:cxn>
-                <a:cxn ang="0">
-                  <a:pos x="connsiteX55" y="connsiteY55"/>
-                </a:cxn>
-                <a:cxn ang="0">
-                  <a:pos x="connsiteX56" y="connsiteY56"/>
-                </a:cxn>
-                <a:cxn ang="0">
-                  <a:pos x="connsiteX57" y="connsiteY57"/>
-                </a:cxn>
-              </a:cxnLst>
-              <a:rect l="l" t="t" r="r" b="b"/>
-              <a:pathLst>
-                <a:path w="6028697" h="6817170">
-                  <a:moveTo>
-                    <a:pt x="6028697" y="6155323"/>
-                  </a:moveTo>
-                  <a:lnTo>
-                    <a:pt x="6028697" y="6817170"/>
-                  </a:lnTo>
-                  <a:lnTo>
-                    <a:pt x="5157862" y="6817170"/>
-                  </a:lnTo>
-                  <a:lnTo>
-                    <a:pt x="5347156" y="6687553"/>
-                  </a:lnTo>
-                  <a:cubicBezTo>
-                    <a:pt x="5394117" y="6653219"/>
-                    <a:pt x="5440793" y="6617608"/>
-                    <a:pt x="5487470" y="6581714"/>
-                  </a:cubicBezTo>
-                  <a:cubicBezTo>
-                    <a:pt x="5534147" y="6545820"/>
-                    <a:pt x="5580966" y="6509358"/>
-                    <a:pt x="5627642" y="6472328"/>
-                  </a:cubicBezTo>
-                  <a:lnTo>
-                    <a:pt x="5911392" y="6245328"/>
-                  </a:lnTo>
-                  <a:close/>
-                  <a:moveTo>
-                    <a:pt x="4481066" y="478"/>
-                  </a:moveTo>
-                  <a:cubicBezTo>
-                    <a:pt x="4544817" y="1422"/>
-                    <a:pt x="4608563" y="3769"/>
-                    <a:pt x="4672258" y="7519"/>
-                  </a:cubicBezTo>
-                  <a:cubicBezTo>
-                    <a:pt x="4927973" y="22364"/>
-                    <a:pt x="5181687" y="61751"/>
-                    <a:pt x="5429869" y="125134"/>
-                  </a:cubicBezTo>
-                  <a:cubicBezTo>
-                    <a:pt x="5617090" y="173104"/>
-                    <a:pt x="5799867" y="236595"/>
-                    <a:pt x="5976319" y="314893"/>
-                  </a:cubicBezTo>
-                  <a:lnTo>
-                    <a:pt x="6028697" y="339901"/>
-                  </a:lnTo>
-                  <a:lnTo>
-                    <a:pt x="6028697" y="732458"/>
-                  </a:lnTo>
-                  <a:lnTo>
-                    <a:pt x="5990985" y="712211"/>
-                  </a:lnTo>
-                  <a:cubicBezTo>
-                    <a:pt x="5783917" y="609342"/>
-                    <a:pt x="5566013" y="529876"/>
-                    <a:pt x="5341339" y="475281"/>
-                  </a:cubicBezTo>
-                  <a:cubicBezTo>
-                    <a:pt x="5115233" y="420503"/>
-                    <a:pt x="4884375" y="387624"/>
-                    <a:pt x="4651969" y="377104"/>
-                  </a:cubicBezTo>
-                  <a:cubicBezTo>
-                    <a:pt x="4418713" y="365171"/>
-                    <a:pt x="4184861" y="373670"/>
-                    <a:pt x="3953093" y="402498"/>
-                  </a:cubicBezTo>
-                  <a:cubicBezTo>
-                    <a:pt x="3721001" y="431832"/>
-                    <a:pt x="3491675" y="480040"/>
-                    <a:pt x="3267413" y="546643"/>
-                  </a:cubicBezTo>
-                  <a:cubicBezTo>
-                    <a:pt x="2591323" y="750761"/>
-                    <a:pt x="1967642" y="1099289"/>
-                    <a:pt x="1439498" y="1568141"/>
-                  </a:cubicBezTo>
-                  <a:cubicBezTo>
-                    <a:pt x="1265589" y="1725523"/>
-                    <a:pt x="1105393" y="1897434"/>
-                    <a:pt x="960671" y="2082013"/>
-                  </a:cubicBezTo>
-                  <a:cubicBezTo>
-                    <a:pt x="815775" y="2266294"/>
-                    <a:pt x="688923" y="2464081"/>
-                    <a:pt x="581866" y="2672638"/>
-                  </a:cubicBezTo>
-                  <a:cubicBezTo>
-                    <a:pt x="473765" y="2880669"/>
-                    <a:pt x="387610" y="3099397"/>
-                    <a:pt x="324789" y="3325262"/>
-                  </a:cubicBezTo>
-                  <a:cubicBezTo>
-                    <a:pt x="262714" y="3552403"/>
-                    <a:pt x="231223" y="3786822"/>
-                    <a:pt x="231151" y="4022292"/>
-                  </a:cubicBezTo>
-                  <a:cubicBezTo>
-                    <a:pt x="231413" y="4136912"/>
-                    <a:pt x="244645" y="4251136"/>
-                    <a:pt x="270592" y="4362792"/>
-                  </a:cubicBezTo>
-                  <a:cubicBezTo>
-                    <a:pt x="297885" y="4472943"/>
-                    <a:pt x="336983" y="4579833"/>
-                    <a:pt x="387213" y="4681585"/>
-                  </a:cubicBezTo>
-                  <a:cubicBezTo>
-                    <a:pt x="412042" y="4732517"/>
-                    <a:pt x="439423" y="4782457"/>
-                    <a:pt x="468507" y="4831546"/>
-                  </a:cubicBezTo>
-                  <a:cubicBezTo>
-                    <a:pt x="497591" y="4880636"/>
-                    <a:pt x="529230" y="4929015"/>
-                    <a:pt x="561862" y="4976826"/>
-                  </a:cubicBezTo>
-                  <a:cubicBezTo>
-                    <a:pt x="627975" y="5072166"/>
-                    <a:pt x="701466" y="5164668"/>
-                    <a:pt x="777511" y="5257597"/>
-                  </a:cubicBezTo>
-                  <a:cubicBezTo>
-                    <a:pt x="853556" y="5350524"/>
-                    <a:pt x="933574" y="5443594"/>
-                    <a:pt x="1010895" y="5540494"/>
-                  </a:cubicBezTo>
-                  <a:cubicBezTo>
-                    <a:pt x="1049957" y="5588732"/>
-                    <a:pt x="1088642" y="5637963"/>
-                    <a:pt x="1126948" y="5688186"/>
-                  </a:cubicBezTo>
-                  <a:lnTo>
-                    <a:pt x="1182706" y="5760543"/>
-                  </a:lnTo>
-                  <a:cubicBezTo>
-                    <a:pt x="1201007" y="5783669"/>
-                    <a:pt x="1218458" y="5807503"/>
-                    <a:pt x="1237327" y="5830060"/>
-                  </a:cubicBezTo>
-                  <a:cubicBezTo>
-                    <a:pt x="1383714" y="6009916"/>
-                    <a:pt x="1540413" y="6181116"/>
-                    <a:pt x="1706649" y="6342797"/>
-                  </a:cubicBezTo>
-                  <a:cubicBezTo>
-                    <a:pt x="1788084" y="6422531"/>
-                    <a:pt x="1871265" y="6499427"/>
-                    <a:pt x="1956207" y="6573484"/>
-                  </a:cubicBezTo>
-                  <a:cubicBezTo>
-                    <a:pt x="2041332" y="6647402"/>
-                    <a:pt x="2127733" y="6718907"/>
-                    <a:pt x="2217681" y="6786297"/>
-                  </a:cubicBezTo>
-                  <a:lnTo>
-                    <a:pt x="2260820" y="6817170"/>
-                  </a:lnTo>
-                  <a:lnTo>
-                    <a:pt x="1429497" y="6817170"/>
-                  </a:lnTo>
-                  <a:lnTo>
-                    <a:pt x="1327275" y="6713800"/>
-                  </a:lnTo>
-                  <a:cubicBezTo>
-                    <a:pt x="1239186" y="6618984"/>
-                    <a:pt x="1156797" y="6519019"/>
-                    <a:pt x="1080556" y="6414443"/>
-                  </a:cubicBezTo>
-                  <a:cubicBezTo>
-                    <a:pt x="1004653" y="6310734"/>
-                    <a:pt x="932439" y="6205177"/>
-                    <a:pt x="865189" y="6097496"/>
-                  </a:cubicBezTo>
-                  <a:cubicBezTo>
-                    <a:pt x="847881" y="6070823"/>
-                    <a:pt x="831565" y="6043725"/>
-                    <a:pt x="814823" y="6016911"/>
-                  </a:cubicBezTo>
-                  <a:lnTo>
-                    <a:pt x="766729" y="5938453"/>
-                  </a:lnTo>
-                  <a:cubicBezTo>
-                    <a:pt x="735941" y="5887947"/>
-                    <a:pt x="703878" y="5837581"/>
-                    <a:pt x="671672" y="5786648"/>
-                  </a:cubicBezTo>
-                  <a:lnTo>
-                    <a:pt x="474608" y="5474664"/>
-                  </a:lnTo>
-                  <a:cubicBezTo>
-                    <a:pt x="408778" y="5368968"/>
-                    <a:pt x="343516" y="5260008"/>
-                    <a:pt x="282652" y="5146508"/>
-                  </a:cubicBezTo>
-                  <a:cubicBezTo>
-                    <a:pt x="252290" y="5089759"/>
-                    <a:pt x="223065" y="5032015"/>
-                    <a:pt x="196108" y="4972712"/>
-                  </a:cubicBezTo>
-                  <a:cubicBezTo>
-                    <a:pt x="169152" y="4913408"/>
-                    <a:pt x="144607" y="4853111"/>
-                    <a:pt x="122474" y="4791821"/>
-                  </a:cubicBezTo>
-                  <a:cubicBezTo>
-                    <a:pt x="100342" y="4730532"/>
-                    <a:pt x="81757" y="4666830"/>
-                    <a:pt x="65724" y="4603129"/>
-                  </a:cubicBezTo>
-                  <a:cubicBezTo>
-                    <a:pt x="58205" y="4571064"/>
-                    <a:pt x="50828" y="4539143"/>
-                    <a:pt x="44727" y="4506937"/>
-                  </a:cubicBezTo>
-                  <a:lnTo>
-                    <a:pt x="35505" y="4458699"/>
-                  </a:lnTo>
-                  <a:lnTo>
-                    <a:pt x="27845" y="4410320"/>
-                  </a:lnTo>
-                  <a:cubicBezTo>
-                    <a:pt x="8635" y="4281881"/>
-                    <a:pt x="-661" y="4152150"/>
-                    <a:pt x="37" y="4022292"/>
-                  </a:cubicBezTo>
-                  <a:cubicBezTo>
-                    <a:pt x="712" y="3768592"/>
-                    <a:pt x="27094" y="3515615"/>
-                    <a:pt x="78777" y="3267236"/>
-                  </a:cubicBezTo>
-                  <a:cubicBezTo>
-                    <a:pt x="130048" y="3017876"/>
-                    <a:pt x="209439" y="2775142"/>
-                    <a:pt x="315424" y="2543673"/>
-                  </a:cubicBezTo>
-                  <a:cubicBezTo>
-                    <a:pt x="528236" y="2081161"/>
-                    <a:pt x="838234" y="1667312"/>
-                    <a:pt x="1202710" y="1314895"/>
-                  </a:cubicBezTo>
-                  <a:cubicBezTo>
-                    <a:pt x="1385514" y="1138814"/>
-                    <a:pt x="1582282" y="977831"/>
-                    <a:pt x="1791065" y="833514"/>
-                  </a:cubicBezTo>
-                  <a:cubicBezTo>
-                    <a:pt x="2420037" y="395614"/>
-                    <a:pt x="3147288" y="119557"/>
-                    <a:pt x="3908404" y="29794"/>
-                  </a:cubicBezTo>
-                  <a:cubicBezTo>
-                    <a:pt x="4098509" y="7429"/>
-                    <a:pt x="4289811" y="-2355"/>
-                    <a:pt x="4481066" y="478"/>
-                  </a:cubicBezTo>
-                  <a:close/>
-                </a:path>
-              </a:pathLst>
-            </a:custGeom>
-            <a:gradFill>
-              <a:gsLst>
-                <a:gs pos="2000">
-                  <a:schemeClr val="bg1">
-                    <a:alpha val="10000"/>
-                  </a:schemeClr>
-                </a:gs>
-                <a:gs pos="16000">
-                  <a:schemeClr val="accent6">
-                    <a:alpha val="10000"/>
-                  </a:schemeClr>
-                </a:gs>
-                <a:gs pos="100000">
-                  <a:schemeClr val="bg1">
-                    <a:alpha val="10000"/>
-                  </a:schemeClr>
-                </a:gs>
-                <a:gs pos="85000">
-                  <a:schemeClr val="accent1">
-                    <a:alpha val="10000"/>
-                  </a:schemeClr>
-                </a:gs>
-              </a:gsLst>
-              <a:lin ang="12000000" scaled="0"/>
-            </a:gradFill>
-            <a:ln>
-              <a:noFill/>
-            </a:ln>
-          </p:spPr>
-          <p:style>
-            <a:lnRef idx="2">
-              <a:schemeClr val="accent1">
-                <a:shade val="50000"/>
-              </a:schemeClr>
-            </a:lnRef>
-            <a:fillRef idx="1">
-              <a:schemeClr val="accent1"/>
-            </a:fillRef>
-            <a:effectRef idx="0">
-              <a:schemeClr val="accent1"/>
-            </a:effectRef>
-            <a:fontRef idx="minor">
-              <a:schemeClr val="lt1"/>
-            </a:fontRef>
-          </p:style>
-          <p:txBody>
-            <a:bodyPr rtlCol="0" anchor="ctr"/>
-            <a:lstStyle/>
-            <a:p>
-              <a:pPr algn="ctr"/>
-              <a:endParaRPr lang="en-US" dirty="0"/>
-            </a:p>
-          </p:txBody>
-        </p:sp>
-        <p:sp>
-          <p:nvSpPr>
-            <p:cNvPr id="16" name="Freeform: Shape 15">
-              <a:extLst>
-                <a:ext uri="{FF2B5EF4-FFF2-40B4-BE49-F238E27FC236}">
-                  <a16:creationId xmlns:a16="http://schemas.microsoft.com/office/drawing/2014/main" id="{C72F6EE6-EDE9-45A5-8F6D-02B9B7CB2C2F}"/>
-                </a:ext>
-                <a:ext uri="{C183D7F6-B498-43B3-948B-1728B52AA6E4}">
-                  <adec:decorative xmlns:adec="http://schemas.microsoft.com/office/drawing/2017/decorative" val="1"/>
-                </a:ext>
-              </a:extLst>
-            </p:cNvPr>
-            <p:cNvSpPr/>
-            <p:nvPr>
-              <p:extLst>
-                <p:ext uri="{386F3935-93C4-4BCD-93E2-E3B085C9AB24}">
-                  <p16:designElem xmlns:p16="http://schemas.microsoft.com/office/powerpoint/2015/main" val="1"/>
-                </p:ext>
-              </p:extLst>
-            </p:nvPr>
-          </p:nvSpPr>
-          <p:spPr>
-            <a:xfrm flipH="1">
-              <a:off x="305" y="1"/>
-              <a:ext cx="6165116" cy="6858001"/>
-            </a:xfrm>
-            <a:custGeom>
-              <a:avLst/>
-              <a:gdLst>
-                <a:gd name="connsiteX0" fmla="*/ 6264586 w 6264586"/>
-                <a:gd name="connsiteY0" fmla="*/ 6646464 h 6858001"/>
-                <a:gd name="connsiteX1" fmla="*/ 6264586 w 6264586"/>
-                <a:gd name="connsiteY1" fmla="*/ 6858001 h 6858001"/>
-                <a:gd name="connsiteX2" fmla="*/ 5997170 w 6264586"/>
-                <a:gd name="connsiteY2" fmla="*/ 6858001 h 6858001"/>
-                <a:gd name="connsiteX3" fmla="*/ 6121512 w 6264586"/>
-                <a:gd name="connsiteY3" fmla="*/ 6761029 h 6858001"/>
-                <a:gd name="connsiteX4" fmla="*/ 2693206 w 6264586"/>
-                <a:gd name="connsiteY4" fmla="*/ 0 h 6858001"/>
-                <a:gd name="connsiteX5" fmla="*/ 5872285 w 6264586"/>
-                <a:gd name="connsiteY5" fmla="*/ 0 h 6858001"/>
-                <a:gd name="connsiteX6" fmla="*/ 6024875 w 6264586"/>
-                <a:gd name="connsiteY6" fmla="*/ 68385 h 6858001"/>
-                <a:gd name="connsiteX7" fmla="*/ 6206432 w 6264586"/>
-                <a:gd name="connsiteY7" fmla="*/ 162336 h 6858001"/>
-                <a:gd name="connsiteX8" fmla="*/ 6264586 w 6264586"/>
-                <a:gd name="connsiteY8" fmla="*/ 196704 h 6858001"/>
-                <a:gd name="connsiteX9" fmla="*/ 6264586 w 6264586"/>
-                <a:gd name="connsiteY9" fmla="*/ 537242 h 6858001"/>
-                <a:gd name="connsiteX10" fmla="*/ 6230189 w 6264586"/>
-                <a:gd name="connsiteY10" fmla="*/ 517260 h 6858001"/>
-                <a:gd name="connsiteX11" fmla="*/ 5540536 w 6264586"/>
-                <a:gd name="connsiteY11" fmla="*/ 249543 h 6858001"/>
-                <a:gd name="connsiteX12" fmla="*/ 5178896 w 6264586"/>
-                <a:gd name="connsiteY12" fmla="*/ 178606 h 6858001"/>
-                <a:gd name="connsiteX13" fmla="*/ 4814279 w 6264586"/>
-                <a:gd name="connsiteY13" fmla="*/ 146683 h 6858001"/>
-                <a:gd name="connsiteX14" fmla="*/ 4655095 w 6264586"/>
-                <a:gd name="connsiteY14" fmla="*/ 143421 h 6858001"/>
-                <a:gd name="connsiteX15" fmla="*/ 4081069 w 6264586"/>
-                <a:gd name="connsiteY15" fmla="*/ 185983 h 6858001"/>
-                <a:gd name="connsiteX16" fmla="*/ 3720566 w 6264586"/>
-                <a:gd name="connsiteY16" fmla="*/ 256921 h 6858001"/>
-                <a:gd name="connsiteX17" fmla="*/ 3365879 w 6264586"/>
-                <a:gd name="connsiteY17" fmla="*/ 357651 h 6858001"/>
-                <a:gd name="connsiteX18" fmla="*/ 3020555 w 6264586"/>
-                <a:gd name="connsiteY18" fmla="*/ 486190 h 6858001"/>
-                <a:gd name="connsiteX19" fmla="*/ 2685163 w 6264586"/>
-                <a:gd name="connsiteY19" fmla="*/ 641542 h 6858001"/>
-                <a:gd name="connsiteX20" fmla="*/ 2047720 w 6264586"/>
-                <a:gd name="connsiteY20" fmla="*/ 1025030 h 6858001"/>
-                <a:gd name="connsiteX21" fmla="*/ 1897333 w 6264586"/>
-                <a:gd name="connsiteY21" fmla="*/ 1134983 h 6858001"/>
-                <a:gd name="connsiteX22" fmla="*/ 1835758 w 6264586"/>
-                <a:gd name="connsiteY22" fmla="*/ 1182227 h 6858001"/>
-                <a:gd name="connsiteX23" fmla="*/ 1823273 w 6264586"/>
-                <a:gd name="connsiteY23" fmla="*/ 1192016 h 6858001"/>
-                <a:gd name="connsiteX24" fmla="*/ 1750918 w 6264586"/>
-                <a:gd name="connsiteY24" fmla="*/ 1249760 h 6858001"/>
-                <a:gd name="connsiteX25" fmla="*/ 1469297 w 6264586"/>
-                <a:gd name="connsiteY25" fmla="*/ 1496906 h 6858001"/>
-                <a:gd name="connsiteX26" fmla="*/ 967769 w 6264586"/>
-                <a:gd name="connsiteY26" fmla="*/ 2056602 h 6858001"/>
-                <a:gd name="connsiteX27" fmla="*/ 754105 w 6264586"/>
-                <a:gd name="connsiteY27" fmla="*/ 2368727 h 6858001"/>
-                <a:gd name="connsiteX28" fmla="*/ 572364 w 6264586"/>
-                <a:gd name="connsiteY28" fmla="*/ 2701140 h 6858001"/>
-                <a:gd name="connsiteX29" fmla="*/ 532497 w 6264586"/>
-                <a:gd name="connsiteY29" fmla="*/ 2786265 h 6858001"/>
-                <a:gd name="connsiteX30" fmla="*/ 512918 w 6264586"/>
-                <a:gd name="connsiteY30" fmla="*/ 2828827 h 6858001"/>
-                <a:gd name="connsiteX31" fmla="*/ 494475 w 6264586"/>
-                <a:gd name="connsiteY31" fmla="*/ 2872240 h 6858001"/>
-                <a:gd name="connsiteX32" fmla="*/ 491637 w 6264586"/>
-                <a:gd name="connsiteY32" fmla="*/ 2878908 h 6858001"/>
-                <a:gd name="connsiteX33" fmla="*/ 459290 w 6264586"/>
-                <a:gd name="connsiteY33" fmla="*/ 2959635 h 6858001"/>
-                <a:gd name="connsiteX34" fmla="*/ 446805 w 6264586"/>
-                <a:gd name="connsiteY34" fmla="*/ 2992408 h 6858001"/>
-                <a:gd name="connsiteX35" fmla="*/ 426090 w 6264586"/>
-                <a:gd name="connsiteY35" fmla="*/ 3049158 h 6858001"/>
-                <a:gd name="connsiteX36" fmla="*/ 426090 w 6264586"/>
-                <a:gd name="connsiteY36" fmla="*/ 3049867 h 6858001"/>
-                <a:gd name="connsiteX37" fmla="*/ 318124 w 6264586"/>
-                <a:gd name="connsiteY37" fmla="*/ 3414202 h 6858001"/>
-                <a:gd name="connsiteX38" fmla="*/ 230729 w 6264586"/>
-                <a:gd name="connsiteY38" fmla="*/ 4169260 h 6858001"/>
-                <a:gd name="connsiteX39" fmla="*/ 268893 w 6264586"/>
-                <a:gd name="connsiteY39" fmla="*/ 4544236 h 6858001"/>
-                <a:gd name="connsiteX40" fmla="*/ 379840 w 6264586"/>
-                <a:gd name="connsiteY40" fmla="*/ 4900056 h 6858001"/>
-                <a:gd name="connsiteX41" fmla="*/ 406512 w 6264586"/>
-                <a:gd name="connsiteY41" fmla="*/ 4960211 h 6858001"/>
-                <a:gd name="connsiteX42" fmla="*/ 417862 w 6264586"/>
-                <a:gd name="connsiteY42" fmla="*/ 4984613 h 6858001"/>
-                <a:gd name="connsiteX43" fmla="*/ 428077 w 6264586"/>
-                <a:gd name="connsiteY43" fmla="*/ 5005043 h 6858001"/>
-                <a:gd name="connsiteX44" fmla="*/ 460140 w 6264586"/>
-                <a:gd name="connsiteY44" fmla="*/ 5067327 h 6858001"/>
-                <a:gd name="connsiteX45" fmla="*/ 555197 w 6264586"/>
-                <a:gd name="connsiteY45" fmla="*/ 5229773 h 6858001"/>
-                <a:gd name="connsiteX46" fmla="*/ 660611 w 6264586"/>
-                <a:gd name="connsiteY46" fmla="*/ 5387396 h 6858001"/>
-                <a:gd name="connsiteX47" fmla="*/ 774110 w 6264586"/>
-                <a:gd name="connsiteY47" fmla="*/ 5542182 h 6858001"/>
-                <a:gd name="connsiteX48" fmla="*/ 917829 w 6264586"/>
-                <a:gd name="connsiteY48" fmla="*/ 5727896 h 6858001"/>
-                <a:gd name="connsiteX49" fmla="*/ 1012885 w 6264586"/>
-                <a:gd name="connsiteY49" fmla="*/ 5849767 h 6858001"/>
-                <a:gd name="connsiteX50" fmla="*/ 1133053 w 6264586"/>
-                <a:gd name="connsiteY50" fmla="*/ 6006822 h 6858001"/>
-                <a:gd name="connsiteX51" fmla="*/ 1194343 w 6264586"/>
-                <a:gd name="connsiteY51" fmla="*/ 6090245 h 6858001"/>
-                <a:gd name="connsiteX52" fmla="*/ 1249390 w 6264586"/>
-                <a:gd name="connsiteY52" fmla="*/ 6165155 h 6858001"/>
-                <a:gd name="connsiteX53" fmla="*/ 1345724 w 6264586"/>
-                <a:gd name="connsiteY53" fmla="*/ 6292132 h 6858001"/>
-                <a:gd name="connsiteX54" fmla="*/ 1364310 w 6264586"/>
-                <a:gd name="connsiteY54" fmla="*/ 6316251 h 6858001"/>
-                <a:gd name="connsiteX55" fmla="*/ 1373673 w 6264586"/>
-                <a:gd name="connsiteY55" fmla="*/ 6327885 h 6858001"/>
-                <a:gd name="connsiteX56" fmla="*/ 1484619 w 6264586"/>
-                <a:gd name="connsiteY56" fmla="*/ 6462240 h 6858001"/>
-                <a:gd name="connsiteX57" fmla="*/ 1739000 w 6264586"/>
-                <a:gd name="connsiteY57" fmla="*/ 6737335 h 6858001"/>
-                <a:gd name="connsiteX58" fmla="*/ 1866801 w 6264586"/>
-                <a:gd name="connsiteY58" fmla="*/ 6858001 h 6858001"/>
-                <a:gd name="connsiteX59" fmla="*/ 1144149 w 6264586"/>
-                <a:gd name="connsiteY59" fmla="*/ 6858001 h 6858001"/>
-                <a:gd name="connsiteX60" fmla="*/ 1058349 w 6264586"/>
-                <a:gd name="connsiteY60" fmla="*/ 6766452 h 6858001"/>
-                <a:gd name="connsiteX61" fmla="*/ 580309 w 6264586"/>
-                <a:gd name="connsiteY61" fmla="*/ 6105000 h 6858001"/>
-                <a:gd name="connsiteX62" fmla="*/ 1 w 6264586"/>
-                <a:gd name="connsiteY62" fmla="*/ 3960094 h 6858001"/>
-                <a:gd name="connsiteX63" fmla="*/ 2599292 w 6264586"/>
-                <a:gd name="connsiteY63" fmla="*/ 37050 h 6858001"/>
-              </a:gdLst>
-              <a:ahLst/>
-              <a:cxnLst>
-                <a:cxn ang="0">
-                  <a:pos x="connsiteX0" y="connsiteY0"/>
-                </a:cxn>
-                <a:cxn ang="0">
-                  <a:pos x="connsiteX1" y="connsiteY1"/>
-                </a:cxn>
-                <a:cxn ang="0">
-                  <a:pos x="connsiteX2" y="connsiteY2"/>
-                </a:cxn>
-                <a:cxn ang="0">
-                  <a:pos x="connsiteX3" y="connsiteY3"/>
-                </a:cxn>
-                <a:cxn ang="0">
-                  <a:pos x="connsiteX4" y="connsiteY4"/>
-                </a:cxn>
-                <a:cxn ang="0">
-                  <a:pos x="connsiteX5" y="connsiteY5"/>
-                </a:cxn>
-                <a:cxn ang="0">
-                  <a:pos x="connsiteX6" y="connsiteY6"/>
-                </a:cxn>
-                <a:cxn ang="0">
-                  <a:pos x="connsiteX7" y="connsiteY7"/>
-                </a:cxn>
-                <a:cxn ang="0">
-                  <a:pos x="connsiteX8" y="connsiteY8"/>
-                </a:cxn>
-                <a:cxn ang="0">
-                  <a:pos x="connsiteX9" y="connsiteY9"/>
-                </a:cxn>
-                <a:cxn ang="0">
-                  <a:pos x="connsiteX10" y="connsiteY10"/>
-                </a:cxn>
-                <a:cxn ang="0">
-                  <a:pos x="connsiteX11" y="connsiteY11"/>
-                </a:cxn>
-                <a:cxn ang="0">
-                  <a:pos x="connsiteX12" y="connsiteY12"/>
-                </a:cxn>
-                <a:cxn ang="0">
-                  <a:pos x="connsiteX13" y="connsiteY13"/>
-                </a:cxn>
-                <a:cxn ang="0">
-                  <a:pos x="connsiteX14" y="connsiteY14"/>
-                </a:cxn>
-                <a:cxn ang="0">
-                  <a:pos x="connsiteX15" y="connsiteY15"/>
-                </a:cxn>
-                <a:cxn ang="0">
-                  <a:pos x="connsiteX16" y="connsiteY16"/>
-                </a:cxn>
-                <a:cxn ang="0">
-                  <a:pos x="connsiteX17" y="connsiteY17"/>
-                </a:cxn>
-                <a:cxn ang="0">
-                  <a:pos x="connsiteX18" y="connsiteY18"/>
-                </a:cxn>
-                <a:cxn ang="0">
-                  <a:pos x="connsiteX19" y="connsiteY19"/>
-                </a:cxn>
-                <a:cxn ang="0">
-                  <a:pos x="connsiteX20" y="connsiteY20"/>
-                </a:cxn>
-                <a:cxn ang="0">
-                  <a:pos x="connsiteX21" y="connsiteY21"/>
-                </a:cxn>
-                <a:cxn ang="0">
-                  <a:pos x="connsiteX22" y="connsiteY22"/>
-                </a:cxn>
-                <a:cxn ang="0">
-                  <a:pos x="connsiteX23" y="connsiteY23"/>
-                </a:cxn>
-                <a:cxn ang="0">
-                  <a:pos x="connsiteX24" y="connsiteY24"/>
-                </a:cxn>
-                <a:cxn ang="0">
-                  <a:pos x="connsiteX25" y="connsiteY25"/>
-                </a:cxn>
-                <a:cxn ang="0">
-                  <a:pos x="connsiteX26" y="connsiteY26"/>
-                </a:cxn>
-                <a:cxn ang="0">
-                  <a:pos x="connsiteX27" y="connsiteY27"/>
-                </a:cxn>
-                <a:cxn ang="0">
-                  <a:pos x="connsiteX28" y="connsiteY28"/>
-                </a:cxn>
-                <a:cxn ang="0">
-                  <a:pos x="connsiteX29" y="connsiteY29"/>
-                </a:cxn>
-                <a:cxn ang="0">
-                  <a:pos x="connsiteX30" y="connsiteY30"/>
-                </a:cxn>
-                <a:cxn ang="0">
-                  <a:pos x="connsiteX31" y="connsiteY31"/>
-                </a:cxn>
-                <a:cxn ang="0">
-                  <a:pos x="connsiteX32" y="connsiteY32"/>
-                </a:cxn>
-                <a:cxn ang="0">
-                  <a:pos x="connsiteX33" y="connsiteY33"/>
-                </a:cxn>
-                <a:cxn ang="0">
-                  <a:pos x="connsiteX34" y="connsiteY34"/>
-                </a:cxn>
-                <a:cxn ang="0">
-                  <a:pos x="connsiteX35" y="connsiteY35"/>
-                </a:cxn>
-                <a:cxn ang="0">
-                  <a:pos x="connsiteX36" y="connsiteY36"/>
-                </a:cxn>
-                <a:cxn ang="0">
-                  <a:pos x="connsiteX37" y="connsiteY37"/>
-                </a:cxn>
-                <a:cxn ang="0">
-                  <a:pos x="connsiteX38" y="connsiteY38"/>
-                </a:cxn>
-                <a:cxn ang="0">
-                  <a:pos x="connsiteX39" y="connsiteY39"/>
-                </a:cxn>
-                <a:cxn ang="0">
-                  <a:pos x="connsiteX40" y="connsiteY40"/>
-                </a:cxn>
-                <a:cxn ang="0">
-                  <a:pos x="connsiteX41" y="connsiteY41"/>
-                </a:cxn>
-                <a:cxn ang="0">
-                  <a:pos x="connsiteX42" y="connsiteY42"/>
-                </a:cxn>
-                <a:cxn ang="0">
-                  <a:pos x="connsiteX43" y="connsiteY43"/>
-                </a:cxn>
-                <a:cxn ang="0">
-                  <a:pos x="connsiteX44" y="connsiteY44"/>
-                </a:cxn>
-                <a:cxn ang="0">
-                  <a:pos x="connsiteX45" y="connsiteY45"/>
-                </a:cxn>
-                <a:cxn ang="0">
-                  <a:pos x="connsiteX46" y="connsiteY46"/>
-                </a:cxn>
-                <a:cxn ang="0">
-                  <a:pos x="connsiteX47" y="connsiteY47"/>
-                </a:cxn>
-                <a:cxn ang="0">
-                  <a:pos x="connsiteX48" y="connsiteY48"/>
-                </a:cxn>
-                <a:cxn ang="0">
-                  <a:pos x="connsiteX49" y="connsiteY49"/>
-                </a:cxn>
-                <a:cxn ang="0">
-                  <a:pos x="connsiteX50" y="connsiteY50"/>
-                </a:cxn>
-                <a:cxn ang="0">
-                  <a:pos x="connsiteX51" y="connsiteY51"/>
-                </a:cxn>
-                <a:cxn ang="0">
-                  <a:pos x="connsiteX52" y="connsiteY52"/>
-                </a:cxn>
-                <a:cxn ang="0">
-                  <a:pos x="connsiteX53" y="connsiteY53"/>
-                </a:cxn>
-                <a:cxn ang="0">
-                  <a:pos x="connsiteX54" y="connsiteY54"/>
-                </a:cxn>
-                <a:cxn ang="0">
-                  <a:pos x="connsiteX55" y="connsiteY55"/>
-                </a:cxn>
-                <a:cxn ang="0">
-                  <a:pos x="connsiteX56" y="connsiteY56"/>
-                </a:cxn>
-                <a:cxn ang="0">
-                  <a:pos x="connsiteX57" y="connsiteY57"/>
-                </a:cxn>
-                <a:cxn ang="0">
-                  <a:pos x="connsiteX58" y="connsiteY58"/>
-                </a:cxn>
-                <a:cxn ang="0">
-                  <a:pos x="connsiteX59" y="connsiteY59"/>
-                </a:cxn>
-                <a:cxn ang="0">
-                  <a:pos x="connsiteX60" y="connsiteY60"/>
-                </a:cxn>
-                <a:cxn ang="0">
-                  <a:pos x="connsiteX61" y="connsiteY61"/>
-                </a:cxn>
-                <a:cxn ang="0">
-                  <a:pos x="connsiteX62" y="connsiteY62"/>
-                </a:cxn>
-                <a:cxn ang="0">
-                  <a:pos x="connsiteX63" y="connsiteY63"/>
-                </a:cxn>
-              </a:cxnLst>
-              <a:rect l="l" t="t" r="r" b="b"/>
-              <a:pathLst>
-                <a:path w="6264586" h="6858001">
-                  <a:moveTo>
-                    <a:pt x="6264586" y="6646464"/>
-                  </a:moveTo>
-                  <a:lnTo>
-                    <a:pt x="6264586" y="6858001"/>
-                  </a:lnTo>
-                  <a:lnTo>
-                    <a:pt x="5997170" y="6858001"/>
-                  </a:lnTo>
-                  <a:lnTo>
-                    <a:pt x="6121512" y="6761029"/>
-                  </a:lnTo>
-                  <a:close/>
-                  <a:moveTo>
-                    <a:pt x="2693206" y="0"/>
-                  </a:moveTo>
-                  <a:lnTo>
-                    <a:pt x="5872285" y="0"/>
-                  </a:lnTo>
-                  <a:lnTo>
-                    <a:pt x="6024875" y="68385"/>
-                  </a:lnTo>
-                  <a:cubicBezTo>
-                    <a:pt x="6086250" y="97989"/>
-                    <a:pt x="6146793" y="129318"/>
-                    <a:pt x="6206432" y="162336"/>
-                  </a:cubicBezTo>
-                  <a:lnTo>
-                    <a:pt x="6264586" y="196704"/>
-                  </a:lnTo>
-                  <a:lnTo>
-                    <a:pt x="6264586" y="537242"/>
-                  </a:lnTo>
-                  <a:lnTo>
-                    <a:pt x="6230189" y="517260"/>
-                  </a:lnTo>
-                  <a:cubicBezTo>
-                    <a:pt x="6012226" y="399931"/>
-                    <a:pt x="5780573" y="310008"/>
-                    <a:pt x="5540536" y="249543"/>
-                  </a:cubicBezTo>
-                  <a:cubicBezTo>
-                    <a:pt x="5421375" y="219324"/>
-                    <a:pt x="5300641" y="195644"/>
-                    <a:pt x="5178896" y="178606"/>
-                  </a:cubicBezTo>
-                  <a:cubicBezTo>
-                    <a:pt x="5057977" y="161840"/>
-                    <a:pt x="4936276" y="151186"/>
-                    <a:pt x="4814279" y="146683"/>
-                  </a:cubicBezTo>
-                  <a:cubicBezTo>
-                    <a:pt x="4761501" y="144556"/>
-                    <a:pt x="4708015" y="143421"/>
-                    <a:pt x="4655095" y="143421"/>
-                  </a:cubicBezTo>
-                  <a:cubicBezTo>
-                    <a:pt x="4462968" y="143573"/>
-                    <a:pt x="4271111" y="157799"/>
-                    <a:pt x="4081069" y="185983"/>
-                  </a:cubicBezTo>
-                  <a:cubicBezTo>
-                    <a:pt x="3956361" y="205703"/>
-                    <a:pt x="3835058" y="229396"/>
-                    <a:pt x="3720566" y="256921"/>
-                  </a:cubicBezTo>
-                  <a:cubicBezTo>
-                    <a:pt x="3596708" y="286714"/>
-                    <a:pt x="3477677" y="320905"/>
-                    <a:pt x="3365879" y="357651"/>
-                  </a:cubicBezTo>
-                  <a:cubicBezTo>
-                    <a:pt x="3249257" y="395958"/>
-                    <a:pt x="3133487" y="438945"/>
-                    <a:pt x="3020555" y="486190"/>
-                  </a:cubicBezTo>
-                  <a:cubicBezTo>
-                    <a:pt x="2907623" y="533434"/>
-                    <a:pt x="2794832" y="585786"/>
-                    <a:pt x="2685163" y="641542"/>
-                  </a:cubicBezTo>
-                  <a:cubicBezTo>
-                    <a:pt x="2463995" y="754348"/>
-                    <a:pt x="2250998" y="882488"/>
-                    <a:pt x="2047720" y="1025030"/>
-                  </a:cubicBezTo>
-                  <a:cubicBezTo>
-                    <a:pt x="2006151" y="1054399"/>
-                    <a:pt x="1951528" y="1093415"/>
-                    <a:pt x="1897333" y="1134983"/>
-                  </a:cubicBezTo>
-                  <a:cubicBezTo>
-                    <a:pt x="1876761" y="1150164"/>
-                    <a:pt x="1855905" y="1166479"/>
-                    <a:pt x="1835758" y="1182227"/>
-                  </a:cubicBezTo>
-                  <a:lnTo>
-                    <a:pt x="1823273" y="1192016"/>
-                  </a:lnTo>
-                  <a:cubicBezTo>
-                    <a:pt x="1797027" y="1211879"/>
-                    <a:pt x="1772057" y="1232309"/>
-                    <a:pt x="1750918" y="1249760"/>
-                  </a:cubicBezTo>
-                  <a:cubicBezTo>
-                    <a:pt x="1645931" y="1335737"/>
-                    <a:pt x="1554422" y="1416605"/>
-                    <a:pt x="1469297" y="1496906"/>
-                  </a:cubicBezTo>
-                  <a:cubicBezTo>
-                    <a:pt x="1286595" y="1668957"/>
-                    <a:pt x="1118818" y="1856190"/>
-                    <a:pt x="967769" y="2056602"/>
-                  </a:cubicBezTo>
-                  <a:cubicBezTo>
-                    <a:pt x="890731" y="2159603"/>
-                    <a:pt x="818800" y="2264590"/>
-                    <a:pt x="754105" y="2368727"/>
-                  </a:cubicBezTo>
-                  <a:cubicBezTo>
-                    <a:pt x="681749" y="2488328"/>
-                    <a:pt x="622304" y="2596720"/>
-                    <a:pt x="572364" y="2701140"/>
-                  </a:cubicBezTo>
-                  <a:cubicBezTo>
-                    <a:pt x="557609" y="2730507"/>
-                    <a:pt x="543989" y="2760443"/>
-                    <a:pt x="532497" y="2786265"/>
-                  </a:cubicBezTo>
-                  <a:lnTo>
-                    <a:pt x="512918" y="2828827"/>
-                  </a:lnTo>
-                  <a:lnTo>
-                    <a:pt x="494475" y="2872240"/>
-                  </a:lnTo>
-                  <a:lnTo>
-                    <a:pt x="491637" y="2878908"/>
-                  </a:lnTo>
-                  <a:cubicBezTo>
-                    <a:pt x="480146" y="2906575"/>
-                    <a:pt x="469220" y="2932821"/>
-                    <a:pt x="459290" y="2959635"/>
-                  </a:cubicBezTo>
-                  <a:cubicBezTo>
-                    <a:pt x="455176" y="2970559"/>
-                    <a:pt x="451060" y="2981484"/>
-                    <a:pt x="446805" y="2992408"/>
-                  </a:cubicBezTo>
-                  <a:cubicBezTo>
-                    <a:pt x="439427" y="3012412"/>
-                    <a:pt x="432333" y="3030572"/>
-                    <a:pt x="426090" y="3049158"/>
-                  </a:cubicBezTo>
-                  <a:lnTo>
-                    <a:pt x="426090" y="3049867"/>
-                  </a:lnTo>
-                  <a:cubicBezTo>
-                    <a:pt x="383010" y="3169099"/>
-                    <a:pt x="346959" y="3290756"/>
-                    <a:pt x="318124" y="3414202"/>
-                  </a:cubicBezTo>
-                  <a:cubicBezTo>
-                    <a:pt x="260107" y="3661703"/>
-                    <a:pt x="230780" y="3915049"/>
-                    <a:pt x="230729" y="4169260"/>
-                  </a:cubicBezTo>
-                  <a:cubicBezTo>
-                    <a:pt x="231621" y="4295173"/>
-                    <a:pt x="244398" y="4420719"/>
-                    <a:pt x="268893" y="4544236"/>
-                  </a:cubicBezTo>
-                  <a:cubicBezTo>
-                    <a:pt x="293708" y="4666304"/>
-                    <a:pt x="330882" y="4785521"/>
-                    <a:pt x="379840" y="4900056"/>
-                  </a:cubicBezTo>
-                  <a:cubicBezTo>
-                    <a:pt x="387926" y="4919919"/>
-                    <a:pt x="397006" y="4939498"/>
-                    <a:pt x="406512" y="4960211"/>
-                  </a:cubicBezTo>
-                  <a:cubicBezTo>
-                    <a:pt x="410343" y="4968299"/>
-                    <a:pt x="414173" y="4976385"/>
-                    <a:pt x="417862" y="4984613"/>
-                  </a:cubicBezTo>
-                  <a:lnTo>
-                    <a:pt x="428077" y="5005043"/>
-                  </a:lnTo>
-                  <a:cubicBezTo>
-                    <a:pt x="438860" y="5026751"/>
-                    <a:pt x="449075" y="5047181"/>
-                    <a:pt x="460140" y="5067327"/>
-                  </a:cubicBezTo>
-                  <a:cubicBezTo>
-                    <a:pt x="485536" y="5116273"/>
-                    <a:pt x="514763" y="5165789"/>
-                    <a:pt x="555197" y="5229773"/>
-                  </a:cubicBezTo>
-                  <a:cubicBezTo>
-                    <a:pt x="586836" y="5280282"/>
-                    <a:pt x="620318" y="5329511"/>
-                    <a:pt x="660611" y="5387396"/>
-                  </a:cubicBezTo>
-                  <a:cubicBezTo>
-                    <a:pt x="698065" y="5440741"/>
-                    <a:pt x="737223" y="5493094"/>
-                    <a:pt x="774110" y="5542182"/>
-                  </a:cubicBezTo>
-                  <a:cubicBezTo>
-                    <a:pt x="821070" y="5604324"/>
-                    <a:pt x="870301" y="5667173"/>
-                    <a:pt x="917829" y="5727896"/>
-                  </a:cubicBezTo>
-                  <a:cubicBezTo>
-                    <a:pt x="949042" y="5767762"/>
-                    <a:pt x="979828" y="5807063"/>
-                    <a:pt x="1012885" y="5849767"/>
-                  </a:cubicBezTo>
-                  <a:cubicBezTo>
-                    <a:pt x="1045942" y="5892471"/>
-                    <a:pt x="1089497" y="5948796"/>
-                    <a:pt x="1133053" y="6006822"/>
-                  </a:cubicBezTo>
-                  <a:cubicBezTo>
-                    <a:pt x="1153624" y="6034345"/>
-                    <a:pt x="1175332" y="6063998"/>
-                    <a:pt x="1194343" y="6090245"/>
-                  </a:cubicBezTo>
-                  <a:cubicBezTo>
-                    <a:pt x="1213355" y="6116491"/>
-                    <a:pt x="1231372" y="6141178"/>
-                    <a:pt x="1249390" y="6165155"/>
-                  </a:cubicBezTo>
-                  <a:cubicBezTo>
-                    <a:pt x="1280461" y="6208000"/>
-                    <a:pt x="1313659" y="6250847"/>
-                    <a:pt x="1345724" y="6292132"/>
-                  </a:cubicBezTo>
-                  <a:lnTo>
-                    <a:pt x="1364310" y="6316251"/>
-                  </a:lnTo>
-                  <a:lnTo>
-                    <a:pt x="1373673" y="6327885"/>
-                  </a:lnTo>
-                  <a:cubicBezTo>
-                    <a:pt x="1409566" y="6372433"/>
-                    <a:pt x="1446738" y="6418542"/>
-                    <a:pt x="1484619" y="6462240"/>
-                  </a:cubicBezTo>
-                  <a:cubicBezTo>
-                    <a:pt x="1567899" y="6559850"/>
-                    <a:pt x="1653876" y="6652211"/>
-                    <a:pt x="1739000" y="6737335"/>
-                  </a:cubicBezTo>
-                  <a:lnTo>
-                    <a:pt x="1866801" y="6858001"/>
-                  </a:lnTo>
-                  <a:lnTo>
-                    <a:pt x="1144149" y="6858001"/>
-                  </a:lnTo>
-                  <a:lnTo>
-                    <a:pt x="1058349" y="6766452"/>
-                  </a:lnTo>
-                  <a:cubicBezTo>
-                    <a:pt x="878978" y="6562465"/>
-                    <a:pt x="718756" y="6341104"/>
-                    <a:pt x="580309" y="6105000"/>
-                  </a:cubicBezTo>
-                  <a:cubicBezTo>
-                    <a:pt x="200401" y="5454007"/>
-                    <a:pt x="146" y="4713831"/>
-                    <a:pt x="1" y="3960094"/>
-                  </a:cubicBezTo>
-                  <a:cubicBezTo>
-                    <a:pt x="-335" y="2196754"/>
-                    <a:pt x="1071479" y="683605"/>
-                    <a:pt x="2599292" y="37050"/>
-                  </a:cubicBezTo>
-                  <a:close/>
-                </a:path>
-              </a:pathLst>
-            </a:custGeom>
-            <a:gradFill>
-              <a:gsLst>
-                <a:gs pos="2000">
-                  <a:schemeClr val="bg1">
-                    <a:alpha val="10000"/>
-                  </a:schemeClr>
-                </a:gs>
-                <a:gs pos="16000">
-                  <a:schemeClr val="accent6">
-                    <a:alpha val="10000"/>
-                  </a:schemeClr>
-                </a:gs>
-                <a:gs pos="100000">
-                  <a:schemeClr val="bg1">
-                    <a:alpha val="10000"/>
-                  </a:schemeClr>
-                </a:gs>
-                <a:gs pos="85000">
-                  <a:schemeClr val="accent1">
-                    <a:alpha val="10000"/>
-                  </a:schemeClr>
-                </a:gs>
-              </a:gsLst>
-              <a:lin ang="12000000" scaled="0"/>
-            </a:gradFill>
-            <a:ln>
-              <a:noFill/>
-            </a:ln>
-          </p:spPr>
-          <p:style>
-            <a:lnRef idx="2">
-              <a:schemeClr val="accent1">
-                <a:shade val="50000"/>
-              </a:schemeClr>
-            </a:lnRef>
-            <a:fillRef idx="1">
-              <a:schemeClr val="accent1"/>
-            </a:fillRef>
-            <a:effectRef idx="0">
-              <a:schemeClr val="accent1"/>
-            </a:effectRef>
-            <a:fontRef idx="minor">
-              <a:schemeClr val="lt1"/>
-            </a:fontRef>
-          </p:style>
-          <p:txBody>
-            <a:bodyPr rtlCol="0" anchor="ctr"/>
-            <a:lstStyle/>
-            <a:p>
-              <a:pPr algn="ctr"/>
-              <a:endParaRPr lang="en-US" dirty="0"/>
-            </a:p>
-          </p:txBody>
-        </p:sp>
-        <p:sp>
-          <p:nvSpPr>
-            <p:cNvPr id="17" name="Freeform: Shape 16">
-              <a:extLst>
-                <a:ext uri="{FF2B5EF4-FFF2-40B4-BE49-F238E27FC236}">
-                  <a16:creationId xmlns:a16="http://schemas.microsoft.com/office/drawing/2014/main" id="{C093DC50-3BD7-46B1-A300-CD207E152FF4}"/>
-                </a:ext>
-                <a:ext uri="{C183D7F6-B498-43B3-948B-1728B52AA6E4}">
-                  <adec:decorative xmlns:adec="http://schemas.microsoft.com/office/drawing/2017/decorative" val="1"/>
-                </a:ext>
-              </a:extLst>
-            </p:cNvPr>
-            <p:cNvSpPr/>
-            <p:nvPr>
-              <p:extLst>
-                <p:ext uri="{386F3935-93C4-4BCD-93E2-E3B085C9AB24}">
-                  <p16:designElem xmlns:p16="http://schemas.microsoft.com/office/powerpoint/2015/main" val="1"/>
-                </p:ext>
-              </p:extLst>
-            </p:nvPr>
-          </p:nvSpPr>
-          <p:spPr>
-            <a:xfrm flipH="1">
-              <a:off x="305" y="-5977"/>
-              <a:ext cx="6238675" cy="6858001"/>
-            </a:xfrm>
-            <a:custGeom>
-              <a:avLst/>
-              <a:gdLst>
-                <a:gd name="connsiteX0" fmla="*/ 6264586 w 6264586"/>
-                <a:gd name="connsiteY0" fmla="*/ 6646464 h 6858001"/>
-                <a:gd name="connsiteX1" fmla="*/ 6264586 w 6264586"/>
-                <a:gd name="connsiteY1" fmla="*/ 6858001 h 6858001"/>
-                <a:gd name="connsiteX2" fmla="*/ 5997170 w 6264586"/>
-                <a:gd name="connsiteY2" fmla="*/ 6858001 h 6858001"/>
-                <a:gd name="connsiteX3" fmla="*/ 6121512 w 6264586"/>
-                <a:gd name="connsiteY3" fmla="*/ 6761029 h 6858001"/>
-                <a:gd name="connsiteX4" fmla="*/ 2693206 w 6264586"/>
-                <a:gd name="connsiteY4" fmla="*/ 0 h 6858001"/>
-                <a:gd name="connsiteX5" fmla="*/ 5872285 w 6264586"/>
-                <a:gd name="connsiteY5" fmla="*/ 0 h 6858001"/>
-                <a:gd name="connsiteX6" fmla="*/ 6024875 w 6264586"/>
-                <a:gd name="connsiteY6" fmla="*/ 68385 h 6858001"/>
-                <a:gd name="connsiteX7" fmla="*/ 6206432 w 6264586"/>
-                <a:gd name="connsiteY7" fmla="*/ 162336 h 6858001"/>
-                <a:gd name="connsiteX8" fmla="*/ 6264586 w 6264586"/>
-                <a:gd name="connsiteY8" fmla="*/ 196704 h 6858001"/>
-                <a:gd name="connsiteX9" fmla="*/ 6264586 w 6264586"/>
-                <a:gd name="connsiteY9" fmla="*/ 537242 h 6858001"/>
-                <a:gd name="connsiteX10" fmla="*/ 6230189 w 6264586"/>
-                <a:gd name="connsiteY10" fmla="*/ 517260 h 6858001"/>
-                <a:gd name="connsiteX11" fmla="*/ 5540536 w 6264586"/>
-                <a:gd name="connsiteY11" fmla="*/ 249543 h 6858001"/>
-                <a:gd name="connsiteX12" fmla="*/ 5178896 w 6264586"/>
-                <a:gd name="connsiteY12" fmla="*/ 178606 h 6858001"/>
-                <a:gd name="connsiteX13" fmla="*/ 4814279 w 6264586"/>
-                <a:gd name="connsiteY13" fmla="*/ 146683 h 6858001"/>
-                <a:gd name="connsiteX14" fmla="*/ 4655095 w 6264586"/>
-                <a:gd name="connsiteY14" fmla="*/ 143421 h 6858001"/>
-                <a:gd name="connsiteX15" fmla="*/ 4081069 w 6264586"/>
-                <a:gd name="connsiteY15" fmla="*/ 185983 h 6858001"/>
-                <a:gd name="connsiteX16" fmla="*/ 3720566 w 6264586"/>
-                <a:gd name="connsiteY16" fmla="*/ 256921 h 6858001"/>
-                <a:gd name="connsiteX17" fmla="*/ 3365879 w 6264586"/>
-                <a:gd name="connsiteY17" fmla="*/ 357651 h 6858001"/>
-                <a:gd name="connsiteX18" fmla="*/ 3020555 w 6264586"/>
-                <a:gd name="connsiteY18" fmla="*/ 486190 h 6858001"/>
-                <a:gd name="connsiteX19" fmla="*/ 2685163 w 6264586"/>
-                <a:gd name="connsiteY19" fmla="*/ 641542 h 6858001"/>
-                <a:gd name="connsiteX20" fmla="*/ 2047720 w 6264586"/>
-                <a:gd name="connsiteY20" fmla="*/ 1025030 h 6858001"/>
-                <a:gd name="connsiteX21" fmla="*/ 1897333 w 6264586"/>
-                <a:gd name="connsiteY21" fmla="*/ 1134983 h 6858001"/>
-                <a:gd name="connsiteX22" fmla="*/ 1835758 w 6264586"/>
-                <a:gd name="connsiteY22" fmla="*/ 1182227 h 6858001"/>
-                <a:gd name="connsiteX23" fmla="*/ 1823273 w 6264586"/>
-                <a:gd name="connsiteY23" fmla="*/ 1192016 h 6858001"/>
-                <a:gd name="connsiteX24" fmla="*/ 1750918 w 6264586"/>
-                <a:gd name="connsiteY24" fmla="*/ 1249760 h 6858001"/>
-                <a:gd name="connsiteX25" fmla="*/ 1469297 w 6264586"/>
-                <a:gd name="connsiteY25" fmla="*/ 1496906 h 6858001"/>
-                <a:gd name="connsiteX26" fmla="*/ 967769 w 6264586"/>
-                <a:gd name="connsiteY26" fmla="*/ 2056602 h 6858001"/>
-                <a:gd name="connsiteX27" fmla="*/ 754105 w 6264586"/>
-                <a:gd name="connsiteY27" fmla="*/ 2368727 h 6858001"/>
-                <a:gd name="connsiteX28" fmla="*/ 572364 w 6264586"/>
-                <a:gd name="connsiteY28" fmla="*/ 2701140 h 6858001"/>
-                <a:gd name="connsiteX29" fmla="*/ 532497 w 6264586"/>
-                <a:gd name="connsiteY29" fmla="*/ 2786265 h 6858001"/>
-                <a:gd name="connsiteX30" fmla="*/ 512918 w 6264586"/>
-                <a:gd name="connsiteY30" fmla="*/ 2828827 h 6858001"/>
-                <a:gd name="connsiteX31" fmla="*/ 494475 w 6264586"/>
-                <a:gd name="connsiteY31" fmla="*/ 2872240 h 6858001"/>
-                <a:gd name="connsiteX32" fmla="*/ 491637 w 6264586"/>
-                <a:gd name="connsiteY32" fmla="*/ 2878908 h 6858001"/>
-                <a:gd name="connsiteX33" fmla="*/ 459290 w 6264586"/>
-                <a:gd name="connsiteY33" fmla="*/ 2959635 h 6858001"/>
-                <a:gd name="connsiteX34" fmla="*/ 446805 w 6264586"/>
-                <a:gd name="connsiteY34" fmla="*/ 2992408 h 6858001"/>
-                <a:gd name="connsiteX35" fmla="*/ 426090 w 6264586"/>
-                <a:gd name="connsiteY35" fmla="*/ 3049158 h 6858001"/>
-                <a:gd name="connsiteX36" fmla="*/ 426090 w 6264586"/>
-                <a:gd name="connsiteY36" fmla="*/ 3049867 h 6858001"/>
-                <a:gd name="connsiteX37" fmla="*/ 318124 w 6264586"/>
-                <a:gd name="connsiteY37" fmla="*/ 3414202 h 6858001"/>
-                <a:gd name="connsiteX38" fmla="*/ 230729 w 6264586"/>
-                <a:gd name="connsiteY38" fmla="*/ 4169260 h 6858001"/>
-                <a:gd name="connsiteX39" fmla="*/ 268893 w 6264586"/>
-                <a:gd name="connsiteY39" fmla="*/ 4544236 h 6858001"/>
-                <a:gd name="connsiteX40" fmla="*/ 379840 w 6264586"/>
-                <a:gd name="connsiteY40" fmla="*/ 4900056 h 6858001"/>
-                <a:gd name="connsiteX41" fmla="*/ 406512 w 6264586"/>
-                <a:gd name="connsiteY41" fmla="*/ 4960211 h 6858001"/>
-                <a:gd name="connsiteX42" fmla="*/ 417862 w 6264586"/>
-                <a:gd name="connsiteY42" fmla="*/ 4984613 h 6858001"/>
-                <a:gd name="connsiteX43" fmla="*/ 428077 w 6264586"/>
-                <a:gd name="connsiteY43" fmla="*/ 5005043 h 6858001"/>
-                <a:gd name="connsiteX44" fmla="*/ 460140 w 6264586"/>
-                <a:gd name="connsiteY44" fmla="*/ 5067327 h 6858001"/>
-                <a:gd name="connsiteX45" fmla="*/ 555197 w 6264586"/>
-                <a:gd name="connsiteY45" fmla="*/ 5229773 h 6858001"/>
-                <a:gd name="connsiteX46" fmla="*/ 660611 w 6264586"/>
-                <a:gd name="connsiteY46" fmla="*/ 5387396 h 6858001"/>
-                <a:gd name="connsiteX47" fmla="*/ 774110 w 6264586"/>
-                <a:gd name="connsiteY47" fmla="*/ 5542182 h 6858001"/>
-                <a:gd name="connsiteX48" fmla="*/ 917829 w 6264586"/>
-                <a:gd name="connsiteY48" fmla="*/ 5727896 h 6858001"/>
-                <a:gd name="connsiteX49" fmla="*/ 1012885 w 6264586"/>
-                <a:gd name="connsiteY49" fmla="*/ 5849767 h 6858001"/>
-                <a:gd name="connsiteX50" fmla="*/ 1133053 w 6264586"/>
-                <a:gd name="connsiteY50" fmla="*/ 6006822 h 6858001"/>
-                <a:gd name="connsiteX51" fmla="*/ 1194343 w 6264586"/>
-                <a:gd name="connsiteY51" fmla="*/ 6090245 h 6858001"/>
-                <a:gd name="connsiteX52" fmla="*/ 1249390 w 6264586"/>
-                <a:gd name="connsiteY52" fmla="*/ 6165155 h 6858001"/>
-                <a:gd name="connsiteX53" fmla="*/ 1345724 w 6264586"/>
-                <a:gd name="connsiteY53" fmla="*/ 6292132 h 6858001"/>
-                <a:gd name="connsiteX54" fmla="*/ 1364310 w 6264586"/>
-                <a:gd name="connsiteY54" fmla="*/ 6316251 h 6858001"/>
-                <a:gd name="connsiteX55" fmla="*/ 1373673 w 6264586"/>
-                <a:gd name="connsiteY55" fmla="*/ 6327885 h 6858001"/>
-                <a:gd name="connsiteX56" fmla="*/ 1484619 w 6264586"/>
-                <a:gd name="connsiteY56" fmla="*/ 6462240 h 6858001"/>
-                <a:gd name="connsiteX57" fmla="*/ 1739000 w 6264586"/>
-                <a:gd name="connsiteY57" fmla="*/ 6737335 h 6858001"/>
-                <a:gd name="connsiteX58" fmla="*/ 1866801 w 6264586"/>
-                <a:gd name="connsiteY58" fmla="*/ 6858001 h 6858001"/>
-                <a:gd name="connsiteX59" fmla="*/ 1144149 w 6264586"/>
-                <a:gd name="connsiteY59" fmla="*/ 6858001 h 6858001"/>
-                <a:gd name="connsiteX60" fmla="*/ 1058349 w 6264586"/>
-                <a:gd name="connsiteY60" fmla="*/ 6766452 h 6858001"/>
-                <a:gd name="connsiteX61" fmla="*/ 580309 w 6264586"/>
-                <a:gd name="connsiteY61" fmla="*/ 6105000 h 6858001"/>
-                <a:gd name="connsiteX62" fmla="*/ 1 w 6264586"/>
-                <a:gd name="connsiteY62" fmla="*/ 3960094 h 6858001"/>
-                <a:gd name="connsiteX63" fmla="*/ 2599292 w 6264586"/>
-                <a:gd name="connsiteY63" fmla="*/ 37050 h 6858001"/>
-              </a:gdLst>
-              <a:ahLst/>
-              <a:cxnLst>
-                <a:cxn ang="0">
-                  <a:pos x="connsiteX0" y="connsiteY0"/>
-                </a:cxn>
-                <a:cxn ang="0">
-                  <a:pos x="connsiteX1" y="connsiteY1"/>
-                </a:cxn>
-                <a:cxn ang="0">
-                  <a:pos x="connsiteX2" y="connsiteY2"/>
-                </a:cxn>
-                <a:cxn ang="0">
-                  <a:pos x="connsiteX3" y="connsiteY3"/>
-                </a:cxn>
-                <a:cxn ang="0">
-                  <a:pos x="connsiteX4" y="connsiteY4"/>
-                </a:cxn>
-                <a:cxn ang="0">
-                  <a:pos x="connsiteX5" y="connsiteY5"/>
-                </a:cxn>
-                <a:cxn ang="0">
-                  <a:pos x="connsiteX6" y="connsiteY6"/>
-                </a:cxn>
-                <a:cxn ang="0">
-                  <a:pos x="connsiteX7" y="connsiteY7"/>
-                </a:cxn>
-                <a:cxn ang="0">
-                  <a:pos x="connsiteX8" y="connsiteY8"/>
-                </a:cxn>
-                <a:cxn ang="0">
-                  <a:pos x="connsiteX9" y="connsiteY9"/>
-                </a:cxn>
-                <a:cxn ang="0">
-                  <a:pos x="connsiteX10" y="connsiteY10"/>
-                </a:cxn>
-                <a:cxn ang="0">
-                  <a:pos x="connsiteX11" y="connsiteY11"/>
-                </a:cxn>
-                <a:cxn ang="0">
-                  <a:pos x="connsiteX12" y="connsiteY12"/>
-                </a:cxn>
-                <a:cxn ang="0">
-                  <a:pos x="connsiteX13" y="connsiteY13"/>
-                </a:cxn>
-                <a:cxn ang="0">
-                  <a:pos x="connsiteX14" y="connsiteY14"/>
-                </a:cxn>
-                <a:cxn ang="0">
-                  <a:pos x="connsiteX15" y="connsiteY15"/>
-                </a:cxn>
-                <a:cxn ang="0">
-                  <a:pos x="connsiteX16" y="connsiteY16"/>
-                </a:cxn>
-                <a:cxn ang="0">
-                  <a:pos x="connsiteX17" y="connsiteY17"/>
-                </a:cxn>
-                <a:cxn ang="0">
-                  <a:pos x="connsiteX18" y="connsiteY18"/>
-                </a:cxn>
-                <a:cxn ang="0">
-                  <a:pos x="connsiteX19" y="connsiteY19"/>
-                </a:cxn>
-                <a:cxn ang="0">
-                  <a:pos x="connsiteX20" y="connsiteY20"/>
-                </a:cxn>
-                <a:cxn ang="0">
-                  <a:pos x="connsiteX21" y="connsiteY21"/>
-                </a:cxn>
-                <a:cxn ang="0">
-                  <a:pos x="connsiteX22" y="connsiteY22"/>
-                </a:cxn>
-                <a:cxn ang="0">
-                  <a:pos x="connsiteX23" y="connsiteY23"/>
-                </a:cxn>
-                <a:cxn ang="0">
-                  <a:pos x="connsiteX24" y="connsiteY24"/>
-                </a:cxn>
-                <a:cxn ang="0">
-                  <a:pos x="connsiteX25" y="connsiteY25"/>
-                </a:cxn>
-                <a:cxn ang="0">
-                  <a:pos x="connsiteX26" y="connsiteY26"/>
-                </a:cxn>
-                <a:cxn ang="0">
-                  <a:pos x="connsiteX27" y="connsiteY27"/>
-                </a:cxn>
-                <a:cxn ang="0">
-                  <a:pos x="connsiteX28" y="connsiteY28"/>
-                </a:cxn>
-                <a:cxn ang="0">
-                  <a:pos x="connsiteX29" y="connsiteY29"/>
-                </a:cxn>
-                <a:cxn ang="0">
-                  <a:pos x="connsiteX30" y="connsiteY30"/>
-                </a:cxn>
-                <a:cxn ang="0">
-                  <a:pos x="connsiteX31" y="connsiteY31"/>
-                </a:cxn>
-                <a:cxn ang="0">
-                  <a:pos x="connsiteX32" y="connsiteY32"/>
-                </a:cxn>
-                <a:cxn ang="0">
-                  <a:pos x="connsiteX33" y="connsiteY33"/>
-                </a:cxn>
-                <a:cxn ang="0">
-                  <a:pos x="connsiteX34" y="connsiteY34"/>
-                </a:cxn>
-                <a:cxn ang="0">
-                  <a:pos x="connsiteX35" y="connsiteY35"/>
-                </a:cxn>
-                <a:cxn ang="0">
-                  <a:pos x="connsiteX36" y="connsiteY36"/>
-                </a:cxn>
-                <a:cxn ang="0">
-                  <a:pos x="connsiteX37" y="connsiteY37"/>
-                </a:cxn>
-                <a:cxn ang="0">
-                  <a:pos x="connsiteX38" y="connsiteY38"/>
-                </a:cxn>
-                <a:cxn ang="0">
-                  <a:pos x="connsiteX39" y="connsiteY39"/>
-                </a:cxn>
-                <a:cxn ang="0">
-                  <a:pos x="connsiteX40" y="connsiteY40"/>
-                </a:cxn>
-                <a:cxn ang="0">
-                  <a:pos x="connsiteX41" y="connsiteY41"/>
-                </a:cxn>
-                <a:cxn ang="0">
-                  <a:pos x="connsiteX42" y="connsiteY42"/>
-                </a:cxn>
-                <a:cxn ang="0">
-                  <a:pos x="connsiteX43" y="connsiteY43"/>
-                </a:cxn>
-                <a:cxn ang="0">
-                  <a:pos x="connsiteX44" y="connsiteY44"/>
-                </a:cxn>
-                <a:cxn ang="0">
-                  <a:pos x="connsiteX45" y="connsiteY45"/>
-                </a:cxn>
-                <a:cxn ang="0">
-                  <a:pos x="connsiteX46" y="connsiteY46"/>
-                </a:cxn>
-                <a:cxn ang="0">
-                  <a:pos x="connsiteX47" y="connsiteY47"/>
-                </a:cxn>
-                <a:cxn ang="0">
-                  <a:pos x="connsiteX48" y="connsiteY48"/>
-                </a:cxn>
-                <a:cxn ang="0">
-                  <a:pos x="connsiteX49" y="connsiteY49"/>
-                </a:cxn>
-                <a:cxn ang="0">
-                  <a:pos x="connsiteX50" y="connsiteY50"/>
-                </a:cxn>
-                <a:cxn ang="0">
-                  <a:pos x="connsiteX51" y="connsiteY51"/>
-                </a:cxn>
-                <a:cxn ang="0">
-                  <a:pos x="connsiteX52" y="connsiteY52"/>
-                </a:cxn>
-                <a:cxn ang="0">
-                  <a:pos x="connsiteX53" y="connsiteY53"/>
-                </a:cxn>
-                <a:cxn ang="0">
-                  <a:pos x="connsiteX54" y="connsiteY54"/>
-                </a:cxn>
-                <a:cxn ang="0">
-                  <a:pos x="connsiteX55" y="connsiteY55"/>
-                </a:cxn>
-                <a:cxn ang="0">
-                  <a:pos x="connsiteX56" y="connsiteY56"/>
-                </a:cxn>
-                <a:cxn ang="0">
-                  <a:pos x="connsiteX57" y="connsiteY57"/>
-                </a:cxn>
-                <a:cxn ang="0">
-                  <a:pos x="connsiteX58" y="connsiteY58"/>
-                </a:cxn>
-                <a:cxn ang="0">
-                  <a:pos x="connsiteX59" y="connsiteY59"/>
-                </a:cxn>
-                <a:cxn ang="0">
-                  <a:pos x="connsiteX60" y="connsiteY60"/>
-                </a:cxn>
-                <a:cxn ang="0">
-                  <a:pos x="connsiteX61" y="connsiteY61"/>
-                </a:cxn>
-                <a:cxn ang="0">
-                  <a:pos x="connsiteX62" y="connsiteY62"/>
-                </a:cxn>
-                <a:cxn ang="0">
-                  <a:pos x="connsiteX63" y="connsiteY63"/>
-                </a:cxn>
-              </a:cxnLst>
-              <a:rect l="l" t="t" r="r" b="b"/>
-              <a:pathLst>
-                <a:path w="6264586" h="6858001">
-                  <a:moveTo>
-                    <a:pt x="6264586" y="6646464"/>
-                  </a:moveTo>
-                  <a:lnTo>
-                    <a:pt x="6264586" y="6858001"/>
-                  </a:lnTo>
-                  <a:lnTo>
-                    <a:pt x="5997170" y="6858001"/>
-                  </a:lnTo>
-                  <a:lnTo>
-                    <a:pt x="6121512" y="6761029"/>
-                  </a:lnTo>
-                  <a:close/>
-                  <a:moveTo>
-                    <a:pt x="2693206" y="0"/>
-                  </a:moveTo>
-                  <a:lnTo>
-                    <a:pt x="5872285" y="0"/>
-                  </a:lnTo>
-                  <a:lnTo>
-                    <a:pt x="6024875" y="68385"/>
-                  </a:lnTo>
-                  <a:cubicBezTo>
-                    <a:pt x="6086250" y="97989"/>
-                    <a:pt x="6146793" y="129318"/>
-                    <a:pt x="6206432" y="162336"/>
-                  </a:cubicBezTo>
-                  <a:lnTo>
-                    <a:pt x="6264586" y="196704"/>
-                  </a:lnTo>
-                  <a:lnTo>
-                    <a:pt x="6264586" y="537242"/>
-                  </a:lnTo>
-                  <a:lnTo>
-                    <a:pt x="6230189" y="517260"/>
-                  </a:lnTo>
-                  <a:cubicBezTo>
-                    <a:pt x="6012226" y="399931"/>
-                    <a:pt x="5780573" y="310008"/>
-                    <a:pt x="5540536" y="249543"/>
-                  </a:cubicBezTo>
-                  <a:cubicBezTo>
-                    <a:pt x="5421375" y="219324"/>
-                    <a:pt x="5300641" y="195644"/>
-                    <a:pt x="5178896" y="178606"/>
-                  </a:cubicBezTo>
-                  <a:cubicBezTo>
-                    <a:pt x="5057977" y="161840"/>
-                    <a:pt x="4936276" y="151186"/>
-                    <a:pt x="4814279" y="146683"/>
-                  </a:cubicBezTo>
-                  <a:cubicBezTo>
-                    <a:pt x="4761501" y="144556"/>
-                    <a:pt x="4708015" y="143421"/>
-                    <a:pt x="4655095" y="143421"/>
-                  </a:cubicBezTo>
-                  <a:cubicBezTo>
-                    <a:pt x="4462968" y="143573"/>
-                    <a:pt x="4271111" y="157799"/>
-                    <a:pt x="4081069" y="185983"/>
-                  </a:cubicBezTo>
-                  <a:cubicBezTo>
-                    <a:pt x="3956361" y="205703"/>
-                    <a:pt x="3835058" y="229396"/>
-                    <a:pt x="3720566" y="256921"/>
-                  </a:cubicBezTo>
-                  <a:cubicBezTo>
-                    <a:pt x="3596708" y="286714"/>
-                    <a:pt x="3477677" y="320905"/>
-                    <a:pt x="3365879" y="357651"/>
-                  </a:cubicBezTo>
-                  <a:cubicBezTo>
-                    <a:pt x="3249257" y="395958"/>
-                    <a:pt x="3133487" y="438945"/>
-                    <a:pt x="3020555" y="486190"/>
-                  </a:cubicBezTo>
-                  <a:cubicBezTo>
-                    <a:pt x="2907623" y="533434"/>
-                    <a:pt x="2794832" y="585786"/>
-                    <a:pt x="2685163" y="641542"/>
-                  </a:cubicBezTo>
-                  <a:cubicBezTo>
-                    <a:pt x="2463995" y="754348"/>
-                    <a:pt x="2250998" y="882488"/>
-                    <a:pt x="2047720" y="1025030"/>
-                  </a:cubicBezTo>
-                  <a:cubicBezTo>
-                    <a:pt x="2006151" y="1054399"/>
-                    <a:pt x="1951528" y="1093415"/>
-                    <a:pt x="1897333" y="1134983"/>
-                  </a:cubicBezTo>
-                  <a:cubicBezTo>
-                    <a:pt x="1876761" y="1150164"/>
-                    <a:pt x="1855905" y="1166479"/>
-                    <a:pt x="1835758" y="1182227"/>
-                  </a:cubicBezTo>
-                  <a:lnTo>
-                    <a:pt x="1823273" y="1192016"/>
-                  </a:lnTo>
-                  <a:cubicBezTo>
-                    <a:pt x="1797027" y="1211879"/>
-                    <a:pt x="1772057" y="1232309"/>
-                    <a:pt x="1750918" y="1249760"/>
-                  </a:cubicBezTo>
-                  <a:cubicBezTo>
-                    <a:pt x="1645931" y="1335737"/>
-                    <a:pt x="1554422" y="1416605"/>
-                    <a:pt x="1469297" y="1496906"/>
-                  </a:cubicBezTo>
-                  <a:cubicBezTo>
-                    <a:pt x="1286595" y="1668957"/>
-                    <a:pt x="1118818" y="1856190"/>
-                    <a:pt x="967769" y="2056602"/>
-                  </a:cubicBezTo>
-                  <a:cubicBezTo>
-                    <a:pt x="890731" y="2159603"/>
-                    <a:pt x="818800" y="2264590"/>
-                    <a:pt x="754105" y="2368727"/>
-                  </a:cubicBezTo>
-                  <a:cubicBezTo>
-                    <a:pt x="681749" y="2488328"/>
-                    <a:pt x="622304" y="2596720"/>
-                    <a:pt x="572364" y="2701140"/>
-                  </a:cubicBezTo>
-                  <a:cubicBezTo>
-                    <a:pt x="557609" y="2730507"/>
-                    <a:pt x="543989" y="2760443"/>
-                    <a:pt x="532497" y="2786265"/>
-                  </a:cubicBezTo>
-                  <a:lnTo>
-                    <a:pt x="512918" y="2828827"/>
-                  </a:lnTo>
-                  <a:lnTo>
-                    <a:pt x="494475" y="2872240"/>
-                  </a:lnTo>
-                  <a:lnTo>
-                    <a:pt x="491637" y="2878908"/>
-                  </a:lnTo>
-                  <a:cubicBezTo>
-                    <a:pt x="480146" y="2906575"/>
-                    <a:pt x="469220" y="2932821"/>
-                    <a:pt x="459290" y="2959635"/>
-                  </a:cubicBezTo>
-                  <a:cubicBezTo>
-                    <a:pt x="455176" y="2970559"/>
-                    <a:pt x="451060" y="2981484"/>
-                    <a:pt x="446805" y="2992408"/>
-                  </a:cubicBezTo>
-                  <a:cubicBezTo>
-                    <a:pt x="439427" y="3012412"/>
-                    <a:pt x="432333" y="3030572"/>
-                    <a:pt x="426090" y="3049158"/>
-                  </a:cubicBezTo>
-                  <a:lnTo>
-                    <a:pt x="426090" y="3049867"/>
-                  </a:lnTo>
-                  <a:cubicBezTo>
-                    <a:pt x="383010" y="3169099"/>
-                    <a:pt x="346959" y="3290756"/>
-                    <a:pt x="318124" y="3414202"/>
-                  </a:cubicBezTo>
-                  <a:cubicBezTo>
-                    <a:pt x="260107" y="3661703"/>
-                    <a:pt x="230780" y="3915049"/>
-                    <a:pt x="230729" y="4169260"/>
-                  </a:cubicBezTo>
-                  <a:cubicBezTo>
-                    <a:pt x="231621" y="4295173"/>
-                    <a:pt x="244398" y="4420719"/>
-                    <a:pt x="268893" y="4544236"/>
-                  </a:cubicBezTo>
-                  <a:cubicBezTo>
-                    <a:pt x="293708" y="4666304"/>
-                    <a:pt x="330882" y="4785521"/>
-                    <a:pt x="379840" y="4900056"/>
-                  </a:cubicBezTo>
-                  <a:cubicBezTo>
-                    <a:pt x="387926" y="4919919"/>
-                    <a:pt x="397006" y="4939498"/>
-                    <a:pt x="406512" y="4960211"/>
-                  </a:cubicBezTo>
-                  <a:cubicBezTo>
-                    <a:pt x="410343" y="4968299"/>
-                    <a:pt x="414173" y="4976385"/>
-                    <a:pt x="417862" y="4984613"/>
-                  </a:cubicBezTo>
-                  <a:lnTo>
-                    <a:pt x="428077" y="5005043"/>
-                  </a:lnTo>
-                  <a:cubicBezTo>
-                    <a:pt x="438860" y="5026751"/>
-                    <a:pt x="449075" y="5047181"/>
-                    <a:pt x="460140" y="5067327"/>
-                  </a:cubicBezTo>
-                  <a:cubicBezTo>
-                    <a:pt x="485536" y="5116273"/>
-                    <a:pt x="514763" y="5165789"/>
-                    <a:pt x="555197" y="5229773"/>
-                  </a:cubicBezTo>
-                  <a:cubicBezTo>
-                    <a:pt x="586836" y="5280282"/>
-                    <a:pt x="620318" y="5329511"/>
-                    <a:pt x="660611" y="5387396"/>
-                  </a:cubicBezTo>
-                  <a:cubicBezTo>
-                    <a:pt x="698065" y="5440741"/>
-                    <a:pt x="737223" y="5493094"/>
-                    <a:pt x="774110" y="5542182"/>
-                  </a:cubicBezTo>
-                  <a:cubicBezTo>
-                    <a:pt x="821070" y="5604324"/>
-                    <a:pt x="870301" y="5667173"/>
-                    <a:pt x="917829" y="5727896"/>
-                  </a:cubicBezTo>
-                  <a:cubicBezTo>
-                    <a:pt x="949042" y="5767762"/>
-                    <a:pt x="979828" y="5807063"/>
-                    <a:pt x="1012885" y="5849767"/>
-                  </a:cubicBezTo>
-                  <a:cubicBezTo>
-                    <a:pt x="1045942" y="5892471"/>
-                    <a:pt x="1089497" y="5948796"/>
-                    <a:pt x="1133053" y="6006822"/>
-                  </a:cubicBezTo>
-                  <a:cubicBezTo>
-                    <a:pt x="1153624" y="6034345"/>
-                    <a:pt x="1175332" y="6063998"/>
-                    <a:pt x="1194343" y="6090245"/>
-                  </a:cubicBezTo>
-                  <a:cubicBezTo>
-                    <a:pt x="1213355" y="6116491"/>
-                    <a:pt x="1231372" y="6141178"/>
-                    <a:pt x="1249390" y="6165155"/>
-                  </a:cubicBezTo>
-                  <a:cubicBezTo>
-                    <a:pt x="1280461" y="6208000"/>
-                    <a:pt x="1313659" y="6250847"/>
-                    <a:pt x="1345724" y="6292132"/>
-                  </a:cubicBezTo>
-                  <a:lnTo>
-                    <a:pt x="1364310" y="6316251"/>
-                  </a:lnTo>
-                  <a:lnTo>
-                    <a:pt x="1373673" y="6327885"/>
-                  </a:lnTo>
-                  <a:cubicBezTo>
-                    <a:pt x="1409566" y="6372433"/>
-                    <a:pt x="1446738" y="6418542"/>
-                    <a:pt x="1484619" y="6462240"/>
-                  </a:cubicBezTo>
-                  <a:cubicBezTo>
-                    <a:pt x="1567899" y="6559850"/>
-                    <a:pt x="1653876" y="6652211"/>
-                    <a:pt x="1739000" y="6737335"/>
-                  </a:cubicBezTo>
-                  <a:lnTo>
-                    <a:pt x="1866801" y="6858001"/>
-                  </a:lnTo>
-                  <a:lnTo>
-                    <a:pt x="1144149" y="6858001"/>
-                  </a:lnTo>
-                  <a:lnTo>
-                    <a:pt x="1058349" y="6766452"/>
-                  </a:lnTo>
-                  <a:cubicBezTo>
-                    <a:pt x="878978" y="6562465"/>
-                    <a:pt x="718756" y="6341104"/>
-                    <a:pt x="580309" y="6105000"/>
-                  </a:cubicBezTo>
-                  <a:cubicBezTo>
-                    <a:pt x="200401" y="5454007"/>
-                    <a:pt x="146" y="4713831"/>
-                    <a:pt x="1" y="3960094"/>
-                  </a:cubicBezTo>
-                  <a:cubicBezTo>
-                    <a:pt x="-335" y="2196754"/>
-                    <a:pt x="1071479" y="683605"/>
-                    <a:pt x="2599292" y="37050"/>
-                  </a:cubicBezTo>
-                  <a:close/>
-                </a:path>
-              </a:pathLst>
-            </a:custGeom>
-            <a:gradFill>
-              <a:gsLst>
-                <a:gs pos="2000">
-                  <a:schemeClr val="bg1">
-                    <a:alpha val="10000"/>
-                  </a:schemeClr>
-                </a:gs>
-                <a:gs pos="16000">
-                  <a:schemeClr val="accent6">
-                    <a:alpha val="10000"/>
-                  </a:schemeClr>
-                </a:gs>
-                <a:gs pos="100000">
-                  <a:schemeClr val="bg1">
-                    <a:alpha val="10000"/>
-                  </a:schemeClr>
-                </a:gs>
-                <a:gs pos="85000">
-                  <a:schemeClr val="accent1">
-                    <a:alpha val="10000"/>
-                  </a:schemeClr>
-                </a:gs>
-              </a:gsLst>
-              <a:lin ang="12000000" scaled="0"/>
-            </a:gradFill>
-            <a:ln>
-              <a:noFill/>
-            </a:ln>
-          </p:spPr>
-          <p:style>
-            <a:lnRef idx="2">
-              <a:schemeClr val="accent1">
-                <a:shade val="50000"/>
-              </a:schemeClr>
-            </a:lnRef>
-            <a:fillRef idx="1">
-              <a:schemeClr val="accent1"/>
-            </a:fillRef>
-            <a:effectRef idx="0">
-              <a:schemeClr val="accent1"/>
-            </a:effectRef>
-            <a:fontRef idx="minor">
-              <a:schemeClr val="lt1"/>
-            </a:fontRef>
-          </p:style>
-          <p:txBody>
-            <a:bodyPr rtlCol="0" anchor="ctr"/>
-            <a:lstStyle/>
-            <a:p>
-              <a:pPr algn="ctr"/>
-              <a:endParaRPr lang="en-US" dirty="0"/>
-            </a:p>
-          </p:txBody>
-        </p:sp>
-      </p:grpSp>
-    </p:spTree>
-    <p:extLst>
-      <p:ext uri="{BB962C8B-B14F-4D97-AF65-F5344CB8AC3E}">
-        <p14:creationId xmlns:p14="http://schemas.microsoft.com/office/powerpoint/2010/main" val="2620898782"/>
-      </p:ext>
-    </p:extLst>
-  </p:cSld>
-  <p:clrMapOvr>
-    <a:masterClrMapping/>
-  </p:clrMapOvr>
-  <p:timing>
-    <p:tnLst>
-      <p:par>
-        <p:cTn id="1" dur="indefinite" restart="never" nodeType="tmRoot">
-          <p:childTnLst>
-            <p:seq concurrent="1" nextAc="seek">
-              <p:cTn id="2" dur="indefinite" nodeType="mainSeq">
-                <p:childTnLst>
-                  <p:par>
-                    <p:cTn id="3" fill="hold">
-                      <p:stCondLst>
-                        <p:cond delay="indefinite"/>
-                      </p:stCondLst>
-                      <p:childTnLst>
-                        <p:par>
-                          <p:cTn id="4" fill="hold">
-                            <p:stCondLst>
-                              <p:cond delay="0"/>
-                            </p:stCondLst>
-                            <p:childTnLst>
-                              <p:par>
-                                <p:cTn id="5" presetID="10" presetClass="entr" presetSubtype="0" fill="hold" grpId="0" nodeType="clickEffect">
-                                  <p:stCondLst>
-                                    <p:cond delay="0"/>
-                                  </p:stCondLst>
-                                  <p:childTnLst>
-                                    <p:set>
-                                      <p:cBhvr>
-                                        <p:cTn id="6" dur="1" fill="hold">
-                                          <p:stCondLst>
-                                            <p:cond delay="0"/>
-                                          </p:stCondLst>
-                                        </p:cTn>
-                                        <p:tgtEl>
-                                          <p:spTgt spid="2"/>
-                                        </p:tgtEl>
-                                        <p:attrNameLst>
-                                          <p:attrName>style.visibility</p:attrName>
-                                        </p:attrNameLst>
-                                      </p:cBhvr>
-                                      <p:to>
-                                        <p:strVal val="visible"/>
-                                      </p:to>
-                                    </p:set>
-                                    <p:animEffect transition="in" filter="fade">
-                                      <p:cBhvr>
-                                        <p:cTn id="7" dur="500"/>
-                                        <p:tgtEl>
-                                          <p:spTgt spid="2"/>
-                                        </p:tgtEl>
-                                      </p:cBhvr>
-                                    </p:animEffect>
-                                  </p:childTnLst>
-                                </p:cTn>
-                              </p:par>
-                            </p:childTnLst>
-                          </p:cTn>
-                        </p:par>
-                      </p:childTnLst>
-                    </p:cTn>
-                  </p:par>
-                  <p:par>
-                    <p:cTn id="8" fill="hold">
-                      <p:stCondLst>
-                        <p:cond delay="indefinite"/>
-                      </p:stCondLst>
-                      <p:childTnLst>
-                        <p:par>
-                          <p:cTn id="9" fill="hold">
-                            <p:stCondLst>
-                              <p:cond delay="0"/>
-                            </p:stCondLst>
-                            <p:childTnLst>
-                              <p:par>
-                                <p:cTn id="10" presetID="10" presetClass="entr" presetSubtype="0" fill="hold" grpId="0" nodeType="clickEffect">
-                                  <p:stCondLst>
-                                    <p:cond delay="0"/>
-                                  </p:stCondLst>
-                                  <p:childTnLst>
-                                    <p:set>
-                                      <p:cBhvr>
-                                        <p:cTn id="11" dur="1" fill="hold">
-                                          <p:stCondLst>
-                                            <p:cond delay="0"/>
-                                          </p:stCondLst>
-                                        </p:cTn>
-                                        <p:tgtEl>
-                                          <p:spTgt spid="3">
-                                            <p:txEl>
-                                              <p:pRg st="0" end="0"/>
-                                            </p:txEl>
-                                          </p:spTgt>
-                                        </p:tgtEl>
-                                        <p:attrNameLst>
-                                          <p:attrName>style.visibility</p:attrName>
-                                        </p:attrNameLst>
-                                      </p:cBhvr>
-                                      <p:to>
-                                        <p:strVal val="visible"/>
-                                      </p:to>
-                                    </p:set>
-                                    <p:animEffect transition="in" filter="fade">
-                                      <p:cBhvr>
-                                        <p:cTn id="12" dur="500"/>
-                                        <p:tgtEl>
-                                          <p:spTgt spid="3">
-                                            <p:txEl>
-                                              <p:pRg st="0" end="0"/>
-                                            </p:txEl>
-                                          </p:spTgt>
-                                        </p:tgtEl>
-                                      </p:cBhvr>
-                                    </p:animEffect>
-                                  </p:childTnLst>
-                                </p:cTn>
-                              </p:par>
-                            </p:childTnLst>
-                          </p:cTn>
-                        </p:par>
-                      </p:childTnLst>
-                    </p:cTn>
-                  </p:par>
-                </p:childTnLst>
-              </p:cTn>
-              <p:prevCondLst>
-                <p:cond evt="onPrev" delay="0">
-                  <p:tgtEl>
-                    <p:sldTgt/>
-                  </p:tgtEl>
-                </p:cond>
-              </p:prevCondLst>
-              <p:nextCondLst>
-                <p:cond evt="onNext" delay="0">
-                  <p:tgtEl>
-                    <p:sldTgt/>
-                  </p:tgtEl>
-                </p:cond>
-              </p:nextCondLst>
-            </p:seq>
-          </p:childTnLst>
-        </p:cTn>
-      </p:par>
-    </p:tnLst>
-    <p:bldLst>
-      <p:bldP spid="2" grpId="0"/>
-      <p:bldP spid="3" grpId="0" build="p"/>
-    </p:bldLst>
-  </p:timing>
-</p:sld>
-</file>
-
-<file path=ppt/slides/slide2.xml><?xml version="1.0" encoding="utf-8"?>
 <p:sld xmlns:a="http://schemas.openxmlformats.org/drawingml/2006/main" xmlns:r="http://schemas.openxmlformats.org/officeDocument/2006/relationships" xmlns:p="http://schemas.openxmlformats.org/presentationml/2006/main">
   <p:cSld>
     <p:spTree>

</xml_diff>

<commit_message>
Deploying to gh-pages from master @ e91eae5235e8524efa1f5a61524690638e5dcb30 🚀
</commit_message>
<xml_diff>
--- a/ppt/Phishing.pptx
+++ b/ppt/Phishing.pptx
@@ -2,10 +2,10 @@
 <file path=ppt/presentation.xml><?xml version="1.0" encoding="utf-8"?>
 <p:presentation xmlns:a="http://schemas.openxmlformats.org/drawingml/2006/main" xmlns:r="http://schemas.openxmlformats.org/officeDocument/2006/relationships" xmlns:p="http://schemas.openxmlformats.org/presentationml/2006/main" saveSubsetFonts="1">
   <p:sldMasterIdLst>
-    <p:sldMasterId id="2147483672" r:id="rId1"/>
+    <p:sldMasterId id="2147483648" r:id="rId1"/>
   </p:sldMasterIdLst>
   <p:sldIdLst>
-    <p:sldId id="257" r:id="rId2"/>
+    <p:sldId id="256" r:id="rId2"/>
   </p:sldIdLst>
   <p:sldSz cx="12192000" cy="6858000"/>
   <p:notesSz cx="6858000" cy="9144000"/>
@@ -104,11 +104,6 @@
       </a:defRPr>
     </a:lvl9pPr>
   </p:defaultTextStyle>
-  <p:extLst>
-    <p:ext uri="{EFAFB233-063F-42B5-8137-9DF3F51BA10A}">
-      <p15:sldGuideLst xmlns:p15="http://schemas.microsoft.com/office/powerpoint/2012/main"/>
-    </p:ext>
-  </p:extLst>
 </p:presentation>
 </file>
 
@@ -134,7 +129,7 @@
           <p:cNvPr id="2" name="Title 1">
             <a:extLst>
               <a:ext uri="{FF2B5EF4-FFF2-40B4-BE49-F238E27FC236}">
-                <a16:creationId xmlns:a16="http://schemas.microsoft.com/office/drawing/2014/main" id="{7F1AD451-62F1-9FAA-011C-04E0611ED76A}"/>
+                <a16:creationId xmlns:a16="http://schemas.microsoft.com/office/drawing/2014/main" id="{D7493239-8667-B7B8-9F33-9E0994F298DD}"/>
               </a:ext>
             </a:extLst>
           </p:cNvPr>
@@ -172,7 +167,7 @@
           <p:cNvPr id="3" name="Subtitle 2">
             <a:extLst>
               <a:ext uri="{FF2B5EF4-FFF2-40B4-BE49-F238E27FC236}">
-                <a16:creationId xmlns:a16="http://schemas.microsoft.com/office/drawing/2014/main" id="{46D2422B-792F-0542-26B1-A039094BFBBD}"/>
+                <a16:creationId xmlns:a16="http://schemas.microsoft.com/office/drawing/2014/main" id="{BAB2104D-B853-0ABA-C540-1C95A135FD62}"/>
               </a:ext>
             </a:extLst>
           </p:cNvPr>
@@ -243,7 +238,7 @@
           <p:cNvPr id="4" name="Date Placeholder 3">
             <a:extLst>
               <a:ext uri="{FF2B5EF4-FFF2-40B4-BE49-F238E27FC236}">
-                <a16:creationId xmlns:a16="http://schemas.microsoft.com/office/drawing/2014/main" id="{F2D65026-D85B-F693-43F1-4603AA389324}"/>
+                <a16:creationId xmlns:a16="http://schemas.microsoft.com/office/drawing/2014/main" id="{5A012E74-1C1F-51A7-E42F-790802B52B69}"/>
               </a:ext>
             </a:extLst>
           </p:cNvPr>
@@ -259,11 +254,11 @@
           <a:bodyPr/>
           <a:lstStyle/>
           <a:p>
-            <a:fld id="{6444479B-705B-4489-957E-7E8A228BDFA0}" type="datetime1">
-              <a:rPr lang="en-US" smtClean="0"/>
-              <a:t>9/18/2025</a:t>
+            <a:fld id="{9FF3E6ED-C832-4343-8B91-8E72B7796AC5}" type="datetimeFigureOut">
+              <a:rPr lang="en-SG" smtClean="0"/>
+              <a:t>18/9/2025</a:t>
             </a:fld>
-            <a:endParaRPr lang="en-US"/>
+            <a:endParaRPr lang="en-SG"/>
           </a:p>
         </p:txBody>
       </p:sp>
@@ -272,7 +267,7 @@
           <p:cNvPr id="5" name="Footer Placeholder 4">
             <a:extLst>
               <a:ext uri="{FF2B5EF4-FFF2-40B4-BE49-F238E27FC236}">
-                <a16:creationId xmlns:a16="http://schemas.microsoft.com/office/drawing/2014/main" id="{5E020129-2A13-93D2-B178-C9BE2BC3EDE7}"/>
+                <a16:creationId xmlns:a16="http://schemas.microsoft.com/office/drawing/2014/main" id="{AF5E39AF-8058-4799-E394-418C996FD50F}"/>
               </a:ext>
             </a:extLst>
           </p:cNvPr>
@@ -288,7 +283,7 @@
           <a:bodyPr/>
           <a:lstStyle/>
           <a:p>
-            <a:endParaRPr lang="en-US" dirty="0"/>
+            <a:endParaRPr lang="en-SG"/>
           </a:p>
         </p:txBody>
       </p:sp>
@@ -297,7 +292,7 @@
           <p:cNvPr id="6" name="Slide Number Placeholder 5">
             <a:extLst>
               <a:ext uri="{FF2B5EF4-FFF2-40B4-BE49-F238E27FC236}">
-                <a16:creationId xmlns:a16="http://schemas.microsoft.com/office/drawing/2014/main" id="{E891252C-E4A8-C4FD-A165-A54821CA667C}"/>
+                <a16:creationId xmlns:a16="http://schemas.microsoft.com/office/drawing/2014/main" id="{24E8D79B-DFC3-4414-6AB1-A986F5F00580}"/>
               </a:ext>
             </a:extLst>
           </p:cNvPr>
@@ -313,18 +308,18 @@
           <a:bodyPr/>
           <a:lstStyle/>
           <a:p>
-            <a:fld id="{70C12960-6E85-460F-B6E3-5B82CB31AF3D}" type="slidenum">
-              <a:rPr lang="en-US" smtClean="0"/>
+            <a:fld id="{10E188DE-64F0-4311-81FB-EC275E4C46D9}" type="slidenum">
+              <a:rPr lang="en-SG" smtClean="0"/>
               <a:t>‹#›</a:t>
             </a:fld>
-            <a:endParaRPr lang="en-US"/>
+            <a:endParaRPr lang="en-SG"/>
           </a:p>
         </p:txBody>
       </p:sp>
     </p:spTree>
     <p:extLst>
       <p:ext uri="{BB962C8B-B14F-4D97-AF65-F5344CB8AC3E}">
-        <p14:creationId xmlns:p14="http://schemas.microsoft.com/office/powerpoint/2010/main" val="3013762274"/>
+        <p14:creationId xmlns:p14="http://schemas.microsoft.com/office/powerpoint/2010/main" val="1571029469"/>
       </p:ext>
     </p:extLst>
   </p:cSld>
@@ -356,7 +351,7 @@
           <p:cNvPr id="2" name="Title 1">
             <a:extLst>
               <a:ext uri="{FF2B5EF4-FFF2-40B4-BE49-F238E27FC236}">
-                <a16:creationId xmlns:a16="http://schemas.microsoft.com/office/drawing/2014/main" id="{44D621CC-4CC5-E7EF-B02D-D08FE4391562}"/>
+                <a16:creationId xmlns:a16="http://schemas.microsoft.com/office/drawing/2014/main" id="{0DE996DC-AC6F-ABD2-98EE-C45E65EDAE03}"/>
               </a:ext>
             </a:extLst>
           </p:cNvPr>
@@ -385,7 +380,7 @@
           <p:cNvPr id="3" name="Vertical Text Placeholder 2">
             <a:extLst>
               <a:ext uri="{FF2B5EF4-FFF2-40B4-BE49-F238E27FC236}">
-                <a16:creationId xmlns:a16="http://schemas.microsoft.com/office/drawing/2014/main" id="{0ED8B508-EFBA-51D2-9ECB-6629CF3DB940}"/>
+                <a16:creationId xmlns:a16="http://schemas.microsoft.com/office/drawing/2014/main" id="{1850BE40-D297-642C-A586-96CA092D1014}"/>
               </a:ext>
             </a:extLst>
           </p:cNvPr>
@@ -443,7 +438,7 @@
           <p:cNvPr id="4" name="Date Placeholder 3">
             <a:extLst>
               <a:ext uri="{FF2B5EF4-FFF2-40B4-BE49-F238E27FC236}">
-                <a16:creationId xmlns:a16="http://schemas.microsoft.com/office/drawing/2014/main" id="{9932699F-E89F-B83C-85D9-73EE09485D45}"/>
+                <a16:creationId xmlns:a16="http://schemas.microsoft.com/office/drawing/2014/main" id="{0F5D30D3-44D9-D6C4-3A8D-BE46CF5B221B}"/>
               </a:ext>
             </a:extLst>
           </p:cNvPr>
@@ -459,11 +454,11 @@
           <a:bodyPr/>
           <a:lstStyle/>
           <a:p>
-            <a:fld id="{C07B66AD-7C08-490A-ADA4-B47E10FB2407}" type="datetime1">
-              <a:rPr lang="en-US" smtClean="0"/>
-              <a:t>9/18/2025</a:t>
+            <a:fld id="{9FF3E6ED-C832-4343-8B91-8E72B7796AC5}" type="datetimeFigureOut">
+              <a:rPr lang="en-SG" smtClean="0"/>
+              <a:t>18/9/2025</a:t>
             </a:fld>
-            <a:endParaRPr lang="en-US"/>
+            <a:endParaRPr lang="en-SG"/>
           </a:p>
         </p:txBody>
       </p:sp>
@@ -472,7 +467,7 @@
           <p:cNvPr id="5" name="Footer Placeholder 4">
             <a:extLst>
               <a:ext uri="{FF2B5EF4-FFF2-40B4-BE49-F238E27FC236}">
-                <a16:creationId xmlns:a16="http://schemas.microsoft.com/office/drawing/2014/main" id="{315FFF66-84AF-998F-01F5-98CCA4FC766F}"/>
+                <a16:creationId xmlns:a16="http://schemas.microsoft.com/office/drawing/2014/main" id="{007DA5DF-710A-B3F8-4A70-9A999318FCA9}"/>
               </a:ext>
             </a:extLst>
           </p:cNvPr>
@@ -488,7 +483,7 @@
           <a:bodyPr/>
           <a:lstStyle/>
           <a:p>
-            <a:endParaRPr lang="en-US" dirty="0"/>
+            <a:endParaRPr lang="en-SG"/>
           </a:p>
         </p:txBody>
       </p:sp>
@@ -497,7 +492,7 @@
           <p:cNvPr id="6" name="Slide Number Placeholder 5">
             <a:extLst>
               <a:ext uri="{FF2B5EF4-FFF2-40B4-BE49-F238E27FC236}">
-                <a16:creationId xmlns:a16="http://schemas.microsoft.com/office/drawing/2014/main" id="{D14B3F3D-BECA-64DF-6B95-4A7950BD2BC6}"/>
+                <a16:creationId xmlns:a16="http://schemas.microsoft.com/office/drawing/2014/main" id="{8C766813-D9F1-13E3-0318-0D8FDF9481FF}"/>
               </a:ext>
             </a:extLst>
           </p:cNvPr>
@@ -513,18 +508,18 @@
           <a:bodyPr/>
           <a:lstStyle/>
           <a:p>
-            <a:fld id="{70C12960-6E85-460F-B6E3-5B82CB31AF3D}" type="slidenum">
-              <a:rPr lang="en-US" smtClean="0"/>
+            <a:fld id="{10E188DE-64F0-4311-81FB-EC275E4C46D9}" type="slidenum">
+              <a:rPr lang="en-SG" smtClean="0"/>
               <a:t>‹#›</a:t>
             </a:fld>
-            <a:endParaRPr lang="en-US"/>
+            <a:endParaRPr lang="en-SG"/>
           </a:p>
         </p:txBody>
       </p:sp>
     </p:spTree>
     <p:extLst>
       <p:ext uri="{BB962C8B-B14F-4D97-AF65-F5344CB8AC3E}">
-        <p14:creationId xmlns:p14="http://schemas.microsoft.com/office/powerpoint/2010/main" val="977720983"/>
+        <p14:creationId xmlns:p14="http://schemas.microsoft.com/office/powerpoint/2010/main" val="215507968"/>
       </p:ext>
     </p:extLst>
   </p:cSld>
@@ -556,7 +551,7 @@
           <p:cNvPr id="2" name="Vertical Title 1">
             <a:extLst>
               <a:ext uri="{FF2B5EF4-FFF2-40B4-BE49-F238E27FC236}">
-                <a16:creationId xmlns:a16="http://schemas.microsoft.com/office/drawing/2014/main" id="{7C150683-CA00-B30E-07A9-5AA7305B7D2C}"/>
+                <a16:creationId xmlns:a16="http://schemas.microsoft.com/office/drawing/2014/main" id="{35335B64-2960-53CE-7E69-0041753B3D8C}"/>
               </a:ext>
             </a:extLst>
           </p:cNvPr>
@@ -590,7 +585,7 @@
           <p:cNvPr id="3" name="Vertical Text Placeholder 2">
             <a:extLst>
               <a:ext uri="{FF2B5EF4-FFF2-40B4-BE49-F238E27FC236}">
-                <a16:creationId xmlns:a16="http://schemas.microsoft.com/office/drawing/2014/main" id="{1AF08BC8-77B8-A0B3-C76F-677DA7A1E282}"/>
+                <a16:creationId xmlns:a16="http://schemas.microsoft.com/office/drawing/2014/main" id="{D5725D59-877D-41D9-33B8-1890AEA5E173}"/>
               </a:ext>
             </a:extLst>
           </p:cNvPr>
@@ -653,7 +648,7 @@
           <p:cNvPr id="4" name="Date Placeholder 3">
             <a:extLst>
               <a:ext uri="{FF2B5EF4-FFF2-40B4-BE49-F238E27FC236}">
-                <a16:creationId xmlns:a16="http://schemas.microsoft.com/office/drawing/2014/main" id="{68ADE993-F5B2-7EAA-6844-6404C9533287}"/>
+                <a16:creationId xmlns:a16="http://schemas.microsoft.com/office/drawing/2014/main" id="{3E581814-4085-86CD-6C45-3843AFE11D06}"/>
               </a:ext>
             </a:extLst>
           </p:cNvPr>
@@ -669,11 +664,11 @@
           <a:bodyPr/>
           <a:lstStyle/>
           <a:p>
-            <a:fld id="{05B95027-4255-49E7-9841-CD21BCC99996}" type="datetime1">
-              <a:rPr lang="en-US" smtClean="0"/>
-              <a:t>9/18/2025</a:t>
+            <a:fld id="{9FF3E6ED-C832-4343-8B91-8E72B7796AC5}" type="datetimeFigureOut">
+              <a:rPr lang="en-SG" smtClean="0"/>
+              <a:t>18/9/2025</a:t>
             </a:fld>
-            <a:endParaRPr lang="en-US"/>
+            <a:endParaRPr lang="en-SG"/>
           </a:p>
         </p:txBody>
       </p:sp>
@@ -682,7 +677,7 @@
           <p:cNvPr id="5" name="Footer Placeholder 4">
             <a:extLst>
               <a:ext uri="{FF2B5EF4-FFF2-40B4-BE49-F238E27FC236}">
-                <a16:creationId xmlns:a16="http://schemas.microsoft.com/office/drawing/2014/main" id="{EF60138B-0000-DA01-D8BE-F5C4B28C2ABA}"/>
+                <a16:creationId xmlns:a16="http://schemas.microsoft.com/office/drawing/2014/main" id="{55911F4B-75B6-3E59-2DE3-C5F3741CD2E6}"/>
               </a:ext>
             </a:extLst>
           </p:cNvPr>
@@ -698,7 +693,7 @@
           <a:bodyPr/>
           <a:lstStyle/>
           <a:p>
-            <a:endParaRPr lang="en-US" dirty="0"/>
+            <a:endParaRPr lang="en-SG"/>
           </a:p>
         </p:txBody>
       </p:sp>
@@ -707,7 +702,7 @@
           <p:cNvPr id="6" name="Slide Number Placeholder 5">
             <a:extLst>
               <a:ext uri="{FF2B5EF4-FFF2-40B4-BE49-F238E27FC236}">
-                <a16:creationId xmlns:a16="http://schemas.microsoft.com/office/drawing/2014/main" id="{9411C09D-35FF-9490-25AB-BBF0E29DD1DE}"/>
+                <a16:creationId xmlns:a16="http://schemas.microsoft.com/office/drawing/2014/main" id="{16584D61-ACE9-4A7C-84F3-21169B186757}"/>
               </a:ext>
             </a:extLst>
           </p:cNvPr>
@@ -723,18 +718,18 @@
           <a:bodyPr/>
           <a:lstStyle/>
           <a:p>
-            <a:fld id="{70C12960-6E85-460F-B6E3-5B82CB31AF3D}" type="slidenum">
-              <a:rPr lang="en-US" smtClean="0"/>
+            <a:fld id="{10E188DE-64F0-4311-81FB-EC275E4C46D9}" type="slidenum">
+              <a:rPr lang="en-SG" smtClean="0"/>
               <a:t>‹#›</a:t>
             </a:fld>
-            <a:endParaRPr lang="en-US"/>
+            <a:endParaRPr lang="en-SG"/>
           </a:p>
         </p:txBody>
       </p:sp>
     </p:spTree>
     <p:extLst>
       <p:ext uri="{BB962C8B-B14F-4D97-AF65-F5344CB8AC3E}">
-        <p14:creationId xmlns:p14="http://schemas.microsoft.com/office/powerpoint/2010/main" val="2158343349"/>
+        <p14:creationId xmlns:p14="http://schemas.microsoft.com/office/powerpoint/2010/main" val="744698688"/>
       </p:ext>
     </p:extLst>
   </p:cSld>
@@ -766,7 +761,7 @@
           <p:cNvPr id="2" name="Title 1">
             <a:extLst>
               <a:ext uri="{FF2B5EF4-FFF2-40B4-BE49-F238E27FC236}">
-                <a16:creationId xmlns:a16="http://schemas.microsoft.com/office/drawing/2014/main" id="{6D2476B2-E038-E3E5-2362-68FBFBAD1830}"/>
+                <a16:creationId xmlns:a16="http://schemas.microsoft.com/office/drawing/2014/main" id="{8A48A177-22E1-FF0D-1D35-BD6C37A42F6A}"/>
               </a:ext>
             </a:extLst>
           </p:cNvPr>
@@ -795,7 +790,7 @@
           <p:cNvPr id="3" name="Content Placeholder 2">
             <a:extLst>
               <a:ext uri="{FF2B5EF4-FFF2-40B4-BE49-F238E27FC236}">
-                <a16:creationId xmlns:a16="http://schemas.microsoft.com/office/drawing/2014/main" id="{2D9D4837-415D-04D5-D820-D8788BD8F7A4}"/>
+                <a16:creationId xmlns:a16="http://schemas.microsoft.com/office/drawing/2014/main" id="{9CBBD72B-DDDE-00AD-B50E-C985017E09EF}"/>
               </a:ext>
             </a:extLst>
           </p:cNvPr>
@@ -853,7 +848,7 @@
           <p:cNvPr id="4" name="Date Placeholder 3">
             <a:extLst>
               <a:ext uri="{FF2B5EF4-FFF2-40B4-BE49-F238E27FC236}">
-                <a16:creationId xmlns:a16="http://schemas.microsoft.com/office/drawing/2014/main" id="{9BCC9EC5-E0C8-73FF-37ED-B939E092C222}"/>
+                <a16:creationId xmlns:a16="http://schemas.microsoft.com/office/drawing/2014/main" id="{A9587573-E772-7961-B1D3-F5429B9C4076}"/>
               </a:ext>
             </a:extLst>
           </p:cNvPr>
@@ -869,11 +864,11 @@
           <a:bodyPr/>
           <a:lstStyle/>
           <a:p>
-            <a:fld id="{9F89F774-3FA6-43B8-9241-99959C8FD463}" type="datetime1">
-              <a:rPr lang="en-US" smtClean="0"/>
-              <a:t>9/18/2025</a:t>
+            <a:fld id="{9FF3E6ED-C832-4343-8B91-8E72B7796AC5}" type="datetimeFigureOut">
+              <a:rPr lang="en-SG" smtClean="0"/>
+              <a:t>18/9/2025</a:t>
             </a:fld>
-            <a:endParaRPr lang="en-US"/>
+            <a:endParaRPr lang="en-SG"/>
           </a:p>
         </p:txBody>
       </p:sp>
@@ -882,7 +877,7 @@
           <p:cNvPr id="5" name="Footer Placeholder 4">
             <a:extLst>
               <a:ext uri="{FF2B5EF4-FFF2-40B4-BE49-F238E27FC236}">
-                <a16:creationId xmlns:a16="http://schemas.microsoft.com/office/drawing/2014/main" id="{7E408A3D-A1C3-3DCF-622A-EFC6BD83856D}"/>
+                <a16:creationId xmlns:a16="http://schemas.microsoft.com/office/drawing/2014/main" id="{97001175-9F93-E6FF-64E2-01BBC003A2E9}"/>
               </a:ext>
             </a:extLst>
           </p:cNvPr>
@@ -898,7 +893,7 @@
           <a:bodyPr/>
           <a:lstStyle/>
           <a:p>
-            <a:endParaRPr lang="en-US" dirty="0"/>
+            <a:endParaRPr lang="en-SG"/>
           </a:p>
         </p:txBody>
       </p:sp>
@@ -907,7 +902,7 @@
           <p:cNvPr id="6" name="Slide Number Placeholder 5">
             <a:extLst>
               <a:ext uri="{FF2B5EF4-FFF2-40B4-BE49-F238E27FC236}">
-                <a16:creationId xmlns:a16="http://schemas.microsoft.com/office/drawing/2014/main" id="{205CB4B7-106B-F6A7-31B1-CBC08D2A3806}"/>
+                <a16:creationId xmlns:a16="http://schemas.microsoft.com/office/drawing/2014/main" id="{82902AB4-AD52-72E5-36B2-349C4E1F25C0}"/>
               </a:ext>
             </a:extLst>
           </p:cNvPr>
@@ -923,18 +918,18 @@
           <a:bodyPr/>
           <a:lstStyle/>
           <a:p>
-            <a:fld id="{70C12960-6E85-460F-B6E3-5B82CB31AF3D}" type="slidenum">
-              <a:rPr lang="en-US" smtClean="0"/>
+            <a:fld id="{10E188DE-64F0-4311-81FB-EC275E4C46D9}" type="slidenum">
+              <a:rPr lang="en-SG" smtClean="0"/>
               <a:t>‹#›</a:t>
             </a:fld>
-            <a:endParaRPr lang="en-US"/>
+            <a:endParaRPr lang="en-SG"/>
           </a:p>
         </p:txBody>
       </p:sp>
     </p:spTree>
     <p:extLst>
       <p:ext uri="{BB962C8B-B14F-4D97-AF65-F5344CB8AC3E}">
-        <p14:creationId xmlns:p14="http://schemas.microsoft.com/office/powerpoint/2010/main" val="3670219443"/>
+        <p14:creationId xmlns:p14="http://schemas.microsoft.com/office/powerpoint/2010/main" val="461674375"/>
       </p:ext>
     </p:extLst>
   </p:cSld>
@@ -966,7 +961,7 @@
           <p:cNvPr id="2" name="Title 1">
             <a:extLst>
               <a:ext uri="{FF2B5EF4-FFF2-40B4-BE49-F238E27FC236}">
-                <a16:creationId xmlns:a16="http://schemas.microsoft.com/office/drawing/2014/main" id="{074D0673-D214-3803-C5D3-94E88C26A6E8}"/>
+                <a16:creationId xmlns:a16="http://schemas.microsoft.com/office/drawing/2014/main" id="{AA8A29F2-9AAC-10CE-56F3-4F43E7120F58}"/>
               </a:ext>
             </a:extLst>
           </p:cNvPr>
@@ -1004,7 +999,7 @@
           <p:cNvPr id="3" name="Text Placeholder 2">
             <a:extLst>
               <a:ext uri="{FF2B5EF4-FFF2-40B4-BE49-F238E27FC236}">
-                <a16:creationId xmlns:a16="http://schemas.microsoft.com/office/drawing/2014/main" id="{05D8F3F4-AE76-A073-D25A-C0D0074245B6}"/>
+                <a16:creationId xmlns:a16="http://schemas.microsoft.com/office/drawing/2014/main" id="{6F5E0627-D212-3401-A37E-0BA0BEC436AB}"/>
               </a:ext>
             </a:extLst>
           </p:cNvPr>
@@ -1129,7 +1124,7 @@
           <p:cNvPr id="4" name="Date Placeholder 3">
             <a:extLst>
               <a:ext uri="{FF2B5EF4-FFF2-40B4-BE49-F238E27FC236}">
-                <a16:creationId xmlns:a16="http://schemas.microsoft.com/office/drawing/2014/main" id="{9F426008-1629-EB1B-1048-C15B4F72A536}"/>
+                <a16:creationId xmlns:a16="http://schemas.microsoft.com/office/drawing/2014/main" id="{11A7D6FE-83DB-E514-DB95-C1789B75D9AD}"/>
               </a:ext>
             </a:extLst>
           </p:cNvPr>
@@ -1145,11 +1140,11 @@
           <a:bodyPr/>
           <a:lstStyle/>
           <a:p>
-            <a:fld id="{F9504452-5DCC-4FE2-A5C9-8A5EF6714D65}" type="datetime1">
-              <a:rPr lang="en-US" smtClean="0"/>
-              <a:t>9/18/2025</a:t>
+            <a:fld id="{9FF3E6ED-C832-4343-8B91-8E72B7796AC5}" type="datetimeFigureOut">
+              <a:rPr lang="en-SG" smtClean="0"/>
+              <a:t>18/9/2025</a:t>
             </a:fld>
-            <a:endParaRPr lang="en-US"/>
+            <a:endParaRPr lang="en-SG"/>
           </a:p>
         </p:txBody>
       </p:sp>
@@ -1158,7 +1153,7 @@
           <p:cNvPr id="5" name="Footer Placeholder 4">
             <a:extLst>
               <a:ext uri="{FF2B5EF4-FFF2-40B4-BE49-F238E27FC236}">
-                <a16:creationId xmlns:a16="http://schemas.microsoft.com/office/drawing/2014/main" id="{92B85F01-E4FA-61BF-5637-27663130C9BF}"/>
+                <a16:creationId xmlns:a16="http://schemas.microsoft.com/office/drawing/2014/main" id="{8DA1DC91-41AA-D2F2-59B4-F0D9BBC33F72}"/>
               </a:ext>
             </a:extLst>
           </p:cNvPr>
@@ -1174,7 +1169,7 @@
           <a:bodyPr/>
           <a:lstStyle/>
           <a:p>
-            <a:endParaRPr lang="en-US" dirty="0"/>
+            <a:endParaRPr lang="en-SG"/>
           </a:p>
         </p:txBody>
       </p:sp>
@@ -1183,7 +1178,7 @@
           <p:cNvPr id="6" name="Slide Number Placeholder 5">
             <a:extLst>
               <a:ext uri="{FF2B5EF4-FFF2-40B4-BE49-F238E27FC236}">
-                <a16:creationId xmlns:a16="http://schemas.microsoft.com/office/drawing/2014/main" id="{055B3558-AC26-66A0-A4F2-C91BF7B577CF}"/>
+                <a16:creationId xmlns:a16="http://schemas.microsoft.com/office/drawing/2014/main" id="{EA0C843E-028A-5795-E0C7-5B9C8DD55096}"/>
               </a:ext>
             </a:extLst>
           </p:cNvPr>
@@ -1199,18 +1194,18 @@
           <a:bodyPr/>
           <a:lstStyle/>
           <a:p>
-            <a:fld id="{70C12960-6E85-460F-B6E3-5B82CB31AF3D}" type="slidenum">
-              <a:rPr lang="en-US" smtClean="0"/>
+            <a:fld id="{10E188DE-64F0-4311-81FB-EC275E4C46D9}" type="slidenum">
+              <a:rPr lang="en-SG" smtClean="0"/>
               <a:t>‹#›</a:t>
             </a:fld>
-            <a:endParaRPr lang="en-US"/>
+            <a:endParaRPr lang="en-SG"/>
           </a:p>
         </p:txBody>
       </p:sp>
     </p:spTree>
     <p:extLst>
       <p:ext uri="{BB962C8B-B14F-4D97-AF65-F5344CB8AC3E}">
-        <p14:creationId xmlns:p14="http://schemas.microsoft.com/office/powerpoint/2010/main" val="2305373505"/>
+        <p14:creationId xmlns:p14="http://schemas.microsoft.com/office/powerpoint/2010/main" val="1033804278"/>
       </p:ext>
     </p:extLst>
   </p:cSld>
@@ -1242,7 +1237,7 @@
           <p:cNvPr id="2" name="Title 1">
             <a:extLst>
               <a:ext uri="{FF2B5EF4-FFF2-40B4-BE49-F238E27FC236}">
-                <a16:creationId xmlns:a16="http://schemas.microsoft.com/office/drawing/2014/main" id="{223BEEFB-15EC-AE18-6848-405F3E6F31A0}"/>
+                <a16:creationId xmlns:a16="http://schemas.microsoft.com/office/drawing/2014/main" id="{635A2461-1747-4DBA-8BAA-5853AAF510A3}"/>
               </a:ext>
             </a:extLst>
           </p:cNvPr>
@@ -1271,7 +1266,7 @@
           <p:cNvPr id="3" name="Content Placeholder 2">
             <a:extLst>
               <a:ext uri="{FF2B5EF4-FFF2-40B4-BE49-F238E27FC236}">
-                <a16:creationId xmlns:a16="http://schemas.microsoft.com/office/drawing/2014/main" id="{8212D805-7F50-25C8-772E-378DFD92D2BA}"/>
+                <a16:creationId xmlns:a16="http://schemas.microsoft.com/office/drawing/2014/main" id="{6BA3614F-D52D-091D-662F-55BF551D15DA}"/>
               </a:ext>
             </a:extLst>
           </p:cNvPr>
@@ -1334,7 +1329,7 @@
           <p:cNvPr id="4" name="Content Placeholder 3">
             <a:extLst>
               <a:ext uri="{FF2B5EF4-FFF2-40B4-BE49-F238E27FC236}">
-                <a16:creationId xmlns:a16="http://schemas.microsoft.com/office/drawing/2014/main" id="{303D5904-79F4-78DE-41FA-7AE57CFBAE49}"/>
+                <a16:creationId xmlns:a16="http://schemas.microsoft.com/office/drawing/2014/main" id="{15B57080-22DD-49C1-0D90-80BDD22E89B8}"/>
               </a:ext>
             </a:extLst>
           </p:cNvPr>
@@ -1397,7 +1392,7 @@
           <p:cNvPr id="5" name="Date Placeholder 4">
             <a:extLst>
               <a:ext uri="{FF2B5EF4-FFF2-40B4-BE49-F238E27FC236}">
-                <a16:creationId xmlns:a16="http://schemas.microsoft.com/office/drawing/2014/main" id="{51780583-E927-9803-7D8F-1AE11F853066}"/>
+                <a16:creationId xmlns:a16="http://schemas.microsoft.com/office/drawing/2014/main" id="{6A00D0B6-FC2B-56FF-1156-C33C874756F4}"/>
               </a:ext>
             </a:extLst>
           </p:cNvPr>
@@ -1413,11 +1408,11 @@
           <a:bodyPr/>
           <a:lstStyle/>
           <a:p>
-            <a:fld id="{E579ABC2-0180-4F3A-A895-A85BC724D472}" type="datetime1">
-              <a:rPr lang="en-US" smtClean="0"/>
-              <a:t>9/18/2025</a:t>
+            <a:fld id="{9FF3E6ED-C832-4343-8B91-8E72B7796AC5}" type="datetimeFigureOut">
+              <a:rPr lang="en-SG" smtClean="0"/>
+              <a:t>18/9/2025</a:t>
             </a:fld>
-            <a:endParaRPr lang="en-US"/>
+            <a:endParaRPr lang="en-SG"/>
           </a:p>
         </p:txBody>
       </p:sp>
@@ -1426,7 +1421,7 @@
           <p:cNvPr id="6" name="Footer Placeholder 5">
             <a:extLst>
               <a:ext uri="{FF2B5EF4-FFF2-40B4-BE49-F238E27FC236}">
-                <a16:creationId xmlns:a16="http://schemas.microsoft.com/office/drawing/2014/main" id="{4DA237FE-6C47-F1E2-7AEA-B8BCF7C94D06}"/>
+                <a16:creationId xmlns:a16="http://schemas.microsoft.com/office/drawing/2014/main" id="{3B271C6A-73D5-2AAB-8F20-A97A777FC28C}"/>
               </a:ext>
             </a:extLst>
           </p:cNvPr>
@@ -1442,7 +1437,7 @@
           <a:bodyPr/>
           <a:lstStyle/>
           <a:p>
-            <a:endParaRPr lang="en-US" dirty="0"/>
+            <a:endParaRPr lang="en-SG"/>
           </a:p>
         </p:txBody>
       </p:sp>
@@ -1451,7 +1446,7 @@
           <p:cNvPr id="7" name="Slide Number Placeholder 6">
             <a:extLst>
               <a:ext uri="{FF2B5EF4-FFF2-40B4-BE49-F238E27FC236}">
-                <a16:creationId xmlns:a16="http://schemas.microsoft.com/office/drawing/2014/main" id="{F89F9A85-D07B-C791-8F04-5BCF943427B8}"/>
+                <a16:creationId xmlns:a16="http://schemas.microsoft.com/office/drawing/2014/main" id="{FCDC31D2-4D44-BC6E-00DE-DB31C5E00EE7}"/>
               </a:ext>
             </a:extLst>
           </p:cNvPr>
@@ -1467,18 +1462,18 @@
           <a:bodyPr/>
           <a:lstStyle/>
           <a:p>
-            <a:fld id="{70C12960-6E85-460F-B6E3-5B82CB31AF3D}" type="slidenum">
-              <a:rPr lang="en-US" smtClean="0"/>
+            <a:fld id="{10E188DE-64F0-4311-81FB-EC275E4C46D9}" type="slidenum">
+              <a:rPr lang="en-SG" smtClean="0"/>
               <a:t>‹#›</a:t>
             </a:fld>
-            <a:endParaRPr lang="en-US"/>
+            <a:endParaRPr lang="en-SG"/>
           </a:p>
         </p:txBody>
       </p:sp>
     </p:spTree>
     <p:extLst>
       <p:ext uri="{BB962C8B-B14F-4D97-AF65-F5344CB8AC3E}">
-        <p14:creationId xmlns:p14="http://schemas.microsoft.com/office/powerpoint/2010/main" val="276727760"/>
+        <p14:creationId xmlns:p14="http://schemas.microsoft.com/office/powerpoint/2010/main" val="4120019503"/>
       </p:ext>
     </p:extLst>
   </p:cSld>
@@ -1510,7 +1505,7 @@
           <p:cNvPr id="2" name="Title 1">
             <a:extLst>
               <a:ext uri="{FF2B5EF4-FFF2-40B4-BE49-F238E27FC236}">
-                <a16:creationId xmlns:a16="http://schemas.microsoft.com/office/drawing/2014/main" id="{B0C689B1-DD82-8ABE-A157-668948C34B79}"/>
+                <a16:creationId xmlns:a16="http://schemas.microsoft.com/office/drawing/2014/main" id="{ADDBF3F2-4E6E-8EA7-BD86-1C82A8B96570}"/>
               </a:ext>
             </a:extLst>
           </p:cNvPr>
@@ -1544,7 +1539,7 @@
           <p:cNvPr id="3" name="Text Placeholder 2">
             <a:extLst>
               <a:ext uri="{FF2B5EF4-FFF2-40B4-BE49-F238E27FC236}">
-                <a16:creationId xmlns:a16="http://schemas.microsoft.com/office/drawing/2014/main" id="{98264BAF-9DFD-39B5-60A3-D85D5BE589AB}"/>
+                <a16:creationId xmlns:a16="http://schemas.microsoft.com/office/drawing/2014/main" id="{319A84AA-0470-435D-198C-29628507850A}"/>
               </a:ext>
             </a:extLst>
           </p:cNvPr>
@@ -1615,7 +1610,7 @@
           <p:cNvPr id="4" name="Content Placeholder 3">
             <a:extLst>
               <a:ext uri="{FF2B5EF4-FFF2-40B4-BE49-F238E27FC236}">
-                <a16:creationId xmlns:a16="http://schemas.microsoft.com/office/drawing/2014/main" id="{66182515-FF57-FB85-5187-4BB62BFDF14B}"/>
+                <a16:creationId xmlns:a16="http://schemas.microsoft.com/office/drawing/2014/main" id="{D585D72C-B530-E33E-9B6F-2957EE5B5C2F}"/>
               </a:ext>
             </a:extLst>
           </p:cNvPr>
@@ -1678,7 +1673,7 @@
           <p:cNvPr id="5" name="Text Placeholder 4">
             <a:extLst>
               <a:ext uri="{FF2B5EF4-FFF2-40B4-BE49-F238E27FC236}">
-                <a16:creationId xmlns:a16="http://schemas.microsoft.com/office/drawing/2014/main" id="{212E4A3A-4F76-B172-A8AB-98607D82423E}"/>
+                <a16:creationId xmlns:a16="http://schemas.microsoft.com/office/drawing/2014/main" id="{0AAB3041-DED9-91DD-2AC8-DF28ED26A45C}"/>
               </a:ext>
             </a:extLst>
           </p:cNvPr>
@@ -1749,7 +1744,7 @@
           <p:cNvPr id="6" name="Content Placeholder 5">
             <a:extLst>
               <a:ext uri="{FF2B5EF4-FFF2-40B4-BE49-F238E27FC236}">
-                <a16:creationId xmlns:a16="http://schemas.microsoft.com/office/drawing/2014/main" id="{5F35BF08-0CF0-F7AA-5022-F51B7E9E5179}"/>
+                <a16:creationId xmlns:a16="http://schemas.microsoft.com/office/drawing/2014/main" id="{C09D37E6-23AA-D742-555F-EBB769D2B899}"/>
               </a:ext>
             </a:extLst>
           </p:cNvPr>
@@ -1812,7 +1807,7 @@
           <p:cNvPr id="7" name="Date Placeholder 6">
             <a:extLst>
               <a:ext uri="{FF2B5EF4-FFF2-40B4-BE49-F238E27FC236}">
-                <a16:creationId xmlns:a16="http://schemas.microsoft.com/office/drawing/2014/main" id="{10A8BF51-477E-AA35-AB8C-BCDBF39A3525}"/>
+                <a16:creationId xmlns:a16="http://schemas.microsoft.com/office/drawing/2014/main" id="{A65EAB5D-F3B6-8EAD-5E4E-08772E3211ED}"/>
               </a:ext>
             </a:extLst>
           </p:cNvPr>
@@ -1828,11 +1823,11 @@
           <a:bodyPr/>
           <a:lstStyle/>
           <a:p>
-            <a:fld id="{6AEEA9BA-4E8F-439E-BEA4-91FBA01E3F5F}" type="datetime1">
-              <a:rPr lang="en-US" smtClean="0"/>
-              <a:t>9/18/2025</a:t>
+            <a:fld id="{9FF3E6ED-C832-4343-8B91-8E72B7796AC5}" type="datetimeFigureOut">
+              <a:rPr lang="en-SG" smtClean="0"/>
+              <a:t>18/9/2025</a:t>
             </a:fld>
-            <a:endParaRPr lang="en-US"/>
+            <a:endParaRPr lang="en-SG"/>
           </a:p>
         </p:txBody>
       </p:sp>
@@ -1841,7 +1836,7 @@
           <p:cNvPr id="8" name="Footer Placeholder 7">
             <a:extLst>
               <a:ext uri="{FF2B5EF4-FFF2-40B4-BE49-F238E27FC236}">
-                <a16:creationId xmlns:a16="http://schemas.microsoft.com/office/drawing/2014/main" id="{CD919009-15B8-BFFF-7293-F8698CE716C0}"/>
+                <a16:creationId xmlns:a16="http://schemas.microsoft.com/office/drawing/2014/main" id="{91D89270-46B4-858A-3767-A473780AC220}"/>
               </a:ext>
             </a:extLst>
           </p:cNvPr>
@@ -1857,7 +1852,7 @@
           <a:bodyPr/>
           <a:lstStyle/>
           <a:p>
-            <a:endParaRPr lang="en-US" dirty="0"/>
+            <a:endParaRPr lang="en-SG"/>
           </a:p>
         </p:txBody>
       </p:sp>
@@ -1866,7 +1861,7 @@
           <p:cNvPr id="9" name="Slide Number Placeholder 8">
             <a:extLst>
               <a:ext uri="{FF2B5EF4-FFF2-40B4-BE49-F238E27FC236}">
-                <a16:creationId xmlns:a16="http://schemas.microsoft.com/office/drawing/2014/main" id="{31DC370C-42CE-6E2A-D431-661B15B7097C}"/>
+                <a16:creationId xmlns:a16="http://schemas.microsoft.com/office/drawing/2014/main" id="{921CC4A0-6924-A311-D2E3-5E2F2CA708A1}"/>
               </a:ext>
             </a:extLst>
           </p:cNvPr>
@@ -1882,18 +1877,18 @@
           <a:bodyPr/>
           <a:lstStyle/>
           <a:p>
-            <a:fld id="{70C12960-6E85-460F-B6E3-5B82CB31AF3D}" type="slidenum">
-              <a:rPr lang="en-US" smtClean="0"/>
+            <a:fld id="{10E188DE-64F0-4311-81FB-EC275E4C46D9}" type="slidenum">
+              <a:rPr lang="en-SG" smtClean="0"/>
               <a:t>‹#›</a:t>
             </a:fld>
-            <a:endParaRPr lang="en-US"/>
+            <a:endParaRPr lang="en-SG"/>
           </a:p>
         </p:txBody>
       </p:sp>
     </p:spTree>
     <p:extLst>
       <p:ext uri="{BB962C8B-B14F-4D97-AF65-F5344CB8AC3E}">
-        <p14:creationId xmlns:p14="http://schemas.microsoft.com/office/powerpoint/2010/main" val="1142057279"/>
+        <p14:creationId xmlns:p14="http://schemas.microsoft.com/office/powerpoint/2010/main" val="2036352683"/>
       </p:ext>
     </p:extLst>
   </p:cSld>
@@ -1925,7 +1920,7 @@
           <p:cNvPr id="2" name="Title 1">
             <a:extLst>
               <a:ext uri="{FF2B5EF4-FFF2-40B4-BE49-F238E27FC236}">
-                <a16:creationId xmlns:a16="http://schemas.microsoft.com/office/drawing/2014/main" id="{60D8274E-EB56-CEA3-CB86-AAB13AEA03D7}"/>
+                <a16:creationId xmlns:a16="http://schemas.microsoft.com/office/drawing/2014/main" id="{2CFA05E7-4271-5EA4-129A-84D704A50B15}"/>
               </a:ext>
             </a:extLst>
           </p:cNvPr>
@@ -1954,7 +1949,7 @@
           <p:cNvPr id="3" name="Date Placeholder 2">
             <a:extLst>
               <a:ext uri="{FF2B5EF4-FFF2-40B4-BE49-F238E27FC236}">
-                <a16:creationId xmlns:a16="http://schemas.microsoft.com/office/drawing/2014/main" id="{811E25C9-41FB-C609-F99F-708F4A2CF4D5}"/>
+                <a16:creationId xmlns:a16="http://schemas.microsoft.com/office/drawing/2014/main" id="{9305BE19-EDB1-8736-E541-8BFD12933DE8}"/>
               </a:ext>
             </a:extLst>
           </p:cNvPr>
@@ -1970,11 +1965,11 @@
           <a:bodyPr/>
           <a:lstStyle/>
           <a:p>
-            <a:fld id="{BE15BF18-0007-481C-AA29-413124BC3EE7}" type="datetime1">
-              <a:rPr lang="en-US" smtClean="0"/>
-              <a:t>9/18/2025</a:t>
+            <a:fld id="{9FF3E6ED-C832-4343-8B91-8E72B7796AC5}" type="datetimeFigureOut">
+              <a:rPr lang="en-SG" smtClean="0"/>
+              <a:t>18/9/2025</a:t>
             </a:fld>
-            <a:endParaRPr lang="en-US"/>
+            <a:endParaRPr lang="en-SG"/>
           </a:p>
         </p:txBody>
       </p:sp>
@@ -1983,7 +1978,7 @@
           <p:cNvPr id="4" name="Footer Placeholder 3">
             <a:extLst>
               <a:ext uri="{FF2B5EF4-FFF2-40B4-BE49-F238E27FC236}">
-                <a16:creationId xmlns:a16="http://schemas.microsoft.com/office/drawing/2014/main" id="{E4C42D7B-8126-1312-2E0A-45C85FD5D7C4}"/>
+                <a16:creationId xmlns:a16="http://schemas.microsoft.com/office/drawing/2014/main" id="{7D8069DD-9619-77FF-DF95-35B758B3583C}"/>
               </a:ext>
             </a:extLst>
           </p:cNvPr>
@@ -1999,7 +1994,7 @@
           <a:bodyPr/>
           <a:lstStyle/>
           <a:p>
-            <a:endParaRPr lang="en-US" dirty="0"/>
+            <a:endParaRPr lang="en-SG"/>
           </a:p>
         </p:txBody>
       </p:sp>
@@ -2008,7 +2003,7 @@
           <p:cNvPr id="5" name="Slide Number Placeholder 4">
             <a:extLst>
               <a:ext uri="{FF2B5EF4-FFF2-40B4-BE49-F238E27FC236}">
-                <a16:creationId xmlns:a16="http://schemas.microsoft.com/office/drawing/2014/main" id="{A0F4695A-C6A7-0254-A6A5-63AD41203FCB}"/>
+                <a16:creationId xmlns:a16="http://schemas.microsoft.com/office/drawing/2014/main" id="{EE47F465-A07E-F376-7B55-D0ACF4DFC6C2}"/>
               </a:ext>
             </a:extLst>
           </p:cNvPr>
@@ -2024,18 +2019,18 @@
           <a:bodyPr/>
           <a:lstStyle/>
           <a:p>
-            <a:fld id="{70C12960-6E85-460F-B6E3-5B82CB31AF3D}" type="slidenum">
-              <a:rPr lang="en-US" smtClean="0"/>
+            <a:fld id="{10E188DE-64F0-4311-81FB-EC275E4C46D9}" type="slidenum">
+              <a:rPr lang="en-SG" smtClean="0"/>
               <a:t>‹#›</a:t>
             </a:fld>
-            <a:endParaRPr lang="en-US"/>
+            <a:endParaRPr lang="en-SG"/>
           </a:p>
         </p:txBody>
       </p:sp>
     </p:spTree>
     <p:extLst>
       <p:ext uri="{BB962C8B-B14F-4D97-AF65-F5344CB8AC3E}">
-        <p14:creationId xmlns:p14="http://schemas.microsoft.com/office/powerpoint/2010/main" val="42595606"/>
+        <p14:creationId xmlns:p14="http://schemas.microsoft.com/office/powerpoint/2010/main" val="18714658"/>
       </p:ext>
     </p:extLst>
   </p:cSld>
@@ -2067,7 +2062,7 @@
           <p:cNvPr id="2" name="Date Placeholder 1">
             <a:extLst>
               <a:ext uri="{FF2B5EF4-FFF2-40B4-BE49-F238E27FC236}">
-                <a16:creationId xmlns:a16="http://schemas.microsoft.com/office/drawing/2014/main" id="{1387831F-9BCF-A322-8735-A6C27A656BA4}"/>
+                <a16:creationId xmlns:a16="http://schemas.microsoft.com/office/drawing/2014/main" id="{C44C7557-5BF7-4C91-850F-112AFB1EC644}"/>
               </a:ext>
             </a:extLst>
           </p:cNvPr>
@@ -2083,11 +2078,11 @@
           <a:bodyPr/>
           <a:lstStyle/>
           <a:p>
-            <a:fld id="{09BE9870-3748-43AD-B547-02A075CB4A1D}" type="datetime1">
-              <a:rPr lang="en-US" smtClean="0"/>
-              <a:t>9/18/2025</a:t>
+            <a:fld id="{9FF3E6ED-C832-4343-8B91-8E72B7796AC5}" type="datetimeFigureOut">
+              <a:rPr lang="en-SG" smtClean="0"/>
+              <a:t>18/9/2025</a:t>
             </a:fld>
-            <a:endParaRPr lang="en-US"/>
+            <a:endParaRPr lang="en-SG"/>
           </a:p>
         </p:txBody>
       </p:sp>
@@ -2096,7 +2091,7 @@
           <p:cNvPr id="3" name="Footer Placeholder 2">
             <a:extLst>
               <a:ext uri="{FF2B5EF4-FFF2-40B4-BE49-F238E27FC236}">
-                <a16:creationId xmlns:a16="http://schemas.microsoft.com/office/drawing/2014/main" id="{F0869956-C81E-99AD-0D2B-E5541F5A5880}"/>
+                <a16:creationId xmlns:a16="http://schemas.microsoft.com/office/drawing/2014/main" id="{EC713724-C0F6-D9EB-11A9-CC6FC1AEF54E}"/>
               </a:ext>
             </a:extLst>
           </p:cNvPr>
@@ -2112,7 +2107,7 @@
           <a:bodyPr/>
           <a:lstStyle/>
           <a:p>
-            <a:endParaRPr lang="en-US" dirty="0"/>
+            <a:endParaRPr lang="en-SG"/>
           </a:p>
         </p:txBody>
       </p:sp>
@@ -2121,7 +2116,7 @@
           <p:cNvPr id="4" name="Slide Number Placeholder 3">
             <a:extLst>
               <a:ext uri="{FF2B5EF4-FFF2-40B4-BE49-F238E27FC236}">
-                <a16:creationId xmlns:a16="http://schemas.microsoft.com/office/drawing/2014/main" id="{BCDD229B-EF0F-FF55-7030-1BD7DDD9B000}"/>
+                <a16:creationId xmlns:a16="http://schemas.microsoft.com/office/drawing/2014/main" id="{088E7114-B780-57E8-7F6E-157D8A247149}"/>
               </a:ext>
             </a:extLst>
           </p:cNvPr>
@@ -2137,18 +2132,18 @@
           <a:bodyPr/>
           <a:lstStyle/>
           <a:p>
-            <a:fld id="{70C12960-6E85-460F-B6E3-5B82CB31AF3D}" type="slidenum">
-              <a:rPr lang="en-US" smtClean="0"/>
+            <a:fld id="{10E188DE-64F0-4311-81FB-EC275E4C46D9}" type="slidenum">
+              <a:rPr lang="en-SG" smtClean="0"/>
               <a:t>‹#›</a:t>
             </a:fld>
-            <a:endParaRPr lang="en-US"/>
+            <a:endParaRPr lang="en-SG"/>
           </a:p>
         </p:txBody>
       </p:sp>
     </p:spTree>
     <p:extLst>
       <p:ext uri="{BB962C8B-B14F-4D97-AF65-F5344CB8AC3E}">
-        <p14:creationId xmlns:p14="http://schemas.microsoft.com/office/powerpoint/2010/main" val="604903328"/>
+        <p14:creationId xmlns:p14="http://schemas.microsoft.com/office/powerpoint/2010/main" val="59112222"/>
       </p:ext>
     </p:extLst>
   </p:cSld>
@@ -2180,7 +2175,7 @@
           <p:cNvPr id="2" name="Title 1">
             <a:extLst>
               <a:ext uri="{FF2B5EF4-FFF2-40B4-BE49-F238E27FC236}">
-                <a16:creationId xmlns:a16="http://schemas.microsoft.com/office/drawing/2014/main" id="{248C77B1-A553-23C9-A224-3D469E5651A8}"/>
+                <a16:creationId xmlns:a16="http://schemas.microsoft.com/office/drawing/2014/main" id="{16A5A224-CD7B-7437-2D97-BD7C0B3D1BB4}"/>
               </a:ext>
             </a:extLst>
           </p:cNvPr>
@@ -2218,7 +2213,7 @@
           <p:cNvPr id="3" name="Content Placeholder 2">
             <a:extLst>
               <a:ext uri="{FF2B5EF4-FFF2-40B4-BE49-F238E27FC236}">
-                <a16:creationId xmlns:a16="http://schemas.microsoft.com/office/drawing/2014/main" id="{BAAFD247-D6AD-26C1-6593-F1AB7AAEEC7B}"/>
+                <a16:creationId xmlns:a16="http://schemas.microsoft.com/office/drawing/2014/main" id="{E117B0FC-763A-2CBF-DC28-5B8EE0E3418B}"/>
               </a:ext>
             </a:extLst>
           </p:cNvPr>
@@ -2309,7 +2304,7 @@
           <p:cNvPr id="4" name="Text Placeholder 3">
             <a:extLst>
               <a:ext uri="{FF2B5EF4-FFF2-40B4-BE49-F238E27FC236}">
-                <a16:creationId xmlns:a16="http://schemas.microsoft.com/office/drawing/2014/main" id="{59924909-A041-B158-90E6-7E35EFD07DBB}"/>
+                <a16:creationId xmlns:a16="http://schemas.microsoft.com/office/drawing/2014/main" id="{73B01638-8D31-D34B-F4B6-F6F570D320D4}"/>
               </a:ext>
             </a:extLst>
           </p:cNvPr>
@@ -2380,7 +2375,7 @@
           <p:cNvPr id="5" name="Date Placeholder 4">
             <a:extLst>
               <a:ext uri="{FF2B5EF4-FFF2-40B4-BE49-F238E27FC236}">
-                <a16:creationId xmlns:a16="http://schemas.microsoft.com/office/drawing/2014/main" id="{C827910A-14FB-7240-E782-510448889866}"/>
+                <a16:creationId xmlns:a16="http://schemas.microsoft.com/office/drawing/2014/main" id="{B6109311-B932-7F2D-394A-6EF329320CE9}"/>
               </a:ext>
             </a:extLst>
           </p:cNvPr>
@@ -2396,11 +2391,11 @@
           <a:bodyPr/>
           <a:lstStyle/>
           <a:p>
-            <a:fld id="{558E7897-33C5-4F1A-9307-D068E37F3DC7}" type="datetime1">
-              <a:rPr lang="en-US" smtClean="0"/>
-              <a:t>9/18/2025</a:t>
+            <a:fld id="{9FF3E6ED-C832-4343-8B91-8E72B7796AC5}" type="datetimeFigureOut">
+              <a:rPr lang="en-SG" smtClean="0"/>
+              <a:t>18/9/2025</a:t>
             </a:fld>
-            <a:endParaRPr lang="en-US"/>
+            <a:endParaRPr lang="en-SG"/>
           </a:p>
         </p:txBody>
       </p:sp>
@@ -2409,7 +2404,7 @@
           <p:cNvPr id="6" name="Footer Placeholder 5">
             <a:extLst>
               <a:ext uri="{FF2B5EF4-FFF2-40B4-BE49-F238E27FC236}">
-                <a16:creationId xmlns:a16="http://schemas.microsoft.com/office/drawing/2014/main" id="{0980F724-B31C-644D-DDFB-B8CF77EF9672}"/>
+                <a16:creationId xmlns:a16="http://schemas.microsoft.com/office/drawing/2014/main" id="{A2454ABA-2944-EC5A-A75A-AB4A73C3F494}"/>
               </a:ext>
             </a:extLst>
           </p:cNvPr>
@@ -2425,7 +2420,7 @@
           <a:bodyPr/>
           <a:lstStyle/>
           <a:p>
-            <a:endParaRPr lang="en-US" dirty="0"/>
+            <a:endParaRPr lang="en-SG"/>
           </a:p>
         </p:txBody>
       </p:sp>
@@ -2434,7 +2429,7 @@
           <p:cNvPr id="7" name="Slide Number Placeholder 6">
             <a:extLst>
               <a:ext uri="{FF2B5EF4-FFF2-40B4-BE49-F238E27FC236}">
-                <a16:creationId xmlns:a16="http://schemas.microsoft.com/office/drawing/2014/main" id="{6810E02A-4A26-26FF-64CD-1864FBEEF2C9}"/>
+                <a16:creationId xmlns:a16="http://schemas.microsoft.com/office/drawing/2014/main" id="{F5CDA7EC-EA77-56BB-2EE8-18B33C8F089B}"/>
               </a:ext>
             </a:extLst>
           </p:cNvPr>
@@ -2450,18 +2445,18 @@
           <a:bodyPr/>
           <a:lstStyle/>
           <a:p>
-            <a:fld id="{70C12960-6E85-460F-B6E3-5B82CB31AF3D}" type="slidenum">
-              <a:rPr lang="en-US" smtClean="0"/>
+            <a:fld id="{10E188DE-64F0-4311-81FB-EC275E4C46D9}" type="slidenum">
+              <a:rPr lang="en-SG" smtClean="0"/>
               <a:t>‹#›</a:t>
             </a:fld>
-            <a:endParaRPr lang="en-US"/>
+            <a:endParaRPr lang="en-SG"/>
           </a:p>
         </p:txBody>
       </p:sp>
     </p:spTree>
     <p:extLst>
       <p:ext uri="{BB962C8B-B14F-4D97-AF65-F5344CB8AC3E}">
-        <p14:creationId xmlns:p14="http://schemas.microsoft.com/office/powerpoint/2010/main" val="2338428904"/>
+        <p14:creationId xmlns:p14="http://schemas.microsoft.com/office/powerpoint/2010/main" val="3392969480"/>
       </p:ext>
     </p:extLst>
   </p:cSld>
@@ -2493,7 +2488,7 @@
           <p:cNvPr id="2" name="Title 1">
             <a:extLst>
               <a:ext uri="{FF2B5EF4-FFF2-40B4-BE49-F238E27FC236}">
-                <a16:creationId xmlns:a16="http://schemas.microsoft.com/office/drawing/2014/main" id="{1E45BEC5-714B-6CD3-CB0A-B410DA8892EE}"/>
+                <a16:creationId xmlns:a16="http://schemas.microsoft.com/office/drawing/2014/main" id="{B0F5E548-A9FF-B5F0-7B58-010C2FAA4240}"/>
               </a:ext>
             </a:extLst>
           </p:cNvPr>
@@ -2531,7 +2526,7 @@
           <p:cNvPr id="3" name="Picture Placeholder 2">
             <a:extLst>
               <a:ext uri="{FF2B5EF4-FFF2-40B4-BE49-F238E27FC236}">
-                <a16:creationId xmlns:a16="http://schemas.microsoft.com/office/drawing/2014/main" id="{2DC7612A-E32E-7DA6-6DCC-564BC1730585}"/>
+                <a16:creationId xmlns:a16="http://schemas.microsoft.com/office/drawing/2014/main" id="{972BACD0-B4B2-4DD7-DD51-60545AF36599}"/>
               </a:ext>
             </a:extLst>
           </p:cNvPr>
@@ -2598,7 +2593,7 @@
           <p:cNvPr id="4" name="Text Placeholder 3">
             <a:extLst>
               <a:ext uri="{FF2B5EF4-FFF2-40B4-BE49-F238E27FC236}">
-                <a16:creationId xmlns:a16="http://schemas.microsoft.com/office/drawing/2014/main" id="{87CF872E-B3C3-828B-4DB3-E2681909C2CC}"/>
+                <a16:creationId xmlns:a16="http://schemas.microsoft.com/office/drawing/2014/main" id="{5506C860-798D-383D-D0A0-4CA91E0705C5}"/>
               </a:ext>
             </a:extLst>
           </p:cNvPr>
@@ -2669,7 +2664,7 @@
           <p:cNvPr id="5" name="Date Placeholder 4">
             <a:extLst>
               <a:ext uri="{FF2B5EF4-FFF2-40B4-BE49-F238E27FC236}">
-                <a16:creationId xmlns:a16="http://schemas.microsoft.com/office/drawing/2014/main" id="{E2A283CF-4DFA-8576-368B-FCD26462BD62}"/>
+                <a16:creationId xmlns:a16="http://schemas.microsoft.com/office/drawing/2014/main" id="{35158818-AAA2-FBDD-C8F2-265C5C7C51E1}"/>
               </a:ext>
             </a:extLst>
           </p:cNvPr>
@@ -2685,11 +2680,11 @@
           <a:bodyPr/>
           <a:lstStyle/>
           <a:p>
-            <a:fld id="{82E171BA-CC09-47C8-A6DF-F5C5CB59CEEC}" type="datetime1">
-              <a:rPr lang="en-US" smtClean="0"/>
-              <a:t>9/18/2025</a:t>
+            <a:fld id="{9FF3E6ED-C832-4343-8B91-8E72B7796AC5}" type="datetimeFigureOut">
+              <a:rPr lang="en-SG" smtClean="0"/>
+              <a:t>18/9/2025</a:t>
             </a:fld>
-            <a:endParaRPr lang="en-US"/>
+            <a:endParaRPr lang="en-SG"/>
           </a:p>
         </p:txBody>
       </p:sp>
@@ -2698,7 +2693,7 @@
           <p:cNvPr id="6" name="Footer Placeholder 5">
             <a:extLst>
               <a:ext uri="{FF2B5EF4-FFF2-40B4-BE49-F238E27FC236}">
-                <a16:creationId xmlns:a16="http://schemas.microsoft.com/office/drawing/2014/main" id="{0ABB466B-1FB4-082A-F7D6-DACE5C8C3514}"/>
+                <a16:creationId xmlns:a16="http://schemas.microsoft.com/office/drawing/2014/main" id="{B5C3BF39-10DF-400F-9402-8CE2D682EE7A}"/>
               </a:ext>
             </a:extLst>
           </p:cNvPr>
@@ -2714,7 +2709,7 @@
           <a:bodyPr/>
           <a:lstStyle/>
           <a:p>
-            <a:endParaRPr lang="en-US" dirty="0"/>
+            <a:endParaRPr lang="en-SG"/>
           </a:p>
         </p:txBody>
       </p:sp>
@@ -2723,7 +2718,7 @@
           <p:cNvPr id="7" name="Slide Number Placeholder 6">
             <a:extLst>
               <a:ext uri="{FF2B5EF4-FFF2-40B4-BE49-F238E27FC236}">
-                <a16:creationId xmlns:a16="http://schemas.microsoft.com/office/drawing/2014/main" id="{3E8F1038-8D27-54A8-9404-B72B9BDB78F9}"/>
+                <a16:creationId xmlns:a16="http://schemas.microsoft.com/office/drawing/2014/main" id="{24DCDD43-5FBE-2E45-4336-00C7BFCA18D9}"/>
               </a:ext>
             </a:extLst>
           </p:cNvPr>
@@ -2739,18 +2734,18 @@
           <a:bodyPr/>
           <a:lstStyle/>
           <a:p>
-            <a:fld id="{70C12960-6E85-460F-B6E3-5B82CB31AF3D}" type="slidenum">
-              <a:rPr lang="en-US" smtClean="0"/>
+            <a:fld id="{10E188DE-64F0-4311-81FB-EC275E4C46D9}" type="slidenum">
+              <a:rPr lang="en-SG" smtClean="0"/>
               <a:t>‹#›</a:t>
             </a:fld>
-            <a:endParaRPr lang="en-US"/>
+            <a:endParaRPr lang="en-SG"/>
           </a:p>
         </p:txBody>
       </p:sp>
     </p:spTree>
     <p:extLst>
       <p:ext uri="{BB962C8B-B14F-4D97-AF65-F5344CB8AC3E}">
-        <p14:creationId xmlns:p14="http://schemas.microsoft.com/office/powerpoint/2010/main" val="803796440"/>
+        <p14:creationId xmlns:p14="http://schemas.microsoft.com/office/powerpoint/2010/main" val="1451471949"/>
       </p:ext>
     </p:extLst>
   </p:cSld>
@@ -2787,7 +2782,7 @@
           <p:cNvPr id="2" name="Title Placeholder 1">
             <a:extLst>
               <a:ext uri="{FF2B5EF4-FFF2-40B4-BE49-F238E27FC236}">
-                <a16:creationId xmlns:a16="http://schemas.microsoft.com/office/drawing/2014/main" id="{F8EB05C9-77EF-2EB9-81C5-60ECE9C876F3}"/>
+                <a16:creationId xmlns:a16="http://schemas.microsoft.com/office/drawing/2014/main" id="{1A7220FF-C70D-4E39-B222-8715A4559049}"/>
               </a:ext>
             </a:extLst>
           </p:cNvPr>
@@ -2826,7 +2821,7 @@
           <p:cNvPr id="3" name="Text Placeholder 2">
             <a:extLst>
               <a:ext uri="{FF2B5EF4-FFF2-40B4-BE49-F238E27FC236}">
-                <a16:creationId xmlns:a16="http://schemas.microsoft.com/office/drawing/2014/main" id="{0A267BF1-C9DF-17D1-9378-C641280831F1}"/>
+                <a16:creationId xmlns:a16="http://schemas.microsoft.com/office/drawing/2014/main" id="{2CDF391B-FFF2-70EB-EF57-A4BA4FFEEC61}"/>
               </a:ext>
             </a:extLst>
           </p:cNvPr>
@@ -2894,7 +2889,7 @@
           <p:cNvPr id="4" name="Date Placeholder 3">
             <a:extLst>
               <a:ext uri="{FF2B5EF4-FFF2-40B4-BE49-F238E27FC236}">
-                <a16:creationId xmlns:a16="http://schemas.microsoft.com/office/drawing/2014/main" id="{BA14F73E-B32E-5C02-1D45-49DCA21F9270}"/>
+                <a16:creationId xmlns:a16="http://schemas.microsoft.com/office/drawing/2014/main" id="{D31A39EA-94F4-6D1C-ABB2-9D8FB0FD8047}"/>
               </a:ext>
             </a:extLst>
           </p:cNvPr>
@@ -2928,11 +2923,11 @@
             </a:lvl1pPr>
           </a:lstStyle>
           <a:p>
-            <a:fld id="{7DA38F49-B3E2-4BF0-BEC7-C30D34ABBB8D}" type="datetime1">
-              <a:rPr lang="en-US" smtClean="0"/>
-              <a:t>9/18/2025</a:t>
+            <a:fld id="{9FF3E6ED-C832-4343-8B91-8E72B7796AC5}" type="datetimeFigureOut">
+              <a:rPr lang="en-SG" smtClean="0"/>
+              <a:t>18/9/2025</a:t>
             </a:fld>
-            <a:endParaRPr lang="en-US"/>
+            <a:endParaRPr lang="en-SG"/>
           </a:p>
         </p:txBody>
       </p:sp>
@@ -2941,7 +2936,7 @@
           <p:cNvPr id="5" name="Footer Placeholder 4">
             <a:extLst>
               <a:ext uri="{FF2B5EF4-FFF2-40B4-BE49-F238E27FC236}">
-                <a16:creationId xmlns:a16="http://schemas.microsoft.com/office/drawing/2014/main" id="{84B8BE98-A197-9ADF-E70E-2462B19F6690}"/>
+                <a16:creationId xmlns:a16="http://schemas.microsoft.com/office/drawing/2014/main" id="{33A2A9ED-06C5-2607-8B21-F881774E9F42}"/>
               </a:ext>
             </a:extLst>
           </p:cNvPr>
@@ -2975,7 +2970,7 @@
             </a:lvl1pPr>
           </a:lstStyle>
           <a:p>
-            <a:endParaRPr lang="en-US" dirty="0"/>
+            <a:endParaRPr lang="en-SG"/>
           </a:p>
         </p:txBody>
       </p:sp>
@@ -2984,7 +2979,7 @@
           <p:cNvPr id="6" name="Slide Number Placeholder 5">
             <a:extLst>
               <a:ext uri="{FF2B5EF4-FFF2-40B4-BE49-F238E27FC236}">
-                <a16:creationId xmlns:a16="http://schemas.microsoft.com/office/drawing/2014/main" id="{3F1952C8-CCC6-6F29-1C35-4DEF8EE56C96}"/>
+                <a16:creationId xmlns:a16="http://schemas.microsoft.com/office/drawing/2014/main" id="{639B6752-CB27-CE73-1ECD-E6DB05357E57}"/>
               </a:ext>
             </a:extLst>
           </p:cNvPr>
@@ -3018,36 +3013,35 @@
             </a:lvl1pPr>
           </a:lstStyle>
           <a:p>
-            <a:fld id="{70C12960-6E85-460F-B6E3-5B82CB31AF3D}" type="slidenum">
-              <a:rPr lang="en-US" smtClean="0"/>
+            <a:fld id="{10E188DE-64F0-4311-81FB-EC275E4C46D9}" type="slidenum">
+              <a:rPr lang="en-SG" smtClean="0"/>
               <a:t>‹#›</a:t>
             </a:fld>
-            <a:endParaRPr lang="en-US"/>
+            <a:endParaRPr lang="en-SG"/>
           </a:p>
         </p:txBody>
       </p:sp>
     </p:spTree>
     <p:extLst>
       <p:ext uri="{BB962C8B-B14F-4D97-AF65-F5344CB8AC3E}">
-        <p14:creationId xmlns:p14="http://schemas.microsoft.com/office/powerpoint/2010/main" val="34218993"/>
+        <p14:creationId xmlns:p14="http://schemas.microsoft.com/office/powerpoint/2010/main" val="3077803528"/>
       </p:ext>
     </p:extLst>
   </p:cSld>
   <p:clrMap bg1="lt1" tx1="dk1" bg2="lt2" tx2="dk2" accent1="accent1" accent2="accent2" accent3="accent3" accent4="accent4" accent5="accent5" accent6="accent6" hlink="hlink" folHlink="folHlink"/>
   <p:sldLayoutIdLst>
-    <p:sldLayoutId id="2147483673" r:id="rId1"/>
-    <p:sldLayoutId id="2147483674" r:id="rId2"/>
-    <p:sldLayoutId id="2147483675" r:id="rId3"/>
-    <p:sldLayoutId id="2147483676" r:id="rId4"/>
-    <p:sldLayoutId id="2147483677" r:id="rId5"/>
-    <p:sldLayoutId id="2147483678" r:id="rId6"/>
-    <p:sldLayoutId id="2147483679" r:id="rId7"/>
-    <p:sldLayoutId id="2147483680" r:id="rId8"/>
-    <p:sldLayoutId id="2147483681" r:id="rId9"/>
-    <p:sldLayoutId id="2147483682" r:id="rId10"/>
-    <p:sldLayoutId id="2147483683" r:id="rId11"/>
+    <p:sldLayoutId id="2147483649" r:id="rId1"/>
+    <p:sldLayoutId id="2147483650" r:id="rId2"/>
+    <p:sldLayoutId id="2147483651" r:id="rId3"/>
+    <p:sldLayoutId id="2147483652" r:id="rId4"/>
+    <p:sldLayoutId id="2147483653" r:id="rId5"/>
+    <p:sldLayoutId id="2147483654" r:id="rId6"/>
+    <p:sldLayoutId id="2147483655" r:id="rId7"/>
+    <p:sldLayoutId id="2147483656" r:id="rId8"/>
+    <p:sldLayoutId id="2147483657" r:id="rId9"/>
+    <p:sldLayoutId id="2147483658" r:id="rId10"/>
+    <p:sldLayoutId id="2147483659" r:id="rId11"/>
   </p:sldLayoutIdLst>
-  <p:hf sldNum="0" hdr="0" ftr="0" dt="0"/>
   <p:txStyles>
     <p:titleStyle>
       <a:lvl1pPr algn="l" defTabSz="914400" rtl="0" eaLnBrk="1" latinLnBrk="0" hangingPunct="1">
@@ -3353,15 +3347,15 @@
           <p:cNvPr id="2" name="Title 1">
             <a:extLst>
               <a:ext uri="{FF2B5EF4-FFF2-40B4-BE49-F238E27FC236}">
-                <a16:creationId xmlns:a16="http://schemas.microsoft.com/office/drawing/2014/main" id="{9C2B1677-8B3E-A0A7-2755-B63FCD44D600}"/>
-              </a:ext>
-            </a:extLst>
-          </p:cNvPr>
-          <p:cNvSpPr>
-            <a:spLocks noGrp="1"/>
-          </p:cNvSpPr>
-          <p:nvPr>
-            <p:ph type="title"/>
+                <a16:creationId xmlns:a16="http://schemas.microsoft.com/office/drawing/2014/main" id="{61CD0ACE-2AD3-BFC4-D7C3-4302B4CEF2F3}"/>
+              </a:ext>
+            </a:extLst>
+          </p:cNvPr>
+          <p:cNvSpPr>
+            <a:spLocks noGrp="1"/>
+          </p:cNvSpPr>
+          <p:nvPr>
+            <p:ph type="ctrTitle"/>
           </p:nvPr>
         </p:nvSpPr>
         <p:spPr/>
@@ -3379,18 +3373,18 @@
       </p:sp>
       <p:sp>
         <p:nvSpPr>
-          <p:cNvPr id="3" name="Content Placeholder 2">
-            <a:extLst>
-              <a:ext uri="{FF2B5EF4-FFF2-40B4-BE49-F238E27FC236}">
-                <a16:creationId xmlns:a16="http://schemas.microsoft.com/office/drawing/2014/main" id="{BBBD5FAE-7864-B3EF-2FD2-C8A5E1CCCBF2}"/>
-              </a:ext>
-            </a:extLst>
-          </p:cNvPr>
-          <p:cNvSpPr>
-            <a:spLocks noGrp="1"/>
-          </p:cNvSpPr>
-          <p:nvPr>
-            <p:ph idx="1"/>
+          <p:cNvPr id="3" name="Subtitle 2">
+            <a:extLst>
+              <a:ext uri="{FF2B5EF4-FFF2-40B4-BE49-F238E27FC236}">
+                <a16:creationId xmlns:a16="http://schemas.microsoft.com/office/drawing/2014/main" id="{1BF8D1A0-1391-9B57-18A5-DCC54D79F347}"/>
+              </a:ext>
+            </a:extLst>
+          </p:cNvPr>
+          <p:cNvSpPr>
+            <a:spLocks noGrp="1"/>
+          </p:cNvSpPr>
+          <p:nvPr>
+            <p:ph type="subTitle" idx="1"/>
           </p:nvPr>
         </p:nvSpPr>
         <p:spPr/>
@@ -3413,7 +3407,7 @@
     </p:spTree>
     <p:extLst>
       <p:ext uri="{BB962C8B-B14F-4D97-AF65-F5344CB8AC3E}">
-        <p14:creationId xmlns:p14="http://schemas.microsoft.com/office/powerpoint/2010/main" val="2127419761"/>
+        <p14:creationId xmlns:p14="http://schemas.microsoft.com/office/powerpoint/2010/main" val="2898748158"/>
       </p:ext>
     </p:extLst>
   </p:cSld>

</xml_diff>

<commit_message>
Deploying to gh-pages from master @ 3d4bf7d47d09cd499bfe432f2c3e603b35478aff 🚀
</commit_message>
<xml_diff>
--- a/ppt/Phishing.pptx
+++ b/ppt/Phishing.pptx
@@ -6,6 +6,8 @@
   </p:sldMasterIdLst>
   <p:sldIdLst>
     <p:sldId id="256" r:id="rId2"/>
+    <p:sldId id="257" r:id="rId3"/>
+    <p:sldId id="258" r:id="rId4"/>
   </p:sldIdLst>
   <p:sldSz cx="12192000" cy="6858000"/>
   <p:notesSz cx="6858000" cy="9144000"/>
@@ -104,6 +106,11 @@
       </a:defRPr>
     </a:lvl9pPr>
   </p:defaultTextStyle>
+  <p:extLst>
+    <p:ext uri="{EFAFB233-063F-42B5-8137-9DF3F51BA10A}">
+      <p15:sldGuideLst xmlns:p15="http://schemas.microsoft.com/office/powerpoint/2012/main"/>
+    </p:ext>
+  </p:extLst>
 </p:presentation>
 </file>
 
@@ -3394,13 +3401,9 @@
           <a:p>
             <a:r>
               <a:rPr lang="en-US" dirty="0"/>
-              <a:t>I don’t know, </a:t>
-            </a:r>
-            <a:r>
-              <a:rPr lang="en-US"/>
-              <a:t>you tell me!</a:t>
-            </a:r>
-            <a:endParaRPr lang="en-SG"/>
+              <a:t>I don’t know, you tell me!</a:t>
+            </a:r>
+            <a:endParaRPr lang="en-SG" dirty="0"/>
           </a:p>
         </p:txBody>
       </p:sp>
@@ -3408,6 +3411,196 @@
     <p:extLst>
       <p:ext uri="{BB962C8B-B14F-4D97-AF65-F5344CB8AC3E}">
         <p14:creationId xmlns:p14="http://schemas.microsoft.com/office/powerpoint/2010/main" val="2898748158"/>
+      </p:ext>
+    </p:extLst>
+  </p:cSld>
+  <p:clrMapOvr>
+    <a:masterClrMapping/>
+  </p:clrMapOvr>
+</p:sld>
+</file>
+
+<file path=ppt/slides/slide2.xml><?xml version="1.0" encoding="utf-8"?>
+<p:sld xmlns:a="http://schemas.openxmlformats.org/drawingml/2006/main" xmlns:r="http://schemas.openxmlformats.org/officeDocument/2006/relationships" xmlns:p="http://schemas.openxmlformats.org/presentationml/2006/main">
+  <p:cSld>
+    <p:spTree>
+      <p:nvGrpSpPr>
+        <p:cNvPr id="1" name=""/>
+        <p:cNvGrpSpPr/>
+        <p:nvPr/>
+      </p:nvGrpSpPr>
+      <p:grpSpPr>
+        <a:xfrm>
+          <a:off x="0" y="0"/>
+          <a:ext cx="0" cy="0"/>
+          <a:chOff x="0" y="0"/>
+          <a:chExt cx="0" cy="0"/>
+        </a:xfrm>
+      </p:grpSpPr>
+      <p:sp>
+        <p:nvSpPr>
+          <p:cNvPr id="2" name="Title 1">
+            <a:extLst>
+              <a:ext uri="{FF2B5EF4-FFF2-40B4-BE49-F238E27FC236}">
+                <a16:creationId xmlns:a16="http://schemas.microsoft.com/office/drawing/2014/main" id="{EB7F8821-F62C-B10E-99D5-0B9590C3FC88}"/>
+              </a:ext>
+            </a:extLst>
+          </p:cNvPr>
+          <p:cNvSpPr>
+            <a:spLocks noGrp="1"/>
+          </p:cNvSpPr>
+          <p:nvPr>
+            <p:ph type="title"/>
+          </p:nvPr>
+        </p:nvSpPr>
+        <p:spPr/>
+        <p:txBody>
+          <a:bodyPr/>
+          <a:lstStyle/>
+          <a:p>
+            <a:r>
+              <a:rPr lang="en-US" dirty="0"/>
+              <a:t>What is </a:t>
+            </a:r>
+            <a:r>
+              <a:rPr lang="en-US" dirty="0" err="1"/>
+              <a:t>Quishing</a:t>
+            </a:r>
+            <a:r>
+              <a:rPr lang="en-US" dirty="0"/>
+              <a:t>?</a:t>
+            </a:r>
+            <a:endParaRPr lang="en-SG" dirty="0"/>
+          </a:p>
+        </p:txBody>
+      </p:sp>
+      <p:sp>
+        <p:nvSpPr>
+          <p:cNvPr id="3" name="Content Placeholder 2">
+            <a:extLst>
+              <a:ext uri="{FF2B5EF4-FFF2-40B4-BE49-F238E27FC236}">
+                <a16:creationId xmlns:a16="http://schemas.microsoft.com/office/drawing/2014/main" id="{BACAFC16-E201-54A1-EE7B-DF7E496DEBE1}"/>
+              </a:ext>
+            </a:extLst>
+          </p:cNvPr>
+          <p:cNvSpPr>
+            <a:spLocks noGrp="1"/>
+          </p:cNvSpPr>
+          <p:nvPr>
+            <p:ph idx="1"/>
+          </p:nvPr>
+        </p:nvSpPr>
+        <p:spPr/>
+        <p:txBody>
+          <a:bodyPr/>
+          <a:lstStyle/>
+          <a:p>
+            <a:r>
+              <a:rPr lang="en-US" dirty="0"/>
+              <a:t>I don’t know, you tell me!</a:t>
+            </a:r>
+            <a:endParaRPr lang="en-SG" dirty="0"/>
+          </a:p>
+          <a:p>
+            <a:endParaRPr lang="en-SG" dirty="0"/>
+          </a:p>
+        </p:txBody>
+      </p:sp>
+    </p:spTree>
+    <p:extLst>
+      <p:ext uri="{BB962C8B-B14F-4D97-AF65-F5344CB8AC3E}">
+        <p14:creationId xmlns:p14="http://schemas.microsoft.com/office/powerpoint/2010/main" val="872007641"/>
+      </p:ext>
+    </p:extLst>
+  </p:cSld>
+  <p:clrMapOvr>
+    <a:masterClrMapping/>
+  </p:clrMapOvr>
+</p:sld>
+</file>
+
+<file path=ppt/slides/slide3.xml><?xml version="1.0" encoding="utf-8"?>
+<p:sld xmlns:a="http://schemas.openxmlformats.org/drawingml/2006/main" xmlns:r="http://schemas.openxmlformats.org/officeDocument/2006/relationships" xmlns:p="http://schemas.openxmlformats.org/presentationml/2006/main">
+  <p:cSld>
+    <p:spTree>
+      <p:nvGrpSpPr>
+        <p:cNvPr id="1" name=""/>
+        <p:cNvGrpSpPr/>
+        <p:nvPr/>
+      </p:nvGrpSpPr>
+      <p:grpSpPr>
+        <a:xfrm>
+          <a:off x="0" y="0"/>
+          <a:ext cx="0" cy="0"/>
+          <a:chOff x="0" y="0"/>
+          <a:chExt cx="0" cy="0"/>
+        </a:xfrm>
+      </p:grpSpPr>
+      <p:sp>
+        <p:nvSpPr>
+          <p:cNvPr id="2" name="Title 1">
+            <a:extLst>
+              <a:ext uri="{FF2B5EF4-FFF2-40B4-BE49-F238E27FC236}">
+                <a16:creationId xmlns:a16="http://schemas.microsoft.com/office/drawing/2014/main" id="{8CA88A46-B41E-D8ED-E2D8-B76B2279F5FA}"/>
+              </a:ext>
+            </a:extLst>
+          </p:cNvPr>
+          <p:cNvSpPr>
+            <a:spLocks noGrp="1"/>
+          </p:cNvSpPr>
+          <p:nvPr>
+            <p:ph type="title"/>
+          </p:nvPr>
+        </p:nvSpPr>
+        <p:spPr/>
+        <p:txBody>
+          <a:bodyPr/>
+          <a:lstStyle/>
+          <a:p>
+            <a:r>
+              <a:rPr lang="en-US" dirty="0"/>
+              <a:t>Protection against Phishing</a:t>
+            </a:r>
+            <a:endParaRPr lang="en-SG" dirty="0"/>
+          </a:p>
+        </p:txBody>
+      </p:sp>
+      <p:sp>
+        <p:nvSpPr>
+          <p:cNvPr id="3" name="Content Placeholder 2">
+            <a:extLst>
+              <a:ext uri="{FF2B5EF4-FFF2-40B4-BE49-F238E27FC236}">
+                <a16:creationId xmlns:a16="http://schemas.microsoft.com/office/drawing/2014/main" id="{B0007B6C-86CC-0DEF-ACE7-03AF475E6FD4}"/>
+              </a:ext>
+            </a:extLst>
+          </p:cNvPr>
+          <p:cNvSpPr>
+            <a:spLocks noGrp="1"/>
+          </p:cNvSpPr>
+          <p:nvPr>
+            <p:ph idx="1"/>
+          </p:nvPr>
+        </p:nvSpPr>
+        <p:spPr/>
+        <p:txBody>
+          <a:bodyPr/>
+          <a:lstStyle/>
+          <a:p>
+            <a:r>
+              <a:rPr lang="en-US" dirty="0"/>
+              <a:t>I don’t know, you tell me!</a:t>
+            </a:r>
+            <a:endParaRPr lang="en-SG"/>
+          </a:p>
+          <a:p>
+            <a:endParaRPr lang="en-SG"/>
+          </a:p>
+        </p:txBody>
+      </p:sp>
+    </p:spTree>
+    <p:extLst>
+      <p:ext uri="{BB962C8B-B14F-4D97-AF65-F5344CB8AC3E}">
+        <p14:creationId xmlns:p14="http://schemas.microsoft.com/office/powerpoint/2010/main" val="1875651689"/>
       </p:ext>
     </p:extLst>
   </p:cSld>

</xml_diff>